<commit_message>
Updated Function Decomp. diagram.
</commit_message>
<xml_diff>
--- a/Documents/Concur_Presentation.pptx
+++ b/Documents/Concur_Presentation.pptx
@@ -14,7 +14,7 @@
     <p:sldId id="281" r:id="rId5"/>
     <p:sldId id="259" r:id="rId6"/>
     <p:sldId id="266" r:id="rId7"/>
-    <p:sldId id="275" r:id="rId8"/>
+    <p:sldId id="291" r:id="rId8"/>
     <p:sldId id="288" r:id="rId9"/>
     <p:sldId id="290" r:id="rId10"/>
     <p:sldId id="286" r:id="rId11"/>
@@ -213,7 +213,7 @@
           <a:p>
             <a:fld id="{BE2663A9-2618-6649-B6E3-2D33878C5258}" type="datetimeFigureOut">
               <a:rPr lang="en-US" smtClean="0"/>
-              <a:t>6/6/12</a:t>
+              <a:t>6/7/12</a:t>
             </a:fld>
             <a:endParaRPr lang="en-US"/>
           </a:p>
@@ -1231,15 +1231,7 @@
             </a:r>
             <a:r>
               <a:rPr lang="en-US" baseline="0" dirty="0" smtClean="0"/>
-              <a:t> call after each statement increases </a:t>
-            </a:r>
-            <a:r>
-              <a:rPr lang="en-US" baseline="0" dirty="0" smtClean="0"/>
-              <a:t>craziness of </a:t>
-            </a:r>
-            <a:r>
-              <a:rPr lang="en-US" baseline="0" dirty="0" smtClean="0"/>
-              <a:t>the schedules</a:t>
+              <a:t> call after each statement increases craziness of the schedules</a:t>
             </a:r>
             <a:endParaRPr lang="en-US" dirty="0" smtClean="0"/>
           </a:p>
@@ -1916,7 +1908,7 @@
           <a:p>
             <a:fld id="{F09FF0AF-D2C1-48E6-838D-34907CC7AAD3}" type="datetime2">
               <a:rPr lang="en-US" smtClean="0"/>
-              <a:t>Wednesday, June 6, 12</a:t>
+              <a:t>Thursday, June 7, 12</a:t>
             </a:fld>
             <a:endParaRPr lang="en-US"/>
           </a:p>
@@ -2118,7 +2110,7 @@
           <a:p>
             <a:fld id="{6E272829-C125-48EE-B9F1-150AD50C9F98}" type="datetime2">
               <a:rPr lang="en-US" smtClean="0"/>
-              <a:t>Wednesday, June 6, 12</a:t>
+              <a:t>Thursday, June 7, 12</a:t>
             </a:fld>
             <a:endParaRPr lang="en-US"/>
           </a:p>
@@ -2295,7 +2287,7 @@
           <a:p>
             <a:fld id="{05341E2C-B9D9-45C2-B520-10A28977426A}" type="datetime2">
               <a:rPr lang="en-US" smtClean="0"/>
-              <a:t>Wednesday, June 6, 12</a:t>
+              <a:t>Thursday, June 7, 12</a:t>
             </a:fld>
             <a:endParaRPr lang="en-US"/>
           </a:p>
@@ -2462,7 +2454,7 @@
           <a:p>
             <a:fld id="{12925254-87A5-4CF0-99E8-AC8E68BF7E06}" type="datetime2">
               <a:rPr lang="en-US" smtClean="0"/>
-              <a:t>Wednesday, June 6, 12</a:t>
+              <a:t>Thursday, June 7, 12</a:t>
             </a:fld>
             <a:endParaRPr lang="en-US"/>
           </a:p>
@@ -2712,7 +2704,7 @@
           <a:p>
             <a:fld id="{DC2946C1-A293-479B-BDA5-001C778CB73D}" type="datetime2">
               <a:rPr lang="en-US" smtClean="0"/>
-              <a:t>Wednesday, June 6, 12</a:t>
+              <a:t>Thursday, June 7, 12</a:t>
             </a:fld>
             <a:endParaRPr lang="en-US"/>
           </a:p>
@@ -3032,7 +3024,7 @@
           <a:p>
             <a:fld id="{D1BA556C-EF54-4AA5-9DB7-CE7372A45079}" type="datetime2">
               <a:rPr lang="en-US" smtClean="0"/>
-              <a:t>Wednesday, June 6, 12</a:t>
+              <a:t>Thursday, June 7, 12</a:t>
             </a:fld>
             <a:endParaRPr lang="en-US"/>
           </a:p>
@@ -3500,7 +3492,7 @@
           <a:p>
             <a:fld id="{B78E10FB-3602-4C38-94EA-83110B555185}" type="datetime2">
               <a:rPr lang="en-US" smtClean="0"/>
-              <a:t>Wednesday, June 6, 12</a:t>
+              <a:t>Thursday, June 7, 12</a:t>
             </a:fld>
             <a:endParaRPr lang="en-US"/>
           </a:p>
@@ -3650,7 +3642,7 @@
           <a:p>
             <a:fld id="{CE2B67B4-70E4-41D6-8604-8C58B39011FA}" type="datetime2">
               <a:rPr lang="en-US" smtClean="0"/>
-              <a:t>Wednesday, June 6, 12</a:t>
+              <a:t>Thursday, June 7, 12</a:t>
             </a:fld>
             <a:endParaRPr lang="en-US"/>
           </a:p>
@@ -3742,7 +3734,7 @@
           <a:p>
             <a:fld id="{96C14349-F0F1-4B64-9196-E808C561C052}" type="datetime2">
               <a:rPr lang="en-US" smtClean="0"/>
-              <a:t>Wednesday, June 6, 12</a:t>
+              <a:t>Thursday, June 7, 12</a:t>
             </a:fld>
             <a:endParaRPr lang="en-US"/>
           </a:p>
@@ -4018,7 +4010,7 @@
           <a:p>
             <a:fld id="{AEFF8DCA-800C-4A35-9DC7-25E631DA2DB6}" type="datetime2">
               <a:rPr lang="en-US" smtClean="0"/>
-              <a:t>Wednesday, June 6, 12</a:t>
+              <a:t>Thursday, June 7, 12</a:t>
             </a:fld>
             <a:endParaRPr lang="en-US"/>
           </a:p>
@@ -4325,7 +4317,7 @@
           <a:p>
             <a:fld id="{A2A2C62E-D659-49D4-A739-4E48E87EAA9F}" type="datetime2">
               <a:rPr lang="en-US" smtClean="0"/>
-              <a:t>Wednesday, June 6, 12</a:t>
+              <a:t>Thursday, June 7, 12</a:t>
             </a:fld>
             <a:endParaRPr lang="en-US"/>
           </a:p>
@@ -4625,7 +4617,7 @@
           <a:p>
             <a:fld id="{1C925619-5C23-46BF-A87A-5AD00CBA1C66}" type="datetime2">
               <a:rPr lang="en-US" smtClean="0"/>
-              <a:t>Wednesday, June 6, 12</a:t>
+              <a:t>Thursday, June 7, 12</a:t>
             </a:fld>
             <a:endParaRPr lang="en-US" dirty="0"/>
           </a:p>
@@ -5430,50 +5422,24 @@
               <a:rPr lang="en-US" dirty="0" smtClean="0"/>
               <a:t>schedules</a:t>
             </a:r>
-            <a:endParaRPr lang="en-US" dirty="0" smtClean="0"/>
           </a:p>
           <a:p>
             <a:r>
               <a:rPr lang="en-US" dirty="0" smtClean="0"/>
-              <a:t>3.  </a:t>
-            </a:r>
+              <a:t>3.  Observe status at end of each test run</a:t>
+            </a:r>
+          </a:p>
+          <a:p>
+            <a:pPr lvl="1"/>
             <a:r>
               <a:rPr lang="en-US" dirty="0" smtClean="0"/>
-              <a:t>Observe</a:t>
-            </a:r>
+              <a:t>(proceed to next step if run failed)</a:t>
+            </a:r>
+          </a:p>
+          <a:p>
             <a:r>
               <a:rPr lang="en-US" dirty="0" smtClean="0"/>
-              <a:t> </a:t>
-            </a:r>
-            <a:r>
-              <a:rPr lang="en-US" dirty="0" smtClean="0"/>
-              <a:t>status at end of each test </a:t>
-            </a:r>
-            <a:r>
-              <a:rPr lang="en-US" dirty="0" smtClean="0"/>
-              <a:t>run</a:t>
-            </a:r>
-            <a:endParaRPr lang="en-US" dirty="0" smtClean="0"/>
-          </a:p>
-          <a:p>
-            <a:pPr lvl="1"/>
-            <a:r>
-              <a:rPr lang="en-US" dirty="0" smtClean="0"/>
-              <a:t>(</a:t>
-            </a:r>
-            <a:r>
-              <a:rPr lang="en-US" dirty="0" smtClean="0"/>
-              <a:t>proceed to next step if run failed)</a:t>
-            </a:r>
-          </a:p>
-          <a:p>
-            <a:r>
-              <a:rPr lang="en-US" dirty="0" smtClean="0"/>
-              <a:t>4</a:t>
-            </a:r>
-            <a:r>
-              <a:rPr lang="en-US" dirty="0" smtClean="0"/>
-              <a:t>.  </a:t>
+              <a:t>4.  </a:t>
             </a:r>
             <a:r>
               <a:rPr lang="en-US" dirty="0"/>
@@ -5671,11 +5637,7 @@
           <a:p>
             <a:r>
               <a:rPr lang="en-US" dirty="0" smtClean="0"/>
-              <a:t>4</a:t>
-            </a:r>
-            <a:r>
-              <a:rPr lang="en-US" dirty="0" smtClean="0"/>
-              <a:t>.  Open </a:t>
+              <a:t>4.  Open </a:t>
             </a:r>
             <a:r>
               <a:rPr lang="en-US" dirty="0" err="1" smtClean="0"/>
@@ -5683,11 +5645,7 @@
             </a:r>
             <a:r>
               <a:rPr lang="en-US" dirty="0" smtClean="0"/>
-              <a:t> to see where error occurred</a:t>
-            </a:r>
-            <a:r>
-              <a:rPr lang="en-US" dirty="0" smtClean="0"/>
-              <a:t>.</a:t>
+              <a:t> to see where error occurred.</a:t>
             </a:r>
           </a:p>
           <a:p>
@@ -5703,18 +5661,12 @@
               <a:rPr lang="en-US" dirty="0" smtClean="0"/>
               <a:t>:</a:t>
             </a:r>
-            <a:endParaRPr lang="en-US" dirty="0" smtClean="0"/>
           </a:p>
           <a:p>
             <a:r>
               <a:rPr lang="en-US" dirty="0" smtClean="0"/>
-              <a:t>5.  Correct error and rerun Concur with same inputs</a:t>
-            </a:r>
-            <a:r>
-              <a:rPr lang="en-US" dirty="0" smtClean="0"/>
-              <a:t>.</a:t>
-            </a:r>
-            <a:endParaRPr lang="en-US" dirty="0" smtClean="0"/>
+              <a:t>5.  Correct error and rerun Concur with same inputs.</a:t>
+            </a:r>
           </a:p>
         </p:txBody>
       </p:sp>
@@ -5824,15 +5776,7 @@
           <a:p>
             <a:r>
               <a:rPr lang="en-US" dirty="0" smtClean="0"/>
-              <a:t>Used Wrapper to test </a:t>
-            </a:r>
-            <a:r>
-              <a:rPr lang="en-US" dirty="0" smtClean="0"/>
-              <a:t>four student submissions from Fall 2011 for the Unisex Bathroom </a:t>
-            </a:r>
-            <a:r>
-              <a:rPr lang="en-US" dirty="0" smtClean="0"/>
-              <a:t>problem</a:t>
+              <a:t>Used Wrapper to test four student submissions from Fall 2011 for the Unisex Bathroom problem</a:t>
             </a:r>
           </a:p>
         </p:txBody>
@@ -6668,15 +6612,29 @@
           </a:bodyPr>
           <a:lstStyle/>
           <a:p>
+            <a:pPr marL="0" indent="0">
+              <a:buNone/>
+            </a:pPr>
             <a:r>
               <a:rPr lang="en-US" dirty="0" smtClean="0"/>
-              <a:t>Deadlock detection:  If all active threads are blocked waiting for either a lock or semaphore, then a deadlock has occurred.</a:t>
-            </a:r>
-          </a:p>
-          <a:p>
+              <a:t>+  Deadlock </a:t>
+            </a:r>
             <a:r>
               <a:rPr lang="en-US" dirty="0" smtClean="0"/>
-              <a:t>Controlled environment:</a:t>
+              <a:t>detection:  If all active threads are blocked waiting for either a lock or semaphore, then a deadlock has occurred.</a:t>
+            </a:r>
+          </a:p>
+          <a:p>
+            <a:pPr marL="0" indent="0">
+              <a:buNone/>
+            </a:pPr>
+            <a:r>
+              <a:rPr lang="en-US" dirty="0" smtClean="0"/>
+              <a:t>+  Controlled </a:t>
+            </a:r>
+            <a:r>
+              <a:rPr lang="en-US" dirty="0" smtClean="0"/>
+              <a:t>environment:</a:t>
             </a:r>
           </a:p>
           <a:p>
@@ -6694,9 +6652,16 @@
             </a:r>
           </a:p>
           <a:p>
+            <a:pPr marL="0" indent="0">
+              <a:buNone/>
+            </a:pPr>
             <a:r>
               <a:rPr lang="en-US" dirty="0" smtClean="0"/>
-              <a:t>Increased schedule coverage:</a:t>
+              <a:t>+  Increased </a:t>
+            </a:r>
+            <a:r>
+              <a:rPr lang="en-US" dirty="0" smtClean="0"/>
+              <a:t>schedule coverage:</a:t>
             </a:r>
           </a:p>
           <a:p>
@@ -6714,9 +6679,16 @@
             </a:r>
           </a:p>
           <a:p>
+            <a:pPr marL="0" indent="0">
+              <a:buNone/>
+            </a:pPr>
+            <a:r>
+              <a:rPr lang="en-US" dirty="0" smtClean="0"/>
+              <a:t>+  The </a:t>
+            </a:r>
             <a:r>
               <a:rPr lang="en-US" dirty="0"/>
-              <a:t>The framework, with minimal work of the instructor, can be used for a variety of synchronization exercises</a:t>
+              <a:t>framework, with minimal work of the instructor, can be used for a variety of synchronization exercises</a:t>
             </a:r>
             <a:r>
               <a:rPr lang="en-US" dirty="0" smtClean="0"/>
@@ -6724,9 +6696,12 @@
             </a:r>
           </a:p>
           <a:p>
+            <a:pPr marL="0" indent="0">
+              <a:buNone/>
+            </a:pPr>
             <a:r>
               <a:rPr lang="en-US" dirty="0" smtClean="0"/>
-              <a:t>The </a:t>
+              <a:t>+  The </a:t>
             </a:r>
             <a:r>
               <a:rPr lang="en-US" dirty="0"/>
@@ -6840,11 +6815,7 @@
           <a:p>
             <a:r>
               <a:rPr lang="en-US" dirty="0" smtClean="0"/>
-              <a:t>Improve </a:t>
-            </a:r>
-            <a:r>
-              <a:rPr lang="en-US" dirty="0" smtClean="0"/>
-              <a:t>performance</a:t>
+              <a:t>Improve performance</a:t>
             </a:r>
           </a:p>
           <a:p>
@@ -6868,11 +6839,7 @@
           <a:p>
             <a:r>
               <a:rPr lang="en-US" dirty="0" smtClean="0"/>
-              <a:t>Incorporate </a:t>
-            </a:r>
-            <a:r>
-              <a:rPr lang="en-US" dirty="0" smtClean="0"/>
-              <a:t>Checker for mutual exclusion violations</a:t>
+              <a:t>Incorporate Checker for mutual exclusion violations</a:t>
             </a:r>
           </a:p>
         </p:txBody>
@@ -6999,15 +6966,7 @@
             <a:pPr lvl="1"/>
             <a:r>
               <a:rPr lang="en-US" dirty="0" smtClean="0"/>
-              <a:t>Increased </a:t>
-            </a:r>
-            <a:r>
-              <a:rPr lang="en-US" dirty="0" smtClean="0"/>
-              <a:t>multiple schedule</a:t>
-            </a:r>
-            <a:r>
-              <a:rPr lang="en-US" dirty="0" smtClean="0"/>
-              <a:t> coverage</a:t>
+              <a:t>Increased multiple schedule coverage</a:t>
             </a:r>
           </a:p>
           <a:p>
@@ -7016,7 +6975,6 @@
               <a:rPr lang="en-US" dirty="0" smtClean="0"/>
               <a:t>Thread, lock, and semaphore status</a:t>
             </a:r>
-            <a:endParaRPr lang="en-US" dirty="0" smtClean="0"/>
           </a:p>
           <a:p>
             <a:pPr marL="0" indent="0">
@@ -7839,19 +7797,7 @@
           <a:p>
             <a:r>
               <a:rPr lang="en-US" dirty="0" smtClean="0"/>
-              <a:t>Problem &amp; Proposed Solution	</a:t>
-            </a:r>
-            <a:r>
-              <a:rPr lang="en-US" dirty="0" smtClean="0"/>
-              <a:t>	</a:t>
-            </a:r>
-            <a:r>
-              <a:rPr lang="en-US" dirty="0" smtClean="0"/>
-              <a:t>  </a:t>
-            </a:r>
-            <a:r>
-              <a:rPr lang="en-US" dirty="0" smtClean="0"/>
-              <a:t>3 </a:t>
+              <a:t>Problem &amp; Proposed Solution		  3 </a:t>
             </a:r>
             <a:r>
               <a:rPr lang="en-US" dirty="0" err="1" smtClean="0"/>
@@ -9893,15 +9839,7 @@
                     <a:srgbClr val="292934"/>
                   </a:solidFill>
                 </a:rPr>
-                <a:t>pthread</a:t>
-              </a:r>
-              <a:r>
-                <a:rPr lang="en-US" sz="1200" dirty="0" err="1" smtClean="0">
-                  <a:solidFill>
-                    <a:srgbClr val="292934"/>
-                  </a:solidFill>
-                </a:rPr>
-                <a:t>.h</a:t>
+                <a:t>pthread.h</a:t>
               </a:r>
               <a:r>
                 <a:rPr lang="en-US" sz="1200" dirty="0">
@@ -9957,15 +9895,7 @@
                     <a:srgbClr val="292934"/>
                   </a:solidFill>
                 </a:rPr>
-                <a:t>/</a:t>
-              </a:r>
-              <a:r>
-                <a:rPr lang="en-US" sz="1200" dirty="0" smtClean="0">
-                  <a:solidFill>
-                    <a:srgbClr val="292934"/>
-                  </a:solidFill>
-                </a:rPr>
-                <a:t>/ global variables</a:t>
+                <a:t>// global variables</a:t>
               </a:r>
             </a:p>
             <a:p>
@@ -10009,11 +9939,6 @@
                 </a:rPr>
                 <a:t>;</a:t>
               </a:r>
-              <a:endParaRPr lang="en-US" sz="1200" dirty="0" smtClean="0">
-                <a:solidFill>
-                  <a:srgbClr val="292934"/>
-                </a:solidFill>
-              </a:endParaRPr>
             </a:p>
             <a:p>
               <a:r>
@@ -10084,15 +10009,7 @@
                     <a:srgbClr val="292934"/>
                   </a:solidFill>
                 </a:rPr>
-                <a:t>() </a:t>
-              </a:r>
-              <a:r>
-                <a:rPr lang="en-US" sz="1200" dirty="0" smtClean="0">
-                  <a:solidFill>
-                    <a:srgbClr val="292934"/>
-                  </a:solidFill>
-                </a:rPr>
-                <a:t>{</a:t>
+                <a:t>() {</a:t>
               </a:r>
             </a:p>
             <a:p>
@@ -10152,15 +10069,7 @@
                     <a:srgbClr val="292934"/>
                   </a:solidFill>
                 </a:rPr>
-                <a:t>s</a:t>
-              </a:r>
-              <a:r>
-                <a:rPr lang="en-US" sz="1200" dirty="0" err="1" smtClean="0">
-                  <a:solidFill>
-                    <a:srgbClr val="292934"/>
-                  </a:solidFill>
-                </a:rPr>
-                <a:t>em_wait</a:t>
+                <a:t>sem_wait</a:t>
               </a:r>
               <a:r>
                 <a:rPr lang="en-US" sz="1200" dirty="0" smtClean="0">
@@ -10219,11 +10128,6 @@
                 </a:rPr>
                 <a:t>}</a:t>
               </a:r>
-              <a:endParaRPr lang="en-US" sz="1200" dirty="0" smtClean="0">
-                <a:solidFill>
-                  <a:srgbClr val="292934"/>
-                </a:solidFill>
-              </a:endParaRPr>
             </a:p>
             <a:p>
               <a:endParaRPr lang="en-US" sz="1200" dirty="0" smtClean="0">
@@ -10247,15 +10151,7 @@
                     <a:srgbClr val="292934"/>
                   </a:solidFill>
                 </a:rPr>
-                <a:t>() </a:t>
-              </a:r>
-              <a:r>
-                <a:rPr lang="en-US" sz="1200" dirty="0" smtClean="0">
-                  <a:solidFill>
-                    <a:srgbClr val="292934"/>
-                  </a:solidFill>
-                </a:rPr>
-                <a:t>{</a:t>
+                <a:t>() {</a:t>
               </a:r>
             </a:p>
             <a:p>
@@ -10291,15 +10187,7 @@
                     <a:srgbClr val="292934"/>
                   </a:solidFill>
                 </a:rPr>
-                <a:t>s</a:t>
-              </a:r>
-              <a:r>
-                <a:rPr lang="en-US" sz="1200" dirty="0" err="1" smtClean="0">
-                  <a:solidFill>
-                    <a:srgbClr val="292934"/>
-                  </a:solidFill>
-                </a:rPr>
-                <a:t>em_post</a:t>
+                <a:t>sem_post</a:t>
               </a:r>
               <a:r>
                 <a:rPr lang="en-US" sz="1200" dirty="0" smtClean="0">
@@ -10498,15 +10386,7 @@
                     <a:srgbClr val="292934"/>
                   </a:solidFill>
                 </a:rPr>
-                <a:t>hw1</a:t>
-              </a:r>
-              <a:r>
-                <a:rPr lang="en-US" sz="1200" dirty="0" smtClean="0">
-                  <a:solidFill>
-                    <a:srgbClr val="292934"/>
-                  </a:solidFill>
-                </a:rPr>
-                <a:t>.cpp</a:t>
+                <a:t>hw1.cpp</a:t>
               </a:r>
               <a:endParaRPr lang="en-US" sz="1200" dirty="0">
                 <a:solidFill>
@@ -12014,9 +11894,6 @@
               </a:rPr>
               <a:t>unning on multiple schedules</a:t>
             </a:r>
-            <a:endParaRPr lang="en-US" sz="1600" dirty="0" smtClean="0">
-              <a:sym typeface="Wingdings"/>
-            </a:endParaRPr>
           </a:p>
         </p:txBody>
       </p:sp>
@@ -12598,11 +12475,7 @@
             <a:p>
               <a:r>
                 <a:rPr lang="en-US" sz="1600" dirty="0" smtClean="0"/>
-                <a:t>Test Run </a:t>
-              </a:r>
-              <a:r>
-                <a:rPr lang="en-US" sz="1600" dirty="0" smtClean="0"/>
-                <a:t>States</a:t>
+                <a:t>Test Run States</a:t>
               </a:r>
               <a:endParaRPr lang="en-US" sz="1600" dirty="0"/>
             </a:p>
@@ -13182,11 +13055,7 @@
           <a:p>
             <a:r>
               <a:rPr lang="en-US" dirty="0" smtClean="0"/>
-              <a:t>Problem &amp; </a:t>
-            </a:r>
-            <a:r>
-              <a:rPr lang="en-US" dirty="0" smtClean="0"/>
-              <a:t>Proposed Solution</a:t>
+              <a:t>Problem &amp; Proposed Solution</a:t>
             </a:r>
             <a:endParaRPr lang="en-US" dirty="0"/>
           </a:p>
@@ -13213,7 +13082,6 @@
               <a:rPr lang="en-US" dirty="0" smtClean="0"/>
               <a:t>Problem:</a:t>
             </a:r>
-            <a:endParaRPr lang="en-US" dirty="0" smtClean="0"/>
           </a:p>
           <a:p>
             <a:pPr lvl="1"/>
@@ -13221,7 +13089,6 @@
               <a:rPr lang="en-US" dirty="0" smtClean="0"/>
               <a:t>Students have insufficient resources to adequately determine if their multithreaded program is free from deadlock and/or race conditions.  </a:t>
             </a:r>
-            <a:endParaRPr lang="en-US" dirty="0" smtClean="0"/>
           </a:p>
           <a:p>
             <a:pPr lvl="1"/>
@@ -13741,15 +13608,7 @@
             </a:pPr>
             <a:r>
               <a:rPr lang="en-US" dirty="0" smtClean="0"/>
-              <a:t>Increased </a:t>
-            </a:r>
-            <a:r>
-              <a:rPr lang="en-US" dirty="0" smtClean="0"/>
-              <a:t>varied schedule </a:t>
-            </a:r>
-            <a:r>
-              <a:rPr lang="en-US" dirty="0" smtClean="0"/>
-              <a:t>coverage</a:t>
+              <a:t>Increased varied schedule coverage</a:t>
             </a:r>
           </a:p>
           <a:p>
@@ -13759,13 +13618,8 @@
             </a:pPr>
             <a:r>
               <a:rPr lang="en-US" dirty="0" smtClean="0"/>
-              <a:t>Status of threads, locks, and </a:t>
-            </a:r>
-            <a:r>
-              <a:rPr lang="en-US" dirty="0" smtClean="0"/>
-              <a:t>semaphores</a:t>
-            </a:r>
-            <a:endParaRPr lang="en-US" dirty="0" smtClean="0"/>
+              <a:t>Status of threads, locks, and semaphores</a:t>
+            </a:r>
           </a:p>
         </p:txBody>
       </p:sp>
@@ -14365,12 +14219,17 @@
         </p:nvSpPr>
         <p:spPr>
           <a:xfrm>
-            <a:off x="3530602" y="1937134"/>
+            <a:off x="3832129" y="1869584"/>
             <a:ext cx="1439332" cy="524933"/>
           </a:xfrm>
           <a:prstGeom prst="rect">
             <a:avLst/>
           </a:prstGeom>
+          <a:ln w="76200" cmpd="tri">
+            <a:solidFill>
+              <a:schemeClr val="tx1"/>
+            </a:solidFill>
+          </a:ln>
         </p:spPr>
         <p:style>
           <a:lnRef idx="1">
@@ -14414,10 +14273,10 @@
         </p:nvGrpSpPr>
         <p:grpSpPr>
           <a:xfrm>
-            <a:off x="4250268" y="2462066"/>
-            <a:ext cx="4680866" cy="1408661"/>
-            <a:chOff x="4250268" y="2462066"/>
-            <a:chExt cx="4680866" cy="1408661"/>
+            <a:off x="4551796" y="2381006"/>
+            <a:ext cx="4271244" cy="1422171"/>
+            <a:chOff x="4659890" y="2448556"/>
+            <a:chExt cx="4271244" cy="1422171"/>
           </a:xfrm>
         </p:grpSpPr>
         <p:sp>
@@ -14434,6 +14293,11 @@
             <a:prstGeom prst="rect">
               <a:avLst/>
             </a:prstGeom>
+            <a:ln w="76200" cmpd="tri">
+              <a:solidFill>
+                <a:schemeClr val="tx1"/>
+              </a:solidFill>
+            </a:ln>
           </p:spPr>
           <p:style>
             <a:lnRef idx="1">
@@ -14504,8 +14368,8 @@
           </p:nvCxnSpPr>
           <p:spPr>
             <a:xfrm rot="16200000" flipH="1">
-              <a:off x="5860001" y="852333"/>
-              <a:ext cx="883727" cy="4103193"/>
+              <a:off x="6058057" y="1050389"/>
+              <a:ext cx="897237" cy="3693572"/>
             </a:xfrm>
             <a:prstGeom prst="bentConnector3">
               <a:avLst/>
@@ -14538,10 +14402,10 @@
         </p:nvGrpSpPr>
         <p:grpSpPr>
           <a:xfrm>
-            <a:off x="1731928" y="2462067"/>
-            <a:ext cx="2518341" cy="1474933"/>
-            <a:chOff x="1681128" y="2462067"/>
-            <a:chExt cx="2518341" cy="1474933"/>
+            <a:off x="2075770" y="2381007"/>
+            <a:ext cx="2476025" cy="1400872"/>
+            <a:chOff x="1659752" y="2448562"/>
+            <a:chExt cx="3153264" cy="1400870"/>
           </a:xfrm>
         </p:grpSpPr>
         <p:sp>
@@ -14552,12 +14416,17 @@
           </p:nvSpPr>
           <p:spPr>
             <a:xfrm>
-              <a:off x="1681128" y="3345794"/>
-              <a:ext cx="1282205" cy="591206"/>
+              <a:off x="1659752" y="3324499"/>
+              <a:ext cx="1600402" cy="524933"/>
             </a:xfrm>
             <a:prstGeom prst="rect">
               <a:avLst/>
             </a:prstGeom>
+            <a:ln w="19050">
+              <a:solidFill>
+                <a:schemeClr val="tx1"/>
+              </a:solidFill>
+            </a:ln>
           </p:spPr>
           <p:style>
             <a:lnRef idx="1">
@@ -14612,8 +14481,8 @@
           </p:nvCxnSpPr>
           <p:spPr>
             <a:xfrm rot="5400000">
-              <a:off x="2818987" y="1965312"/>
-              <a:ext cx="883727" cy="1877237"/>
+              <a:off x="3198516" y="1709999"/>
+              <a:ext cx="875937" cy="2353063"/>
             </a:xfrm>
             <a:prstGeom prst="bentConnector3">
               <a:avLst>
@@ -14648,10 +14517,10 @@
         </p:nvGrpSpPr>
         <p:grpSpPr>
           <a:xfrm>
-            <a:off x="234172" y="2462068"/>
-            <a:ext cx="4016096" cy="2774416"/>
-            <a:chOff x="234172" y="2462068"/>
-            <a:chExt cx="4016096" cy="2774416"/>
+            <a:off x="369292" y="2381007"/>
+            <a:ext cx="4182503" cy="3252652"/>
+            <a:chOff x="234172" y="2448557"/>
+            <a:chExt cx="4182503" cy="3252652"/>
           </a:xfrm>
         </p:grpSpPr>
         <p:sp>
@@ -14668,6 +14537,12 @@
             <a:prstGeom prst="rect">
               <a:avLst/>
             </a:prstGeom>
+            <a:ln w="19050" cap="flat">
+              <a:solidFill>
+                <a:schemeClr val="tx1"/>
+              </a:solidFill>
+              <a:prstDash val="solid"/>
+            </a:ln>
           </p:spPr>
           <p:style>
             <a:lnRef idx="1">
@@ -14704,12 +14579,17 @@
           </p:nvSpPr>
           <p:spPr>
             <a:xfrm>
-              <a:off x="234173" y="4844171"/>
-              <a:ext cx="917294" cy="392313"/>
+              <a:off x="234173" y="5160810"/>
+              <a:ext cx="917294" cy="540399"/>
             </a:xfrm>
             <a:prstGeom prst="rect">
               <a:avLst/>
             </a:prstGeom>
+            <a:ln w="19050">
+              <a:solidFill>
+                <a:schemeClr val="tx1"/>
+              </a:solidFill>
+            </a:ln>
           </p:spPr>
           <p:style>
             <a:lnRef idx="1">
@@ -14769,12 +14649,18 @@
           </p:nvSpPr>
           <p:spPr>
             <a:xfrm>
-              <a:off x="234173" y="4103335"/>
-              <a:ext cx="917294" cy="452920"/>
+              <a:off x="234173" y="4184394"/>
+              <a:ext cx="917294" cy="544097"/>
             </a:xfrm>
             <a:prstGeom prst="rect">
               <a:avLst/>
             </a:prstGeom>
+            <a:ln w="19050">
+              <a:solidFill>
+                <a:schemeClr val="tx1"/>
+              </a:solidFill>
+              <a:prstDash val="solid"/>
+            </a:ln>
           </p:spPr>
           <p:style>
             <a:lnRef idx="1">
@@ -14797,8 +14683,9 @@
               <a:pPr algn="ctr"/>
               <a:r>
                 <a:rPr lang="en-US" sz="1200" dirty="0" smtClean="0"/>
-                <a:t>Program</a:t>
+                <a:t>Solution</a:t>
               </a:r>
+              <a:endParaRPr lang="en-US" sz="1200" dirty="0" smtClean="0"/>
             </a:p>
             <a:p>
               <a:pPr algn="ctr"/>
@@ -14837,8 +14724,8 @@
           </p:nvCxnSpPr>
           <p:spPr>
             <a:xfrm rot="5400000">
-              <a:off x="2092137" y="1166368"/>
-              <a:ext cx="862432" cy="3453831"/>
+              <a:off x="2168585" y="1076409"/>
+              <a:ext cx="875942" cy="3620238"/>
             </a:xfrm>
             <a:prstGeom prst="bentConnector3">
               <a:avLst>
@@ -14876,11 +14763,11 @@
           <p:spPr>
             <a:xfrm flipH="1">
               <a:off x="1151467" y="3586966"/>
-              <a:ext cx="207234" cy="1453362"/>
+              <a:ext cx="207234" cy="1844044"/>
             </a:xfrm>
             <a:prstGeom prst="bentConnector3">
               <a:avLst>
-                <a:gd name="adj1" fmla="val -61283"/>
+                <a:gd name="adj1" fmla="val -110310"/>
               </a:avLst>
             </a:prstGeom>
             <a:ln>
@@ -14914,551 +14801,11 @@
           <p:spPr>
             <a:xfrm flipH="1">
               <a:off x="1151467" y="3586966"/>
-              <a:ext cx="207234" cy="742829"/>
+              <a:ext cx="207234" cy="869477"/>
             </a:xfrm>
             <a:prstGeom prst="bentConnector3">
               <a:avLst>
-                <a:gd name="adj1" fmla="val -61283"/>
-              </a:avLst>
-            </a:prstGeom>
-            <a:ln>
-              <a:tailEnd type="arrow"/>
-            </a:ln>
-          </p:spPr>
-          <p:style>
-            <a:lnRef idx="2">
-              <a:schemeClr val="accent1"/>
-            </a:lnRef>
-            <a:fillRef idx="0">
-              <a:schemeClr val="accent1"/>
-            </a:fillRef>
-            <a:effectRef idx="1">
-              <a:schemeClr val="accent1"/>
-            </a:effectRef>
-            <a:fontRef idx="minor">
-              <a:schemeClr val="tx1"/>
-            </a:fontRef>
-          </p:style>
-        </p:cxnSp>
-      </p:grpSp>
-      <p:grpSp>
-        <p:nvGrpSpPr>
-          <p:cNvPr id="205" name="Group 204"/>
-          <p:cNvGrpSpPr/>
-          <p:nvPr/>
-        </p:nvGrpSpPr>
-        <p:grpSpPr>
-          <a:xfrm>
-            <a:off x="3378551" y="2462067"/>
-            <a:ext cx="1044437" cy="3413801"/>
-            <a:chOff x="3490311" y="2462067"/>
-            <a:chExt cx="1044437" cy="3413801"/>
-          </a:xfrm>
-        </p:grpSpPr>
-        <p:cxnSp>
-          <p:nvCxnSpPr>
-            <p:cNvPr id="18" name="Elbow Connector 17"/>
-            <p:cNvCxnSpPr>
-              <a:stCxn id="3" idx="2"/>
-              <a:endCxn id="8" idx="0"/>
-            </p:cNvCxnSpPr>
-            <p:nvPr/>
-          </p:nvCxnSpPr>
-          <p:spPr>
-            <a:xfrm rot="5400000">
-              <a:off x="3730175" y="2693622"/>
-              <a:ext cx="883728" cy="420618"/>
-            </a:xfrm>
-            <a:prstGeom prst="bentConnector3">
-              <a:avLst/>
-            </a:prstGeom>
-            <a:ln>
-              <a:tailEnd type="arrow"/>
-            </a:ln>
-          </p:spPr>
-          <p:style>
-            <a:lnRef idx="2">
-              <a:schemeClr val="accent1"/>
-            </a:lnRef>
-            <a:fillRef idx="0">
-              <a:schemeClr val="accent1"/>
-            </a:fillRef>
-            <a:effectRef idx="1">
-              <a:schemeClr val="accent1"/>
-            </a:effectRef>
-            <a:fontRef idx="minor">
-              <a:schemeClr val="tx1"/>
-            </a:fontRef>
-          </p:style>
-        </p:cxnSp>
-        <p:sp>
-          <p:nvSpPr>
-            <p:cNvPr id="8" name="Rectangle 7"/>
-            <p:cNvSpPr/>
-            <p:nvPr/>
-          </p:nvSpPr>
-          <p:spPr>
-            <a:xfrm>
-              <a:off x="3490312" y="3345795"/>
-              <a:ext cx="942835" cy="503638"/>
-            </a:xfrm>
-            <a:prstGeom prst="rect">
-              <a:avLst/>
-            </a:prstGeom>
-          </p:spPr>
-          <p:style>
-            <a:lnRef idx="1">
-              <a:schemeClr val="accent1"/>
-            </a:lnRef>
-            <a:fillRef idx="3">
-              <a:schemeClr val="accent1"/>
-            </a:fillRef>
-            <a:effectRef idx="2">
-              <a:schemeClr val="accent1"/>
-            </a:effectRef>
-            <a:fontRef idx="minor">
-              <a:schemeClr val="lt1"/>
-            </a:fontRef>
-          </p:style>
-          <p:txBody>
-            <a:bodyPr rtlCol="0" anchor="ctr"/>
-            <a:lstStyle/>
-            <a:p>
-              <a:pPr algn="ctr"/>
-              <a:r>
-                <a:rPr lang="en-US" sz="1200" dirty="0" smtClean="0"/>
-                <a:t>Scheduler</a:t>
-              </a:r>
-            </a:p>
-            <a:p>
-              <a:pPr algn="ctr"/>
-              <a:r>
-                <a:rPr lang="en-US" sz="1200" dirty="0" err="1">
-                  <a:solidFill>
-                    <a:srgbClr val="292934"/>
-                  </a:solidFill>
-                </a:rPr>
-                <a:t>s</a:t>
-              </a:r>
-              <a:r>
-                <a:rPr lang="en-US" sz="1200" dirty="0" err="1" smtClean="0">
-                  <a:solidFill>
-                    <a:srgbClr val="292934"/>
-                  </a:solidFill>
-                </a:rPr>
-                <a:t>ched.cpp</a:t>
-              </a:r>
-              <a:endParaRPr lang="en-US" sz="1200" dirty="0">
-                <a:solidFill>
-                  <a:srgbClr val="292934"/>
-                </a:solidFill>
-              </a:endParaRPr>
-            </a:p>
-          </p:txBody>
-        </p:sp>
-        <p:sp>
-          <p:nvSpPr>
-            <p:cNvPr id="62" name="Rectangle 61"/>
-            <p:cNvSpPr/>
-            <p:nvPr/>
-          </p:nvSpPr>
-          <p:spPr>
-            <a:xfrm>
-              <a:off x="3490311" y="4104527"/>
-              <a:ext cx="1044437" cy="451728"/>
-            </a:xfrm>
-            <a:prstGeom prst="rect">
-              <a:avLst/>
-            </a:prstGeom>
-          </p:spPr>
-          <p:style>
-            <a:lnRef idx="1">
-              <a:schemeClr val="accent1"/>
-            </a:lnRef>
-            <a:fillRef idx="3">
-              <a:schemeClr val="accent1"/>
-            </a:fillRef>
-            <a:effectRef idx="2">
-              <a:schemeClr val="accent1"/>
-            </a:effectRef>
-            <a:fontRef idx="minor">
-              <a:schemeClr val="lt1"/>
-            </a:fontRef>
-          </p:style>
-          <p:txBody>
-            <a:bodyPr rtlCol="0" anchor="ctr"/>
-            <a:lstStyle/>
-            <a:p>
-              <a:pPr algn="ctr"/>
-              <a:r>
-                <a:rPr lang="en-US" sz="1200" dirty="0" smtClean="0"/>
-                <a:t>Thread State Mgmt.</a:t>
-              </a:r>
-            </a:p>
-          </p:txBody>
-        </p:sp>
-        <p:sp>
-          <p:nvSpPr>
-            <p:cNvPr id="63" name="Rectangle 62"/>
-            <p:cNvSpPr/>
-            <p:nvPr/>
-          </p:nvSpPr>
-          <p:spPr>
-            <a:xfrm>
-              <a:off x="3490314" y="4844171"/>
-              <a:ext cx="1044433" cy="392313"/>
-            </a:xfrm>
-            <a:prstGeom prst="rect">
-              <a:avLst/>
-            </a:prstGeom>
-          </p:spPr>
-          <p:style>
-            <a:lnRef idx="1">
-              <a:schemeClr val="accent1"/>
-            </a:lnRef>
-            <a:fillRef idx="3">
-              <a:schemeClr val="accent1"/>
-            </a:fillRef>
-            <a:effectRef idx="2">
-              <a:schemeClr val="accent1"/>
-            </a:effectRef>
-            <a:fontRef idx="minor">
-              <a:schemeClr val="lt1"/>
-            </a:fontRef>
-          </p:style>
-          <p:txBody>
-            <a:bodyPr rtlCol="0" anchor="ctr"/>
-            <a:lstStyle/>
-            <a:p>
-              <a:pPr algn="ctr"/>
-              <a:r>
-                <a:rPr lang="en-US" sz="1200" dirty="0" smtClean="0"/>
-                <a:t>Lock </a:t>
-              </a:r>
-            </a:p>
-            <a:p>
-              <a:pPr algn="ctr"/>
-              <a:r>
-                <a:rPr lang="en-US" sz="1200" dirty="0" smtClean="0"/>
-                <a:t>State Mgmt.</a:t>
-              </a:r>
-            </a:p>
-          </p:txBody>
-        </p:sp>
-        <p:sp>
-          <p:nvSpPr>
-            <p:cNvPr id="64" name="Rectangle 63"/>
-            <p:cNvSpPr/>
-            <p:nvPr/>
-          </p:nvSpPr>
-          <p:spPr>
-            <a:xfrm>
-              <a:off x="3507248" y="5450708"/>
-              <a:ext cx="1027500" cy="425160"/>
-            </a:xfrm>
-            <a:prstGeom prst="rect">
-              <a:avLst/>
-            </a:prstGeom>
-          </p:spPr>
-          <p:style>
-            <a:lnRef idx="1">
-              <a:schemeClr val="accent1"/>
-            </a:lnRef>
-            <a:fillRef idx="3">
-              <a:schemeClr val="accent1"/>
-            </a:fillRef>
-            <a:effectRef idx="2">
-              <a:schemeClr val="accent1"/>
-            </a:effectRef>
-            <a:fontRef idx="minor">
-              <a:schemeClr val="lt1"/>
-            </a:fontRef>
-          </p:style>
-          <p:txBody>
-            <a:bodyPr rtlCol="0" anchor="ctr"/>
-            <a:lstStyle/>
-            <a:p>
-              <a:pPr algn="ctr"/>
-              <a:r>
-                <a:rPr lang="en-US" sz="1200" dirty="0" smtClean="0"/>
-                <a:t>Semaphore State Mgmt.</a:t>
-              </a:r>
-            </a:p>
-          </p:txBody>
-        </p:sp>
-        <p:cxnSp>
-          <p:nvCxnSpPr>
-            <p:cNvPr id="134" name="Elbow Connector 133"/>
-            <p:cNvCxnSpPr>
-              <a:stCxn id="8" idx="3"/>
-              <a:endCxn id="62" idx="3"/>
-            </p:cNvCxnSpPr>
-            <p:nvPr/>
-          </p:nvCxnSpPr>
-          <p:spPr>
-            <a:xfrm>
-              <a:off x="4433147" y="3597614"/>
-              <a:ext cx="101601" cy="732777"/>
-            </a:xfrm>
-            <a:prstGeom prst="bentConnector3">
-              <a:avLst>
-                <a:gd name="adj1" fmla="val 324998"/>
-              </a:avLst>
-            </a:prstGeom>
-            <a:ln>
-              <a:tailEnd type="arrow"/>
-            </a:ln>
-          </p:spPr>
-          <p:style>
-            <a:lnRef idx="2">
-              <a:schemeClr val="accent1"/>
-            </a:lnRef>
-            <a:fillRef idx="0">
-              <a:schemeClr val="accent1"/>
-            </a:fillRef>
-            <a:effectRef idx="1">
-              <a:schemeClr val="accent1"/>
-            </a:effectRef>
-            <a:fontRef idx="minor">
-              <a:schemeClr val="tx1"/>
-            </a:fontRef>
-          </p:style>
-        </p:cxnSp>
-        <p:cxnSp>
-          <p:nvCxnSpPr>
-            <p:cNvPr id="138" name="Elbow Connector 137"/>
-            <p:cNvCxnSpPr>
-              <a:stCxn id="8" idx="3"/>
-              <a:endCxn id="63" idx="3"/>
-            </p:cNvCxnSpPr>
-            <p:nvPr/>
-          </p:nvCxnSpPr>
-          <p:spPr>
-            <a:xfrm>
-              <a:off x="4433147" y="3597614"/>
-              <a:ext cx="101600" cy="1442714"/>
-            </a:xfrm>
-            <a:prstGeom prst="bentConnector3">
-              <a:avLst>
-                <a:gd name="adj1" fmla="val 325000"/>
-              </a:avLst>
-            </a:prstGeom>
-            <a:ln>
-              <a:tailEnd type="arrow"/>
-            </a:ln>
-          </p:spPr>
-          <p:style>
-            <a:lnRef idx="2">
-              <a:schemeClr val="accent1"/>
-            </a:lnRef>
-            <a:fillRef idx="0">
-              <a:schemeClr val="accent1"/>
-            </a:fillRef>
-            <a:effectRef idx="1">
-              <a:schemeClr val="accent1"/>
-            </a:effectRef>
-            <a:fontRef idx="minor">
-              <a:schemeClr val="tx1"/>
-            </a:fontRef>
-          </p:style>
-        </p:cxnSp>
-        <p:cxnSp>
-          <p:nvCxnSpPr>
-            <p:cNvPr id="141" name="Elbow Connector 140"/>
-            <p:cNvCxnSpPr>
-              <a:stCxn id="8" idx="3"/>
-              <a:endCxn id="64" idx="3"/>
-            </p:cNvCxnSpPr>
-            <p:nvPr/>
-          </p:nvCxnSpPr>
-          <p:spPr>
-            <a:xfrm>
-              <a:off x="4433147" y="3597614"/>
-              <a:ext cx="101601" cy="2065674"/>
-            </a:xfrm>
-            <a:prstGeom prst="bentConnector3">
-              <a:avLst>
-                <a:gd name="adj1" fmla="val 321665"/>
-              </a:avLst>
-            </a:prstGeom>
-            <a:ln>
-              <a:tailEnd type="arrow"/>
-            </a:ln>
-          </p:spPr>
-          <p:style>
-            <a:lnRef idx="2">
-              <a:schemeClr val="accent1"/>
-            </a:lnRef>
-            <a:fillRef idx="0">
-              <a:schemeClr val="accent1"/>
-            </a:fillRef>
-            <a:effectRef idx="1">
-              <a:schemeClr val="accent1"/>
-            </a:effectRef>
-            <a:fontRef idx="minor">
-              <a:schemeClr val="tx1"/>
-            </a:fontRef>
-          </p:style>
-        </p:cxnSp>
-      </p:grpSp>
-      <p:grpSp>
-        <p:nvGrpSpPr>
-          <p:cNvPr id="206" name="Group 205"/>
-          <p:cNvGrpSpPr/>
-          <p:nvPr/>
-        </p:nvGrpSpPr>
-        <p:grpSpPr>
-          <a:xfrm>
-            <a:off x="4250267" y="2462067"/>
-            <a:ext cx="1583779" cy="2048856"/>
-            <a:chOff x="4443307" y="2462067"/>
-            <a:chExt cx="1583779" cy="2048856"/>
-          </a:xfrm>
-        </p:grpSpPr>
-        <p:cxnSp>
-          <p:nvCxnSpPr>
-            <p:cNvPr id="170" name="Elbow Connector 169"/>
-            <p:cNvCxnSpPr>
-              <a:stCxn id="3" idx="2"/>
-              <a:endCxn id="61" idx="0"/>
-            </p:cNvCxnSpPr>
-            <p:nvPr/>
-          </p:nvCxnSpPr>
-          <p:spPr>
-            <a:xfrm rot="16200000" flipH="1">
-              <a:off x="4568891" y="2336483"/>
-              <a:ext cx="883728" cy="1134895"/>
-            </a:xfrm>
-            <a:prstGeom prst="bentConnector3">
-              <a:avLst>
-                <a:gd name="adj1" fmla="val 50000"/>
-              </a:avLst>
-            </a:prstGeom>
-            <a:ln>
-              <a:tailEnd type="arrow"/>
-            </a:ln>
-          </p:spPr>
-          <p:style>
-            <a:lnRef idx="2">
-              <a:schemeClr val="accent1"/>
-            </a:lnRef>
-            <a:fillRef idx="0">
-              <a:schemeClr val="accent1"/>
-            </a:fillRef>
-            <a:effectRef idx="1">
-              <a:schemeClr val="accent1"/>
-            </a:effectRef>
-            <a:fontRef idx="minor">
-              <a:schemeClr val="tx1"/>
-            </a:fontRef>
-          </p:style>
-        </p:cxnSp>
-        <p:sp>
-          <p:nvSpPr>
-            <p:cNvPr id="61" name="Rectangle 60"/>
-            <p:cNvSpPr/>
-            <p:nvPr/>
-          </p:nvSpPr>
-          <p:spPr>
-            <a:xfrm>
-              <a:off x="5142020" y="3345795"/>
-              <a:ext cx="872366" cy="503637"/>
-            </a:xfrm>
-            <a:prstGeom prst="rect">
-              <a:avLst/>
-            </a:prstGeom>
-          </p:spPr>
-          <p:style>
-            <a:lnRef idx="1">
-              <a:schemeClr val="accent1"/>
-            </a:lnRef>
-            <a:fillRef idx="3">
-              <a:schemeClr val="accent1"/>
-            </a:fillRef>
-            <a:effectRef idx="2">
-              <a:schemeClr val="accent1"/>
-            </a:effectRef>
-            <a:fontRef idx="minor">
-              <a:schemeClr val="lt1"/>
-            </a:fontRef>
-          </p:style>
-          <p:txBody>
-            <a:bodyPr rtlCol="0" anchor="ctr"/>
-            <a:lstStyle/>
-            <a:p>
-              <a:pPr algn="ctr"/>
-              <a:r>
-                <a:rPr lang="en-US" sz="1200" dirty="0" smtClean="0"/>
-                <a:t>Error Detection</a:t>
-              </a:r>
-            </a:p>
-          </p:txBody>
-        </p:sp>
-        <p:sp>
-          <p:nvSpPr>
-            <p:cNvPr id="83" name="Rectangle 82"/>
-            <p:cNvSpPr/>
-            <p:nvPr/>
-          </p:nvSpPr>
-          <p:spPr>
-            <a:xfrm>
-              <a:off x="5142020" y="4104527"/>
-              <a:ext cx="872366" cy="406396"/>
-            </a:xfrm>
-            <a:prstGeom prst="rect">
-              <a:avLst/>
-            </a:prstGeom>
-          </p:spPr>
-          <p:style>
-            <a:lnRef idx="1">
-              <a:schemeClr val="accent1"/>
-            </a:lnRef>
-            <a:fillRef idx="3">
-              <a:schemeClr val="accent1"/>
-            </a:fillRef>
-            <a:effectRef idx="2">
-              <a:schemeClr val="accent1"/>
-            </a:effectRef>
-            <a:fontRef idx="minor">
-              <a:schemeClr val="lt1"/>
-            </a:fontRef>
-          </p:style>
-          <p:txBody>
-            <a:bodyPr rtlCol="0" anchor="ctr"/>
-            <a:lstStyle/>
-            <a:p>
-              <a:pPr algn="ctr"/>
-              <a:r>
-                <a:rPr lang="en-US" sz="1200" dirty="0" smtClean="0"/>
-                <a:t>Deadlock</a:t>
-              </a:r>
-            </a:p>
-            <a:p>
-              <a:pPr algn="ctr"/>
-              <a:r>
-                <a:rPr lang="en-US" sz="1200" dirty="0" smtClean="0"/>
-                <a:t>Detection</a:t>
-              </a:r>
-            </a:p>
-          </p:txBody>
-        </p:sp>
-        <p:cxnSp>
-          <p:nvCxnSpPr>
-            <p:cNvPr id="175" name="Elbow Connector 174"/>
-            <p:cNvCxnSpPr>
-              <a:stCxn id="61" idx="3"/>
-              <a:endCxn id="83" idx="3"/>
-            </p:cNvCxnSpPr>
-            <p:nvPr/>
-          </p:nvCxnSpPr>
-          <p:spPr>
-            <a:xfrm>
-              <a:off x="6014386" y="3597614"/>
-              <a:ext cx="12700" cy="710111"/>
-            </a:xfrm>
-            <a:prstGeom prst="bentConnector3">
-              <a:avLst>
-                <a:gd name="adj1" fmla="val 1800000"/>
+                <a:gd name="adj1" fmla="val -110310"/>
               </a:avLst>
             </a:prstGeom>
             <a:ln>
@@ -15489,10 +14836,10 @@
         </p:nvGrpSpPr>
         <p:grpSpPr>
           <a:xfrm>
-            <a:off x="4250268" y="2462066"/>
-            <a:ext cx="3080418" cy="2048858"/>
-            <a:chOff x="4351868" y="2462066"/>
-            <a:chExt cx="3080418" cy="2048858"/>
+            <a:off x="4551795" y="2381006"/>
+            <a:ext cx="2238700" cy="2463092"/>
+            <a:chOff x="5193586" y="2450720"/>
+            <a:chExt cx="2238700" cy="2463092"/>
           </a:xfrm>
         </p:grpSpPr>
         <p:cxnSp>
@@ -15506,8 +14853,8 @@
           </p:nvCxnSpPr>
           <p:spPr>
             <a:xfrm rot="16200000" flipH="1">
-              <a:off x="5223668" y="1590266"/>
-              <a:ext cx="883729" cy="2627329"/>
+              <a:off x="5638854" y="2005452"/>
+              <a:ext cx="895075" cy="1785611"/>
             </a:xfrm>
             <a:prstGeom prst="bentConnector3">
               <a:avLst>
@@ -15547,6 +14894,11 @@
             <a:prstGeom prst="rect">
               <a:avLst/>
             </a:prstGeom>
+            <a:ln w="76200" cmpd="tri">
+              <a:solidFill>
+                <a:schemeClr val="tx1"/>
+              </a:solidFill>
+            </a:ln>
           </p:spPr>
           <p:style>
             <a:lnRef idx="1">
@@ -15606,12 +14958,17 @@
           </p:nvSpPr>
           <p:spPr>
             <a:xfrm>
-              <a:off x="6526107" y="4104528"/>
-              <a:ext cx="856870" cy="406396"/>
+              <a:off x="6526107" y="4212608"/>
+              <a:ext cx="856870" cy="701204"/>
             </a:xfrm>
             <a:prstGeom prst="rect">
               <a:avLst/>
             </a:prstGeom>
+            <a:ln w="76200" cmpd="tri">
+              <a:solidFill>
+                <a:schemeClr val="tx1"/>
+              </a:solidFill>
+            </a:ln>
           </p:spPr>
           <p:style>
             <a:lnRef idx="1">
@@ -15675,7 +15032,7 @@
           <p:spPr>
             <a:xfrm flipH="1">
               <a:off x="7382977" y="3597615"/>
-              <a:ext cx="49309" cy="710111"/>
+              <a:ext cx="49309" cy="965595"/>
             </a:xfrm>
             <a:prstGeom prst="bentConnector3">
               <a:avLst>
@@ -15726,10 +15083,405 @@
           </a:p>
         </p:txBody>
       </p:sp>
+      <p:grpSp>
+        <p:nvGrpSpPr>
+          <p:cNvPr id="88" name="Group 87"/>
+          <p:cNvGrpSpPr/>
+          <p:nvPr/>
+        </p:nvGrpSpPr>
+        <p:grpSpPr>
+          <a:xfrm>
+            <a:off x="3980761" y="2381007"/>
+            <a:ext cx="1155348" cy="3347222"/>
+            <a:chOff x="4305049" y="2448557"/>
+            <a:chExt cx="1155348" cy="3347222"/>
+          </a:xfrm>
+        </p:grpSpPr>
+        <p:sp>
+          <p:nvSpPr>
+            <p:cNvPr id="8" name="Rectangle 7"/>
+            <p:cNvSpPr/>
+            <p:nvPr/>
+          </p:nvSpPr>
+          <p:spPr>
+            <a:xfrm>
+              <a:off x="4305049" y="3324499"/>
+              <a:ext cx="1142648" cy="524933"/>
+            </a:xfrm>
+            <a:prstGeom prst="rect">
+              <a:avLst/>
+            </a:prstGeom>
+            <a:ln w="76200" cmpd="tri">
+              <a:solidFill>
+                <a:schemeClr val="tx1"/>
+              </a:solidFill>
+              <a:prstDash val="solid"/>
+            </a:ln>
+          </p:spPr>
+          <p:style>
+            <a:lnRef idx="1">
+              <a:schemeClr val="accent1"/>
+            </a:lnRef>
+            <a:fillRef idx="3">
+              <a:schemeClr val="accent1"/>
+            </a:fillRef>
+            <a:effectRef idx="2">
+              <a:schemeClr val="accent1"/>
+            </a:effectRef>
+            <a:fontRef idx="minor">
+              <a:schemeClr val="lt1"/>
+            </a:fontRef>
+          </p:style>
+          <p:txBody>
+            <a:bodyPr rtlCol="0" anchor="ctr"/>
+            <a:lstStyle/>
+            <a:p>
+              <a:pPr algn="ctr"/>
+              <a:r>
+                <a:rPr lang="en-US" sz="1200" dirty="0" smtClean="0"/>
+                <a:t>Scheduler</a:t>
+              </a:r>
+            </a:p>
+            <a:p>
+              <a:pPr algn="ctr"/>
+              <a:r>
+                <a:rPr lang="en-US" sz="1200" dirty="0" err="1">
+                  <a:solidFill>
+                    <a:srgbClr val="292934"/>
+                  </a:solidFill>
+                </a:rPr>
+                <a:t>s</a:t>
+              </a:r>
+              <a:r>
+                <a:rPr lang="en-US" sz="1200" dirty="0" err="1" smtClean="0">
+                  <a:solidFill>
+                    <a:srgbClr val="292934"/>
+                  </a:solidFill>
+                </a:rPr>
+                <a:t>ched.cpp</a:t>
+              </a:r>
+              <a:endParaRPr lang="en-US" sz="1200" dirty="0">
+                <a:solidFill>
+                  <a:srgbClr val="292934"/>
+                </a:solidFill>
+              </a:endParaRPr>
+            </a:p>
+          </p:txBody>
+        </p:sp>
+        <p:sp>
+          <p:nvSpPr>
+            <p:cNvPr id="62" name="Rectangle 61"/>
+            <p:cNvSpPr/>
+            <p:nvPr/>
+          </p:nvSpPr>
+          <p:spPr>
+            <a:xfrm>
+              <a:off x="4305049" y="4196286"/>
+              <a:ext cx="1142648" cy="715362"/>
+            </a:xfrm>
+            <a:prstGeom prst="rect">
+              <a:avLst/>
+            </a:prstGeom>
+            <a:ln w="76200" cmpd="tri">
+              <a:solidFill>
+                <a:schemeClr val="tx1"/>
+              </a:solidFill>
+            </a:ln>
+          </p:spPr>
+          <p:style>
+            <a:lnRef idx="1">
+              <a:schemeClr val="accent1"/>
+            </a:lnRef>
+            <a:fillRef idx="3">
+              <a:schemeClr val="accent1"/>
+            </a:fillRef>
+            <a:effectRef idx="2">
+              <a:schemeClr val="accent1"/>
+            </a:effectRef>
+            <a:fontRef idx="minor">
+              <a:schemeClr val="lt1"/>
+            </a:fontRef>
+          </p:style>
+          <p:txBody>
+            <a:bodyPr rtlCol="0" anchor="ctr"/>
+            <a:lstStyle/>
+            <a:p>
+              <a:pPr algn="ctr"/>
+              <a:r>
+                <a:rPr lang="en-US" sz="1200" dirty="0" smtClean="0"/>
+                <a:t>Thread, Lock, &amp; Semaphore Management</a:t>
+              </a:r>
+              <a:endParaRPr lang="en-US" sz="1200" dirty="0" smtClean="0"/>
+            </a:p>
+          </p:txBody>
+        </p:sp>
+        <p:cxnSp>
+          <p:nvCxnSpPr>
+            <p:cNvPr id="134" name="Elbow Connector 133"/>
+            <p:cNvCxnSpPr>
+              <a:stCxn id="8" idx="3"/>
+              <a:endCxn id="62" idx="3"/>
+            </p:cNvCxnSpPr>
+            <p:nvPr/>
+          </p:nvCxnSpPr>
+          <p:spPr>
+            <a:xfrm>
+              <a:off x="5447697" y="3586966"/>
+              <a:ext cx="12700" cy="967001"/>
+            </a:xfrm>
+            <a:prstGeom prst="bentConnector3">
+              <a:avLst>
+                <a:gd name="adj1" fmla="val 1800000"/>
+              </a:avLst>
+            </a:prstGeom>
+            <a:ln>
+              <a:tailEnd type="arrow"/>
+            </a:ln>
+          </p:spPr>
+          <p:style>
+            <a:lnRef idx="2">
+              <a:schemeClr val="accent1"/>
+            </a:lnRef>
+            <a:fillRef idx="0">
+              <a:schemeClr val="accent1"/>
+            </a:fillRef>
+            <a:effectRef idx="1">
+              <a:schemeClr val="accent1"/>
+            </a:effectRef>
+            <a:fontRef idx="minor">
+              <a:schemeClr val="tx1"/>
+            </a:fontRef>
+          </p:style>
+        </p:cxnSp>
+        <p:sp>
+          <p:nvSpPr>
+            <p:cNvPr id="83" name="Rectangle 82"/>
+            <p:cNvSpPr/>
+            <p:nvPr/>
+          </p:nvSpPr>
+          <p:spPr>
+            <a:xfrm>
+              <a:off x="4305049" y="5258936"/>
+              <a:ext cx="1142648" cy="536843"/>
+            </a:xfrm>
+            <a:prstGeom prst="rect">
+              <a:avLst/>
+            </a:prstGeom>
+            <a:ln w="76200" cmpd="tri">
+              <a:solidFill>
+                <a:schemeClr val="tx1"/>
+              </a:solidFill>
+            </a:ln>
+          </p:spPr>
+          <p:style>
+            <a:lnRef idx="1">
+              <a:schemeClr val="accent1"/>
+            </a:lnRef>
+            <a:fillRef idx="3">
+              <a:schemeClr val="accent1"/>
+            </a:fillRef>
+            <a:effectRef idx="2">
+              <a:schemeClr val="accent1"/>
+            </a:effectRef>
+            <a:fontRef idx="minor">
+              <a:schemeClr val="lt1"/>
+            </a:fontRef>
+          </p:style>
+          <p:txBody>
+            <a:bodyPr rtlCol="0" anchor="ctr"/>
+            <a:lstStyle/>
+            <a:p>
+              <a:pPr algn="ctr"/>
+              <a:r>
+                <a:rPr lang="en-US" sz="1200" dirty="0" smtClean="0"/>
+                <a:t>Deadlock</a:t>
+              </a:r>
+            </a:p>
+            <a:p>
+              <a:pPr algn="ctr"/>
+              <a:r>
+                <a:rPr lang="en-US" sz="1200" dirty="0" smtClean="0"/>
+                <a:t>Detection</a:t>
+              </a:r>
+            </a:p>
+          </p:txBody>
+        </p:sp>
+        <p:cxnSp>
+          <p:nvCxnSpPr>
+            <p:cNvPr id="175" name="Elbow Connector 174"/>
+            <p:cNvCxnSpPr>
+              <a:stCxn id="8" idx="3"/>
+              <a:endCxn id="83" idx="3"/>
+            </p:cNvCxnSpPr>
+            <p:nvPr/>
+          </p:nvCxnSpPr>
+          <p:spPr>
+            <a:xfrm>
+              <a:off x="5447697" y="3586966"/>
+              <a:ext cx="12700" cy="1940392"/>
+            </a:xfrm>
+            <a:prstGeom prst="bentConnector3">
+              <a:avLst>
+                <a:gd name="adj1" fmla="val 1800000"/>
+              </a:avLst>
+            </a:prstGeom>
+            <a:ln>
+              <a:tailEnd type="arrow"/>
+            </a:ln>
+          </p:spPr>
+          <p:style>
+            <a:lnRef idx="2">
+              <a:schemeClr val="accent1"/>
+            </a:lnRef>
+            <a:fillRef idx="0">
+              <a:schemeClr val="accent1"/>
+            </a:fillRef>
+            <a:effectRef idx="1">
+              <a:schemeClr val="accent1"/>
+            </a:effectRef>
+            <a:fontRef idx="minor">
+              <a:schemeClr val="tx1"/>
+            </a:fontRef>
+          </p:style>
+        </p:cxnSp>
+        <p:cxnSp>
+          <p:nvCxnSpPr>
+            <p:cNvPr id="99" name="Elbow Connector 98"/>
+            <p:cNvCxnSpPr>
+              <a:stCxn id="3" idx="2"/>
+              <a:endCxn id="8" idx="0"/>
+            </p:cNvCxnSpPr>
+            <p:nvPr/>
+          </p:nvCxnSpPr>
+          <p:spPr>
+            <a:xfrm rot="16200000" flipH="1">
+              <a:off x="4438257" y="2886383"/>
+              <a:ext cx="875942" cy="290"/>
+            </a:xfrm>
+            <a:prstGeom prst="bentConnector3">
+              <a:avLst>
+                <a:gd name="adj1" fmla="val 50000"/>
+              </a:avLst>
+            </a:prstGeom>
+            <a:ln>
+              <a:tailEnd type="arrow"/>
+            </a:ln>
+          </p:spPr>
+          <p:style>
+            <a:lnRef idx="2">
+              <a:schemeClr val="accent1"/>
+            </a:lnRef>
+            <a:fillRef idx="0">
+              <a:schemeClr val="accent1"/>
+            </a:fillRef>
+            <a:effectRef idx="1">
+              <a:schemeClr val="accent1"/>
+            </a:effectRef>
+            <a:fontRef idx="minor">
+              <a:schemeClr val="tx1"/>
+            </a:fontRef>
+          </p:style>
+        </p:cxnSp>
+      </p:grpSp>
+      <p:sp>
+        <p:nvSpPr>
+          <p:cNvPr id="142" name="Rectangle 141"/>
+          <p:cNvSpPr/>
+          <p:nvPr/>
+        </p:nvSpPr>
+        <p:spPr>
+          <a:xfrm>
+            <a:off x="5769469" y="6147038"/>
+            <a:ext cx="1284897" cy="497653"/>
+          </a:xfrm>
+          <a:prstGeom prst="rect">
+            <a:avLst/>
+          </a:prstGeom>
+          <a:ln w="19050" cap="flat">
+            <a:solidFill>
+              <a:schemeClr val="tx1"/>
+            </a:solidFill>
+            <a:prstDash val="solid"/>
+          </a:ln>
+        </p:spPr>
+        <p:style>
+          <a:lnRef idx="1">
+            <a:schemeClr val="accent1"/>
+          </a:lnRef>
+          <a:fillRef idx="3">
+            <a:schemeClr val="accent1"/>
+          </a:fillRef>
+          <a:effectRef idx="2">
+            <a:schemeClr val="accent1"/>
+          </a:effectRef>
+          <a:fontRef idx="minor">
+            <a:schemeClr val="lt1"/>
+          </a:fontRef>
+        </p:style>
+        <p:txBody>
+          <a:bodyPr rtlCol="0" anchor="ctr"/>
+          <a:lstStyle/>
+          <a:p>
+            <a:pPr algn="ctr"/>
+            <a:r>
+              <a:rPr lang="en-US" sz="1200" dirty="0" smtClean="0"/>
+              <a:t>Existing Component</a:t>
+            </a:r>
+            <a:endParaRPr lang="en-US" sz="1200" dirty="0"/>
+          </a:p>
+        </p:txBody>
+      </p:sp>
+      <p:sp>
+        <p:nvSpPr>
+          <p:cNvPr id="150" name="Rectangle 149"/>
+          <p:cNvSpPr/>
+          <p:nvPr/>
+        </p:nvSpPr>
+        <p:spPr>
+          <a:xfrm>
+            <a:off x="7401819" y="6147038"/>
+            <a:ext cx="1421221" cy="470763"/>
+          </a:xfrm>
+          <a:prstGeom prst="rect">
+            <a:avLst/>
+          </a:prstGeom>
+          <a:ln w="76200" cmpd="tri">
+            <a:solidFill>
+              <a:schemeClr val="tx1"/>
+            </a:solidFill>
+          </a:ln>
+        </p:spPr>
+        <p:style>
+          <a:lnRef idx="1">
+            <a:schemeClr val="accent1"/>
+          </a:lnRef>
+          <a:fillRef idx="3">
+            <a:schemeClr val="accent1"/>
+          </a:fillRef>
+          <a:effectRef idx="2">
+            <a:schemeClr val="accent1"/>
+          </a:effectRef>
+          <a:fontRef idx="minor">
+            <a:schemeClr val="lt1"/>
+          </a:fontRef>
+        </p:style>
+        <p:txBody>
+          <a:bodyPr rtlCol="0" anchor="ctr"/>
+          <a:lstStyle/>
+          <a:p>
+            <a:pPr algn="ctr"/>
+            <a:r>
+              <a:rPr lang="en-US" sz="1200" dirty="0" smtClean="0"/>
+              <a:t>New Component</a:t>
+            </a:r>
+            <a:endParaRPr lang="en-US" sz="1200" dirty="0" smtClean="0"/>
+          </a:p>
+        </p:txBody>
+      </p:sp>
     </p:spTree>
     <p:extLst>
       <p:ext uri="{BB962C8B-B14F-4D97-AF65-F5344CB8AC3E}">
-        <p14:creationId xmlns:p14="http://schemas.microsoft.com/office/powerpoint/2010/main" val="204694368"/>
+        <p14:creationId xmlns:p14="http://schemas.microsoft.com/office/powerpoint/2010/main" val="3430522964"/>
       </p:ext>
     </p:extLst>
   </p:cSld>
@@ -15860,7 +15612,7 @@
                                           </p:stCondLst>
                                         </p:cTn>
                                         <p:tgtEl>
-                                          <p:spTgt spid="205"/>
+                                          <p:spTgt spid="88"/>
                                         </p:tgtEl>
                                         <p:attrNameLst>
                                           <p:attrName>style.visibility</p:attrName>
@@ -15905,7 +15657,7 @@
                                           </p:stCondLst>
                                         </p:cTn>
                                         <p:tgtEl>
-                                          <p:spTgt spid="206"/>
+                                          <p:spTgt spid="207"/>
                                         </p:tgtEl>
                                         <p:attrNameLst>
                                           <p:attrName>style.visibility</p:attrName>
@@ -15945,51 +15697,6 @@
                                     <p:set>
                                       <p:cBhvr>
                                         <p:cTn id="22" dur="1" fill="hold">
-                                          <p:stCondLst>
-                                            <p:cond delay="0"/>
-                                          </p:stCondLst>
-                                        </p:cTn>
-                                        <p:tgtEl>
-                                          <p:spTgt spid="207"/>
-                                        </p:tgtEl>
-                                        <p:attrNameLst>
-                                          <p:attrName>style.visibility</p:attrName>
-                                        </p:attrNameLst>
-                                      </p:cBhvr>
-                                      <p:to>
-                                        <p:strVal val="visible"/>
-                                      </p:to>
-                                    </p:set>
-                                  </p:childTnLst>
-                                </p:cTn>
-                              </p:par>
-                            </p:childTnLst>
-                          </p:cTn>
-                        </p:par>
-                      </p:childTnLst>
-                    </p:cTn>
-                  </p:par>
-                  <p:par>
-                    <p:cTn id="23" fill="hold">
-                      <p:stCondLst>
-                        <p:cond delay="indefinite"/>
-                      </p:stCondLst>
-                      <p:childTnLst>
-                        <p:par>
-                          <p:cTn id="24" fill="hold">
-                            <p:stCondLst>
-                              <p:cond delay="0"/>
-                            </p:stCondLst>
-                            <p:childTnLst>
-                              <p:par>
-                                <p:cTn id="25" presetID="1" presetClass="entr" presetSubtype="0" fill="hold" nodeType="clickEffect">
-                                  <p:stCondLst>
-                                    <p:cond delay="0"/>
-                                  </p:stCondLst>
-                                  <p:childTnLst>
-                                    <p:set>
-                                      <p:cBhvr>
-                                        <p:cTn id="26" dur="1" fill="hold">
                                           <p:stCondLst>
                                             <p:cond delay="0"/>
                                           </p:stCondLst>
@@ -19092,11 +18799,7 @@
           <a:p>
             <a:r>
               <a:rPr lang="en-US" dirty="0" smtClean="0"/>
-              <a:t>Scheduler – </a:t>
-            </a:r>
-            <a:r>
-              <a:rPr lang="en-US" dirty="0" smtClean="0"/>
-              <a:t>Key Features</a:t>
+              <a:t>Scheduler – Key Features</a:t>
             </a:r>
             <a:endParaRPr lang="en-US" dirty="0"/>
           </a:p>
@@ -19123,7 +18826,6 @@
               <a:rPr lang="en-US" dirty="0" smtClean="0"/>
               <a:t>Only permits one thread to run at a time.  All other threads are forced to wait for a signal before proceeding. </a:t>
             </a:r>
-            <a:endParaRPr lang="en-US" dirty="0" smtClean="0"/>
           </a:p>
           <a:p>
             <a:r>
@@ -19144,14 +18846,12 @@
               <a:rPr lang="en-US" dirty="0" smtClean="0"/>
               <a:t>Interactive:  more controlled debugging experience &amp; instructor demo</a:t>
             </a:r>
-            <a:endParaRPr lang="en-US" dirty="0" smtClean="0"/>
           </a:p>
           <a:p>
             <a:r>
               <a:rPr lang="en-US" dirty="0" smtClean="0"/>
               <a:t>API (equivalent to POSIX lock and semaphore functions)</a:t>
             </a:r>
-            <a:endParaRPr lang="en-US" dirty="0" smtClean="0"/>
           </a:p>
           <a:p>
             <a:pPr lvl="1"/>

</xml_diff>

<commit_message>
Completed presentation and report.
</commit_message>
<xml_diff>
--- a/Documents/Concur_Presentation.pptx
+++ b/Documents/Concur_Presentation.pptx
@@ -5,7 +5,7 @@
     <p:sldMasterId id="2147483960" r:id="rId1"/>
   </p:sldMasterIdLst>
   <p:notesMasterIdLst>
-    <p:notesMasterId r:id="rId24"/>
+    <p:notesMasterId r:id="rId29"/>
   </p:notesMasterIdLst>
   <p:sldIdLst>
     <p:sldId id="256" r:id="rId2"/>
@@ -26,10 +26,15 @@
     <p:sldId id="264" r:id="rId17"/>
     <p:sldId id="265" r:id="rId18"/>
     <p:sldId id="274" r:id="rId19"/>
-    <p:sldId id="276" r:id="rId20"/>
-    <p:sldId id="277" r:id="rId21"/>
-    <p:sldId id="285" r:id="rId22"/>
-    <p:sldId id="289" r:id="rId23"/>
+    <p:sldId id="292" r:id="rId20"/>
+    <p:sldId id="293" r:id="rId21"/>
+    <p:sldId id="294" r:id="rId22"/>
+    <p:sldId id="295" r:id="rId23"/>
+    <p:sldId id="296" r:id="rId24"/>
+    <p:sldId id="276" r:id="rId25"/>
+    <p:sldId id="277" r:id="rId26"/>
+    <p:sldId id="285" r:id="rId27"/>
+    <p:sldId id="289" r:id="rId28"/>
   </p:sldIdLst>
   <p:sldSz cx="9144000" cy="6858000" type="screen4x3"/>
   <p:notesSz cx="6858000" cy="9144000"/>
@@ -213,7 +218,7 @@
           <a:p>
             <a:fld id="{BE2663A9-2618-6649-B6E3-2D33878C5258}" type="datetimeFigureOut">
               <a:rPr lang="en-US" smtClean="0"/>
-              <a:t>6/7/12</a:t>
+              <a:t>6/8/12</a:t>
             </a:fld>
             <a:endParaRPr lang="en-US"/>
           </a:p>
@@ -609,7 +614,7 @@
           <a:bodyPr/>
           <a:lstStyle/>
           <a:p>
-            <a:endParaRPr lang="en-US" dirty="0"/>
+            <a:endParaRPr lang="en-US"/>
           </a:p>
         </p:txBody>
       </p:sp>
@@ -630,7 +635,7 @@
           <a:p>
             <a:fld id="{7CBFEC62-47D8-AA45-80EB-A84698F32C4E}" type="slidenum">
               <a:rPr lang="en-US" smtClean="0"/>
-              <a:t>13</a:t>
+              <a:t>10</a:t>
             </a:fld>
             <a:endParaRPr lang="en-US"/>
           </a:p>
@@ -639,7 +644,7 @@
     </p:spTree>
     <p:extLst>
       <p:ext uri="{BB962C8B-B14F-4D97-AF65-F5344CB8AC3E}">
-        <p14:creationId xmlns:p14="http://schemas.microsoft.com/office/powerpoint/2010/main" val="81884851"/>
+        <p14:creationId xmlns:p14="http://schemas.microsoft.com/office/powerpoint/2010/main" val="3579507155"/>
       </p:ext>
     </p:extLst>
   </p:cSld>
@@ -714,7 +719,7 @@
           <a:p>
             <a:fld id="{7CBFEC62-47D8-AA45-80EB-A84698F32C4E}" type="slidenum">
               <a:rPr lang="en-US" smtClean="0"/>
-              <a:t>19</a:t>
+              <a:t>11</a:t>
             </a:fld>
             <a:endParaRPr lang="en-US"/>
           </a:p>
@@ -723,7 +728,7 @@
     </p:spTree>
     <p:extLst>
       <p:ext uri="{BB962C8B-B14F-4D97-AF65-F5344CB8AC3E}">
-        <p14:creationId xmlns:p14="http://schemas.microsoft.com/office/powerpoint/2010/main" val="1871693178"/>
+        <p14:creationId xmlns:p14="http://schemas.microsoft.com/office/powerpoint/2010/main" val="3648962323"/>
       </p:ext>
     </p:extLst>
   </p:cSld>
@@ -777,7 +782,7 @@
           <a:bodyPr/>
           <a:lstStyle/>
           <a:p>
-            <a:endParaRPr lang="en-US" dirty="0"/>
+            <a:endParaRPr lang="en-US"/>
           </a:p>
         </p:txBody>
       </p:sp>
@@ -798,7 +803,595 @@
           <a:p>
             <a:fld id="{7CBFEC62-47D8-AA45-80EB-A84698F32C4E}" type="slidenum">
               <a:rPr lang="en-US" smtClean="0"/>
-              <a:t>20</a:t>
+              <a:t>12</a:t>
+            </a:fld>
+            <a:endParaRPr lang="en-US"/>
+          </a:p>
+        </p:txBody>
+      </p:sp>
+    </p:spTree>
+    <p:extLst>
+      <p:ext uri="{BB962C8B-B14F-4D97-AF65-F5344CB8AC3E}">
+        <p14:creationId xmlns:p14="http://schemas.microsoft.com/office/powerpoint/2010/main" val="4123846564"/>
+      </p:ext>
+    </p:extLst>
+  </p:cSld>
+  <p:clrMapOvr>
+    <a:masterClrMapping/>
+  </p:clrMapOvr>
+</p:notes>
+</file>
+
+<file path=ppt/notesSlides/notesSlide13.xml><?xml version="1.0" encoding="utf-8"?>
+<p:notes xmlns:a="http://schemas.openxmlformats.org/drawingml/2006/main" xmlns:r="http://schemas.openxmlformats.org/officeDocument/2006/relationships" xmlns:p="http://schemas.openxmlformats.org/presentationml/2006/main">
+  <p:cSld>
+    <p:spTree>
+      <p:nvGrpSpPr>
+        <p:cNvPr id="1" name=""/>
+        <p:cNvGrpSpPr/>
+        <p:nvPr/>
+      </p:nvGrpSpPr>
+      <p:grpSpPr>
+        <a:xfrm>
+          <a:off x="0" y="0"/>
+          <a:ext cx="0" cy="0"/>
+          <a:chOff x="0" y="0"/>
+          <a:chExt cx="0" cy="0"/>
+        </a:xfrm>
+      </p:grpSpPr>
+      <p:sp>
+        <p:nvSpPr>
+          <p:cNvPr id="2" name="Slide Image Placeholder 1"/>
+          <p:cNvSpPr>
+            <a:spLocks noGrp="1" noRot="1" noChangeAspect="1"/>
+          </p:cNvSpPr>
+          <p:nvPr>
+            <p:ph type="sldImg"/>
+          </p:nvPr>
+        </p:nvSpPr>
+        <p:spPr/>
+      </p:sp>
+      <p:sp>
+        <p:nvSpPr>
+          <p:cNvPr id="3" name="Notes Placeholder 2"/>
+          <p:cNvSpPr>
+            <a:spLocks noGrp="1"/>
+          </p:cNvSpPr>
+          <p:nvPr>
+            <p:ph type="body" idx="1"/>
+          </p:nvPr>
+        </p:nvSpPr>
+        <p:spPr/>
+        <p:txBody>
+          <a:bodyPr/>
+          <a:lstStyle/>
+          <a:p>
+            <a:endParaRPr lang="en-US" dirty="0"/>
+          </a:p>
+        </p:txBody>
+      </p:sp>
+      <p:sp>
+        <p:nvSpPr>
+          <p:cNvPr id="4" name="Slide Number Placeholder 3"/>
+          <p:cNvSpPr>
+            <a:spLocks noGrp="1"/>
+          </p:cNvSpPr>
+          <p:nvPr>
+            <p:ph type="sldNum" sz="quarter" idx="10"/>
+          </p:nvPr>
+        </p:nvSpPr>
+        <p:spPr/>
+        <p:txBody>
+          <a:bodyPr/>
+          <a:lstStyle/>
+          <a:p>
+            <a:fld id="{7CBFEC62-47D8-AA45-80EB-A84698F32C4E}" type="slidenum">
+              <a:rPr lang="en-US" smtClean="0"/>
+              <a:t>13</a:t>
+            </a:fld>
+            <a:endParaRPr lang="en-US"/>
+          </a:p>
+        </p:txBody>
+      </p:sp>
+    </p:spTree>
+    <p:extLst>
+      <p:ext uri="{BB962C8B-B14F-4D97-AF65-F5344CB8AC3E}">
+        <p14:creationId xmlns:p14="http://schemas.microsoft.com/office/powerpoint/2010/main" val="81884851"/>
+      </p:ext>
+    </p:extLst>
+  </p:cSld>
+  <p:clrMapOvr>
+    <a:masterClrMapping/>
+  </p:clrMapOvr>
+</p:notes>
+</file>
+
+<file path=ppt/notesSlides/notesSlide14.xml><?xml version="1.0" encoding="utf-8"?>
+<p:notes xmlns:a="http://schemas.openxmlformats.org/drawingml/2006/main" xmlns:r="http://schemas.openxmlformats.org/officeDocument/2006/relationships" xmlns:p="http://schemas.openxmlformats.org/presentationml/2006/main">
+  <p:cSld>
+    <p:spTree>
+      <p:nvGrpSpPr>
+        <p:cNvPr id="1" name=""/>
+        <p:cNvGrpSpPr/>
+        <p:nvPr/>
+      </p:nvGrpSpPr>
+      <p:grpSpPr>
+        <a:xfrm>
+          <a:off x="0" y="0"/>
+          <a:ext cx="0" cy="0"/>
+          <a:chOff x="0" y="0"/>
+          <a:chExt cx="0" cy="0"/>
+        </a:xfrm>
+      </p:grpSpPr>
+      <p:sp>
+        <p:nvSpPr>
+          <p:cNvPr id="2" name="Slide Image Placeholder 1"/>
+          <p:cNvSpPr>
+            <a:spLocks noGrp="1" noRot="1" noChangeAspect="1"/>
+          </p:cNvSpPr>
+          <p:nvPr>
+            <p:ph type="sldImg"/>
+          </p:nvPr>
+        </p:nvSpPr>
+        <p:spPr/>
+      </p:sp>
+      <p:sp>
+        <p:nvSpPr>
+          <p:cNvPr id="3" name="Notes Placeholder 2"/>
+          <p:cNvSpPr>
+            <a:spLocks noGrp="1"/>
+          </p:cNvSpPr>
+          <p:nvPr>
+            <p:ph type="body" idx="1"/>
+          </p:nvPr>
+        </p:nvSpPr>
+        <p:spPr/>
+        <p:txBody>
+          <a:bodyPr/>
+          <a:lstStyle/>
+          <a:p>
+            <a:endParaRPr lang="en-US"/>
+          </a:p>
+        </p:txBody>
+      </p:sp>
+      <p:sp>
+        <p:nvSpPr>
+          <p:cNvPr id="4" name="Slide Number Placeholder 3"/>
+          <p:cNvSpPr>
+            <a:spLocks noGrp="1"/>
+          </p:cNvSpPr>
+          <p:nvPr>
+            <p:ph type="sldNum" sz="quarter" idx="10"/>
+          </p:nvPr>
+        </p:nvSpPr>
+        <p:spPr/>
+        <p:txBody>
+          <a:bodyPr/>
+          <a:lstStyle/>
+          <a:p>
+            <a:fld id="{7CBFEC62-47D8-AA45-80EB-A84698F32C4E}" type="slidenum">
+              <a:rPr lang="en-US" smtClean="0"/>
+              <a:t>14</a:t>
+            </a:fld>
+            <a:endParaRPr lang="en-US"/>
+          </a:p>
+        </p:txBody>
+      </p:sp>
+    </p:spTree>
+    <p:extLst>
+      <p:ext uri="{BB962C8B-B14F-4D97-AF65-F5344CB8AC3E}">
+        <p14:creationId xmlns:p14="http://schemas.microsoft.com/office/powerpoint/2010/main" val="1391299391"/>
+      </p:ext>
+    </p:extLst>
+  </p:cSld>
+  <p:clrMapOvr>
+    <a:masterClrMapping/>
+  </p:clrMapOvr>
+</p:notes>
+</file>
+
+<file path=ppt/notesSlides/notesSlide15.xml><?xml version="1.0" encoding="utf-8"?>
+<p:notes xmlns:a="http://schemas.openxmlformats.org/drawingml/2006/main" xmlns:r="http://schemas.openxmlformats.org/officeDocument/2006/relationships" xmlns:p="http://schemas.openxmlformats.org/presentationml/2006/main">
+  <p:cSld>
+    <p:spTree>
+      <p:nvGrpSpPr>
+        <p:cNvPr id="1" name=""/>
+        <p:cNvGrpSpPr/>
+        <p:nvPr/>
+      </p:nvGrpSpPr>
+      <p:grpSpPr>
+        <a:xfrm>
+          <a:off x="0" y="0"/>
+          <a:ext cx="0" cy="0"/>
+          <a:chOff x="0" y="0"/>
+          <a:chExt cx="0" cy="0"/>
+        </a:xfrm>
+      </p:grpSpPr>
+      <p:sp>
+        <p:nvSpPr>
+          <p:cNvPr id="2" name="Slide Image Placeholder 1"/>
+          <p:cNvSpPr>
+            <a:spLocks noGrp="1" noRot="1" noChangeAspect="1"/>
+          </p:cNvSpPr>
+          <p:nvPr>
+            <p:ph type="sldImg"/>
+          </p:nvPr>
+        </p:nvSpPr>
+        <p:spPr/>
+      </p:sp>
+      <p:sp>
+        <p:nvSpPr>
+          <p:cNvPr id="3" name="Notes Placeholder 2"/>
+          <p:cNvSpPr>
+            <a:spLocks noGrp="1"/>
+          </p:cNvSpPr>
+          <p:nvPr>
+            <p:ph type="body" idx="1"/>
+          </p:nvPr>
+        </p:nvSpPr>
+        <p:spPr/>
+        <p:txBody>
+          <a:bodyPr/>
+          <a:lstStyle/>
+          <a:p>
+            <a:endParaRPr lang="en-US"/>
+          </a:p>
+        </p:txBody>
+      </p:sp>
+      <p:sp>
+        <p:nvSpPr>
+          <p:cNvPr id="4" name="Slide Number Placeholder 3"/>
+          <p:cNvSpPr>
+            <a:spLocks noGrp="1"/>
+          </p:cNvSpPr>
+          <p:nvPr>
+            <p:ph type="sldNum" sz="quarter" idx="10"/>
+          </p:nvPr>
+        </p:nvSpPr>
+        <p:spPr/>
+        <p:txBody>
+          <a:bodyPr/>
+          <a:lstStyle/>
+          <a:p>
+            <a:fld id="{7CBFEC62-47D8-AA45-80EB-A84698F32C4E}" type="slidenum">
+              <a:rPr lang="en-US" smtClean="0"/>
+              <a:t>15</a:t>
+            </a:fld>
+            <a:endParaRPr lang="en-US"/>
+          </a:p>
+        </p:txBody>
+      </p:sp>
+    </p:spTree>
+    <p:extLst>
+      <p:ext uri="{BB962C8B-B14F-4D97-AF65-F5344CB8AC3E}">
+        <p14:creationId xmlns:p14="http://schemas.microsoft.com/office/powerpoint/2010/main" val="4205471989"/>
+      </p:ext>
+    </p:extLst>
+  </p:cSld>
+  <p:clrMapOvr>
+    <a:masterClrMapping/>
+  </p:clrMapOvr>
+</p:notes>
+</file>
+
+<file path=ppt/notesSlides/notesSlide16.xml><?xml version="1.0" encoding="utf-8"?>
+<p:notes xmlns:a="http://schemas.openxmlformats.org/drawingml/2006/main" xmlns:r="http://schemas.openxmlformats.org/officeDocument/2006/relationships" xmlns:p="http://schemas.openxmlformats.org/presentationml/2006/main">
+  <p:cSld>
+    <p:spTree>
+      <p:nvGrpSpPr>
+        <p:cNvPr id="1" name=""/>
+        <p:cNvGrpSpPr/>
+        <p:nvPr/>
+      </p:nvGrpSpPr>
+      <p:grpSpPr>
+        <a:xfrm>
+          <a:off x="0" y="0"/>
+          <a:ext cx="0" cy="0"/>
+          <a:chOff x="0" y="0"/>
+          <a:chExt cx="0" cy="0"/>
+        </a:xfrm>
+      </p:grpSpPr>
+      <p:sp>
+        <p:nvSpPr>
+          <p:cNvPr id="2" name="Slide Image Placeholder 1"/>
+          <p:cNvSpPr>
+            <a:spLocks noGrp="1" noRot="1" noChangeAspect="1"/>
+          </p:cNvSpPr>
+          <p:nvPr>
+            <p:ph type="sldImg"/>
+          </p:nvPr>
+        </p:nvSpPr>
+        <p:spPr/>
+      </p:sp>
+      <p:sp>
+        <p:nvSpPr>
+          <p:cNvPr id="3" name="Notes Placeholder 2"/>
+          <p:cNvSpPr>
+            <a:spLocks noGrp="1"/>
+          </p:cNvSpPr>
+          <p:nvPr>
+            <p:ph type="body" idx="1"/>
+          </p:nvPr>
+        </p:nvSpPr>
+        <p:spPr/>
+        <p:txBody>
+          <a:bodyPr/>
+          <a:lstStyle/>
+          <a:p>
+            <a:endParaRPr lang="en-US"/>
+          </a:p>
+        </p:txBody>
+      </p:sp>
+      <p:sp>
+        <p:nvSpPr>
+          <p:cNvPr id="4" name="Slide Number Placeholder 3"/>
+          <p:cNvSpPr>
+            <a:spLocks noGrp="1"/>
+          </p:cNvSpPr>
+          <p:nvPr>
+            <p:ph type="sldNum" sz="quarter" idx="10"/>
+          </p:nvPr>
+        </p:nvSpPr>
+        <p:spPr/>
+        <p:txBody>
+          <a:bodyPr/>
+          <a:lstStyle/>
+          <a:p>
+            <a:fld id="{7CBFEC62-47D8-AA45-80EB-A84698F32C4E}" type="slidenum">
+              <a:rPr lang="en-US" smtClean="0"/>
+              <a:t>16</a:t>
+            </a:fld>
+            <a:endParaRPr lang="en-US"/>
+          </a:p>
+        </p:txBody>
+      </p:sp>
+    </p:spTree>
+    <p:extLst>
+      <p:ext uri="{BB962C8B-B14F-4D97-AF65-F5344CB8AC3E}">
+        <p14:creationId xmlns:p14="http://schemas.microsoft.com/office/powerpoint/2010/main" val="3332888419"/>
+      </p:ext>
+    </p:extLst>
+  </p:cSld>
+  <p:clrMapOvr>
+    <a:masterClrMapping/>
+  </p:clrMapOvr>
+</p:notes>
+</file>
+
+<file path=ppt/notesSlides/notesSlide17.xml><?xml version="1.0" encoding="utf-8"?>
+<p:notes xmlns:a="http://schemas.openxmlformats.org/drawingml/2006/main" xmlns:r="http://schemas.openxmlformats.org/officeDocument/2006/relationships" xmlns:p="http://schemas.openxmlformats.org/presentationml/2006/main">
+  <p:cSld>
+    <p:spTree>
+      <p:nvGrpSpPr>
+        <p:cNvPr id="1" name=""/>
+        <p:cNvGrpSpPr/>
+        <p:nvPr/>
+      </p:nvGrpSpPr>
+      <p:grpSpPr>
+        <a:xfrm>
+          <a:off x="0" y="0"/>
+          <a:ext cx="0" cy="0"/>
+          <a:chOff x="0" y="0"/>
+          <a:chExt cx="0" cy="0"/>
+        </a:xfrm>
+      </p:grpSpPr>
+      <p:sp>
+        <p:nvSpPr>
+          <p:cNvPr id="2" name="Slide Image Placeholder 1"/>
+          <p:cNvSpPr>
+            <a:spLocks noGrp="1" noRot="1" noChangeAspect="1"/>
+          </p:cNvSpPr>
+          <p:nvPr>
+            <p:ph type="sldImg"/>
+          </p:nvPr>
+        </p:nvSpPr>
+        <p:spPr/>
+      </p:sp>
+      <p:sp>
+        <p:nvSpPr>
+          <p:cNvPr id="3" name="Notes Placeholder 2"/>
+          <p:cNvSpPr>
+            <a:spLocks noGrp="1"/>
+          </p:cNvSpPr>
+          <p:nvPr>
+            <p:ph type="body" idx="1"/>
+          </p:nvPr>
+        </p:nvSpPr>
+        <p:spPr/>
+        <p:txBody>
+          <a:bodyPr/>
+          <a:lstStyle/>
+          <a:p>
+            <a:endParaRPr lang="en-US"/>
+          </a:p>
+        </p:txBody>
+      </p:sp>
+      <p:sp>
+        <p:nvSpPr>
+          <p:cNvPr id="4" name="Slide Number Placeholder 3"/>
+          <p:cNvSpPr>
+            <a:spLocks noGrp="1"/>
+          </p:cNvSpPr>
+          <p:nvPr>
+            <p:ph type="sldNum" sz="quarter" idx="10"/>
+          </p:nvPr>
+        </p:nvSpPr>
+        <p:spPr/>
+        <p:txBody>
+          <a:bodyPr/>
+          <a:lstStyle/>
+          <a:p>
+            <a:fld id="{7CBFEC62-47D8-AA45-80EB-A84698F32C4E}" type="slidenum">
+              <a:rPr lang="en-US" smtClean="0"/>
+              <a:t>17</a:t>
+            </a:fld>
+            <a:endParaRPr lang="en-US"/>
+          </a:p>
+        </p:txBody>
+      </p:sp>
+    </p:spTree>
+    <p:extLst>
+      <p:ext uri="{BB962C8B-B14F-4D97-AF65-F5344CB8AC3E}">
+        <p14:creationId xmlns:p14="http://schemas.microsoft.com/office/powerpoint/2010/main" val="2808635347"/>
+      </p:ext>
+    </p:extLst>
+  </p:cSld>
+  <p:clrMapOvr>
+    <a:masterClrMapping/>
+  </p:clrMapOvr>
+</p:notes>
+</file>
+
+<file path=ppt/notesSlides/notesSlide18.xml><?xml version="1.0" encoding="utf-8"?>
+<p:notes xmlns:a="http://schemas.openxmlformats.org/drawingml/2006/main" xmlns:r="http://schemas.openxmlformats.org/officeDocument/2006/relationships" xmlns:p="http://schemas.openxmlformats.org/presentationml/2006/main">
+  <p:cSld>
+    <p:spTree>
+      <p:nvGrpSpPr>
+        <p:cNvPr id="1" name=""/>
+        <p:cNvGrpSpPr/>
+        <p:nvPr/>
+      </p:nvGrpSpPr>
+      <p:grpSpPr>
+        <a:xfrm>
+          <a:off x="0" y="0"/>
+          <a:ext cx="0" cy="0"/>
+          <a:chOff x="0" y="0"/>
+          <a:chExt cx="0" cy="0"/>
+        </a:xfrm>
+      </p:grpSpPr>
+      <p:sp>
+        <p:nvSpPr>
+          <p:cNvPr id="2" name="Slide Image Placeholder 1"/>
+          <p:cNvSpPr>
+            <a:spLocks noGrp="1" noRot="1" noChangeAspect="1"/>
+          </p:cNvSpPr>
+          <p:nvPr>
+            <p:ph type="sldImg"/>
+          </p:nvPr>
+        </p:nvSpPr>
+        <p:spPr/>
+      </p:sp>
+      <p:sp>
+        <p:nvSpPr>
+          <p:cNvPr id="3" name="Notes Placeholder 2"/>
+          <p:cNvSpPr>
+            <a:spLocks noGrp="1"/>
+          </p:cNvSpPr>
+          <p:nvPr>
+            <p:ph type="body" idx="1"/>
+          </p:nvPr>
+        </p:nvSpPr>
+        <p:spPr/>
+        <p:txBody>
+          <a:bodyPr/>
+          <a:lstStyle/>
+          <a:p>
+            <a:endParaRPr lang="en-US"/>
+          </a:p>
+        </p:txBody>
+      </p:sp>
+      <p:sp>
+        <p:nvSpPr>
+          <p:cNvPr id="4" name="Slide Number Placeholder 3"/>
+          <p:cNvSpPr>
+            <a:spLocks noGrp="1"/>
+          </p:cNvSpPr>
+          <p:nvPr>
+            <p:ph type="sldNum" sz="quarter" idx="10"/>
+          </p:nvPr>
+        </p:nvSpPr>
+        <p:spPr/>
+        <p:txBody>
+          <a:bodyPr/>
+          <a:lstStyle/>
+          <a:p>
+            <a:fld id="{7CBFEC62-47D8-AA45-80EB-A84698F32C4E}" type="slidenum">
+              <a:rPr lang="en-US" smtClean="0"/>
+              <a:t>18</a:t>
+            </a:fld>
+            <a:endParaRPr lang="en-US"/>
+          </a:p>
+        </p:txBody>
+      </p:sp>
+    </p:spTree>
+    <p:extLst>
+      <p:ext uri="{BB962C8B-B14F-4D97-AF65-F5344CB8AC3E}">
+        <p14:creationId xmlns:p14="http://schemas.microsoft.com/office/powerpoint/2010/main" val="3972454365"/>
+      </p:ext>
+    </p:extLst>
+  </p:cSld>
+  <p:clrMapOvr>
+    <a:masterClrMapping/>
+  </p:clrMapOvr>
+</p:notes>
+</file>
+
+<file path=ppt/notesSlides/notesSlide19.xml><?xml version="1.0" encoding="utf-8"?>
+<p:notes xmlns:a="http://schemas.openxmlformats.org/drawingml/2006/main" xmlns:r="http://schemas.openxmlformats.org/officeDocument/2006/relationships" xmlns:p="http://schemas.openxmlformats.org/presentationml/2006/main">
+  <p:cSld>
+    <p:spTree>
+      <p:nvGrpSpPr>
+        <p:cNvPr id="1" name=""/>
+        <p:cNvGrpSpPr/>
+        <p:nvPr/>
+      </p:nvGrpSpPr>
+      <p:grpSpPr>
+        <a:xfrm>
+          <a:off x="0" y="0"/>
+          <a:ext cx="0" cy="0"/>
+          <a:chOff x="0" y="0"/>
+          <a:chExt cx="0" cy="0"/>
+        </a:xfrm>
+      </p:grpSpPr>
+      <p:sp>
+        <p:nvSpPr>
+          <p:cNvPr id="2" name="Slide Image Placeholder 1"/>
+          <p:cNvSpPr>
+            <a:spLocks noGrp="1" noRot="1" noChangeAspect="1"/>
+          </p:cNvSpPr>
+          <p:nvPr>
+            <p:ph type="sldImg"/>
+          </p:nvPr>
+        </p:nvSpPr>
+        <p:spPr/>
+      </p:sp>
+      <p:sp>
+        <p:nvSpPr>
+          <p:cNvPr id="3" name="Notes Placeholder 2"/>
+          <p:cNvSpPr>
+            <a:spLocks noGrp="1"/>
+          </p:cNvSpPr>
+          <p:nvPr>
+            <p:ph type="body" idx="1"/>
+          </p:nvPr>
+        </p:nvSpPr>
+        <p:spPr/>
+        <p:txBody>
+          <a:bodyPr/>
+          <a:lstStyle/>
+          <a:p>
+            <a:endParaRPr lang="en-US" dirty="0"/>
+          </a:p>
+        </p:txBody>
+      </p:sp>
+      <p:sp>
+        <p:nvSpPr>
+          <p:cNvPr id="4" name="Slide Number Placeholder 3"/>
+          <p:cNvSpPr>
+            <a:spLocks noGrp="1"/>
+          </p:cNvSpPr>
+          <p:nvPr>
+            <p:ph type="sldNum" sz="quarter" idx="10"/>
+          </p:nvPr>
+        </p:nvSpPr>
+        <p:spPr/>
+        <p:txBody>
+          <a:bodyPr/>
+          <a:lstStyle/>
+          <a:p>
+            <a:fld id="{7CBFEC62-47D8-AA45-80EB-A84698F32C4E}" type="slidenum">
+              <a:rPr lang="en-US" smtClean="0"/>
+              <a:t>24</a:t>
             </a:fld>
             <a:endParaRPr lang="en-US"/>
           </a:p>
@@ -861,7 +1454,7 @@
           <a:bodyPr/>
           <a:lstStyle/>
           <a:p>
-            <a:endParaRPr lang="en-US" dirty="0" smtClean="0"/>
+            <a:endParaRPr lang="en-US"/>
           </a:p>
         </p:txBody>
       </p:sp>
@@ -882,7 +1475,7 @@
           <a:p>
             <a:fld id="{7CBFEC62-47D8-AA45-80EB-A84698F32C4E}" type="slidenum">
               <a:rPr lang="en-US" smtClean="0"/>
-              <a:t>3</a:t>
+              <a:t>2</a:t>
             </a:fld>
             <a:endParaRPr lang="en-US"/>
           </a:p>
@@ -891,7 +1484,259 @@
     </p:spTree>
     <p:extLst>
       <p:ext uri="{BB962C8B-B14F-4D97-AF65-F5344CB8AC3E}">
-        <p14:creationId xmlns:p14="http://schemas.microsoft.com/office/powerpoint/2010/main" val="2503873888"/>
+        <p14:creationId xmlns:p14="http://schemas.microsoft.com/office/powerpoint/2010/main" val="1333008855"/>
+      </p:ext>
+    </p:extLst>
+  </p:cSld>
+  <p:clrMapOvr>
+    <a:masterClrMapping/>
+  </p:clrMapOvr>
+</p:notes>
+</file>
+
+<file path=ppt/notesSlides/notesSlide20.xml><?xml version="1.0" encoding="utf-8"?>
+<p:notes xmlns:a="http://schemas.openxmlformats.org/drawingml/2006/main" xmlns:r="http://schemas.openxmlformats.org/officeDocument/2006/relationships" xmlns:p="http://schemas.openxmlformats.org/presentationml/2006/main">
+  <p:cSld>
+    <p:spTree>
+      <p:nvGrpSpPr>
+        <p:cNvPr id="1" name=""/>
+        <p:cNvGrpSpPr/>
+        <p:nvPr/>
+      </p:nvGrpSpPr>
+      <p:grpSpPr>
+        <a:xfrm>
+          <a:off x="0" y="0"/>
+          <a:ext cx="0" cy="0"/>
+          <a:chOff x="0" y="0"/>
+          <a:chExt cx="0" cy="0"/>
+        </a:xfrm>
+      </p:grpSpPr>
+      <p:sp>
+        <p:nvSpPr>
+          <p:cNvPr id="2" name="Slide Image Placeholder 1"/>
+          <p:cNvSpPr>
+            <a:spLocks noGrp="1" noRot="1" noChangeAspect="1"/>
+          </p:cNvSpPr>
+          <p:nvPr>
+            <p:ph type="sldImg"/>
+          </p:nvPr>
+        </p:nvSpPr>
+        <p:spPr/>
+      </p:sp>
+      <p:sp>
+        <p:nvSpPr>
+          <p:cNvPr id="3" name="Notes Placeholder 2"/>
+          <p:cNvSpPr>
+            <a:spLocks noGrp="1"/>
+          </p:cNvSpPr>
+          <p:nvPr>
+            <p:ph type="body" idx="1"/>
+          </p:nvPr>
+        </p:nvSpPr>
+        <p:spPr/>
+        <p:txBody>
+          <a:bodyPr/>
+          <a:lstStyle/>
+          <a:p>
+            <a:endParaRPr lang="en-US" dirty="0"/>
+          </a:p>
+        </p:txBody>
+      </p:sp>
+      <p:sp>
+        <p:nvSpPr>
+          <p:cNvPr id="4" name="Slide Number Placeholder 3"/>
+          <p:cNvSpPr>
+            <a:spLocks noGrp="1"/>
+          </p:cNvSpPr>
+          <p:nvPr>
+            <p:ph type="sldNum" sz="quarter" idx="10"/>
+          </p:nvPr>
+        </p:nvSpPr>
+        <p:spPr/>
+        <p:txBody>
+          <a:bodyPr/>
+          <a:lstStyle/>
+          <a:p>
+            <a:fld id="{7CBFEC62-47D8-AA45-80EB-A84698F32C4E}" type="slidenum">
+              <a:rPr lang="en-US" smtClean="0"/>
+              <a:t>25</a:t>
+            </a:fld>
+            <a:endParaRPr lang="en-US"/>
+          </a:p>
+        </p:txBody>
+      </p:sp>
+    </p:spTree>
+    <p:extLst>
+      <p:ext uri="{BB962C8B-B14F-4D97-AF65-F5344CB8AC3E}">
+        <p14:creationId xmlns:p14="http://schemas.microsoft.com/office/powerpoint/2010/main" val="1871693178"/>
+      </p:ext>
+    </p:extLst>
+  </p:cSld>
+  <p:clrMapOvr>
+    <a:masterClrMapping/>
+  </p:clrMapOvr>
+</p:notes>
+</file>
+
+<file path=ppt/notesSlides/notesSlide21.xml><?xml version="1.0" encoding="utf-8"?>
+<p:notes xmlns:a="http://schemas.openxmlformats.org/drawingml/2006/main" xmlns:r="http://schemas.openxmlformats.org/officeDocument/2006/relationships" xmlns:p="http://schemas.openxmlformats.org/presentationml/2006/main">
+  <p:cSld>
+    <p:spTree>
+      <p:nvGrpSpPr>
+        <p:cNvPr id="1" name=""/>
+        <p:cNvGrpSpPr/>
+        <p:nvPr/>
+      </p:nvGrpSpPr>
+      <p:grpSpPr>
+        <a:xfrm>
+          <a:off x="0" y="0"/>
+          <a:ext cx="0" cy="0"/>
+          <a:chOff x="0" y="0"/>
+          <a:chExt cx="0" cy="0"/>
+        </a:xfrm>
+      </p:grpSpPr>
+      <p:sp>
+        <p:nvSpPr>
+          <p:cNvPr id="2" name="Slide Image Placeholder 1"/>
+          <p:cNvSpPr>
+            <a:spLocks noGrp="1" noRot="1" noChangeAspect="1"/>
+          </p:cNvSpPr>
+          <p:nvPr>
+            <p:ph type="sldImg"/>
+          </p:nvPr>
+        </p:nvSpPr>
+        <p:spPr/>
+      </p:sp>
+      <p:sp>
+        <p:nvSpPr>
+          <p:cNvPr id="3" name="Notes Placeholder 2"/>
+          <p:cNvSpPr>
+            <a:spLocks noGrp="1"/>
+          </p:cNvSpPr>
+          <p:nvPr>
+            <p:ph type="body" idx="1"/>
+          </p:nvPr>
+        </p:nvSpPr>
+        <p:spPr/>
+        <p:txBody>
+          <a:bodyPr/>
+          <a:lstStyle/>
+          <a:p>
+            <a:endParaRPr lang="en-US"/>
+          </a:p>
+        </p:txBody>
+      </p:sp>
+      <p:sp>
+        <p:nvSpPr>
+          <p:cNvPr id="4" name="Slide Number Placeholder 3"/>
+          <p:cNvSpPr>
+            <a:spLocks noGrp="1"/>
+          </p:cNvSpPr>
+          <p:nvPr>
+            <p:ph type="sldNum" sz="quarter" idx="10"/>
+          </p:nvPr>
+        </p:nvSpPr>
+        <p:spPr/>
+        <p:txBody>
+          <a:bodyPr/>
+          <a:lstStyle/>
+          <a:p>
+            <a:fld id="{7CBFEC62-47D8-AA45-80EB-A84698F32C4E}" type="slidenum">
+              <a:rPr lang="en-US" smtClean="0"/>
+              <a:t>26</a:t>
+            </a:fld>
+            <a:endParaRPr lang="en-US"/>
+          </a:p>
+        </p:txBody>
+      </p:sp>
+    </p:spTree>
+    <p:extLst>
+      <p:ext uri="{BB962C8B-B14F-4D97-AF65-F5344CB8AC3E}">
+        <p14:creationId xmlns:p14="http://schemas.microsoft.com/office/powerpoint/2010/main" val="70059172"/>
+      </p:ext>
+    </p:extLst>
+  </p:cSld>
+  <p:clrMapOvr>
+    <a:masterClrMapping/>
+  </p:clrMapOvr>
+</p:notes>
+</file>
+
+<file path=ppt/notesSlides/notesSlide22.xml><?xml version="1.0" encoding="utf-8"?>
+<p:notes xmlns:a="http://schemas.openxmlformats.org/drawingml/2006/main" xmlns:r="http://schemas.openxmlformats.org/officeDocument/2006/relationships" xmlns:p="http://schemas.openxmlformats.org/presentationml/2006/main">
+  <p:cSld>
+    <p:spTree>
+      <p:nvGrpSpPr>
+        <p:cNvPr id="1" name=""/>
+        <p:cNvGrpSpPr/>
+        <p:nvPr/>
+      </p:nvGrpSpPr>
+      <p:grpSpPr>
+        <a:xfrm>
+          <a:off x="0" y="0"/>
+          <a:ext cx="0" cy="0"/>
+          <a:chOff x="0" y="0"/>
+          <a:chExt cx="0" cy="0"/>
+        </a:xfrm>
+      </p:grpSpPr>
+      <p:sp>
+        <p:nvSpPr>
+          <p:cNvPr id="2" name="Slide Image Placeholder 1"/>
+          <p:cNvSpPr>
+            <a:spLocks noGrp="1" noRot="1" noChangeAspect="1"/>
+          </p:cNvSpPr>
+          <p:nvPr>
+            <p:ph type="sldImg"/>
+          </p:nvPr>
+        </p:nvSpPr>
+        <p:spPr/>
+      </p:sp>
+      <p:sp>
+        <p:nvSpPr>
+          <p:cNvPr id="3" name="Notes Placeholder 2"/>
+          <p:cNvSpPr>
+            <a:spLocks noGrp="1"/>
+          </p:cNvSpPr>
+          <p:nvPr>
+            <p:ph type="body" idx="1"/>
+          </p:nvPr>
+        </p:nvSpPr>
+        <p:spPr/>
+        <p:txBody>
+          <a:bodyPr/>
+          <a:lstStyle/>
+          <a:p>
+            <a:endParaRPr lang="en-US"/>
+          </a:p>
+        </p:txBody>
+      </p:sp>
+      <p:sp>
+        <p:nvSpPr>
+          <p:cNvPr id="4" name="Slide Number Placeholder 3"/>
+          <p:cNvSpPr>
+            <a:spLocks noGrp="1"/>
+          </p:cNvSpPr>
+          <p:nvPr>
+            <p:ph type="sldNum" sz="quarter" idx="10"/>
+          </p:nvPr>
+        </p:nvSpPr>
+        <p:spPr/>
+        <p:txBody>
+          <a:bodyPr/>
+          <a:lstStyle/>
+          <a:p>
+            <a:fld id="{7CBFEC62-47D8-AA45-80EB-A84698F32C4E}" type="slidenum">
+              <a:rPr lang="en-US" smtClean="0"/>
+              <a:t>27</a:t>
+            </a:fld>
+            <a:endParaRPr lang="en-US"/>
+          </a:p>
+        </p:txBody>
+      </p:sp>
+    </p:spTree>
+    <p:extLst>
+      <p:ext uri="{BB962C8B-B14F-4D97-AF65-F5344CB8AC3E}">
+        <p14:creationId xmlns:p14="http://schemas.microsoft.com/office/powerpoint/2010/main" val="3884893395"/>
       </p:ext>
     </p:extLst>
   </p:cSld>
@@ -945,31 +1790,7 @@
           <a:bodyPr/>
           <a:lstStyle/>
           <a:p>
-            <a:r>
-              <a:rPr lang="en-US" dirty="0" smtClean="0"/>
-              <a:t>emphasize:  </a:t>
-            </a:r>
-          </a:p>
-          <a:p>
-            <a:pPr marL="171450" indent="-171450">
-              <a:buFontTx/>
-              <a:buChar char="-"/>
-            </a:pPr>
-            <a:r>
-              <a:rPr lang="en-US" dirty="0" smtClean="0"/>
-              <a:t>run on multiple schedules</a:t>
-            </a:r>
-          </a:p>
-          <a:p>
-            <a:pPr marL="171450" indent="-171450">
-              <a:buFontTx/>
-              <a:buChar char="-"/>
-            </a:pPr>
-            <a:r>
-              <a:rPr lang="en-US" dirty="0" smtClean="0"/>
-              <a:t>typically the OS scheduler doesn’t vary much in where context switches take place in the program</a:t>
-            </a:r>
-            <a:endParaRPr lang="en-US" dirty="0"/>
+            <a:endParaRPr lang="en-US" dirty="0" smtClean="0"/>
           </a:p>
         </p:txBody>
       </p:sp>
@@ -990,7 +1811,7 @@
           <a:p>
             <a:fld id="{7CBFEC62-47D8-AA45-80EB-A84698F32C4E}" type="slidenum">
               <a:rPr lang="en-US" smtClean="0"/>
-              <a:t>4</a:t>
+              <a:t>3</a:t>
             </a:fld>
             <a:endParaRPr lang="en-US"/>
           </a:p>
@@ -999,7 +1820,7 @@
     </p:spTree>
     <p:extLst>
       <p:ext uri="{BB962C8B-B14F-4D97-AF65-F5344CB8AC3E}">
-        <p14:creationId xmlns:p14="http://schemas.microsoft.com/office/powerpoint/2010/main" val="4183042300"/>
+        <p14:creationId xmlns:p14="http://schemas.microsoft.com/office/powerpoint/2010/main" val="2503873888"/>
       </p:ext>
     </p:extLst>
   </p:cSld>
@@ -1053,6 +1874,30 @@
           <a:bodyPr/>
           <a:lstStyle/>
           <a:p>
+            <a:r>
+              <a:rPr lang="en-US" dirty="0" smtClean="0"/>
+              <a:t>emphasize:  </a:t>
+            </a:r>
+          </a:p>
+          <a:p>
+            <a:pPr marL="171450" indent="-171450">
+              <a:buFontTx/>
+              <a:buChar char="-"/>
+            </a:pPr>
+            <a:r>
+              <a:rPr lang="en-US" dirty="0" smtClean="0"/>
+              <a:t>run on multiple schedules</a:t>
+            </a:r>
+          </a:p>
+          <a:p>
+            <a:pPr marL="171450" indent="-171450">
+              <a:buFontTx/>
+              <a:buChar char="-"/>
+            </a:pPr>
+            <a:r>
+              <a:rPr lang="en-US" dirty="0" smtClean="0"/>
+              <a:t>typically the OS scheduler doesn’t vary much in where context switches take place in the program</a:t>
+            </a:r>
             <a:endParaRPr lang="en-US" dirty="0"/>
           </a:p>
         </p:txBody>
@@ -1074,7 +1919,7 @@
           <a:p>
             <a:fld id="{7CBFEC62-47D8-AA45-80EB-A84698F32C4E}" type="slidenum">
               <a:rPr lang="en-US" smtClean="0"/>
-              <a:t>5</a:t>
+              <a:t>4</a:t>
             </a:fld>
             <a:endParaRPr lang="en-US"/>
           </a:p>
@@ -1083,7 +1928,7 @@
     </p:spTree>
     <p:extLst>
       <p:ext uri="{BB962C8B-B14F-4D97-AF65-F5344CB8AC3E}">
-        <p14:creationId xmlns:p14="http://schemas.microsoft.com/office/powerpoint/2010/main" val="2856214145"/>
+        <p14:creationId xmlns:p14="http://schemas.microsoft.com/office/powerpoint/2010/main" val="4183042300"/>
       </p:ext>
     </p:extLst>
   </p:cSld>
@@ -1158,7 +2003,7 @@
           <a:p>
             <a:fld id="{7CBFEC62-47D8-AA45-80EB-A84698F32C4E}" type="slidenum">
               <a:rPr lang="en-US" smtClean="0"/>
-              <a:t>6</a:t>
+              <a:t>5</a:t>
             </a:fld>
             <a:endParaRPr lang="en-US"/>
           </a:p>
@@ -1167,7 +2012,7 @@
     </p:spTree>
     <p:extLst>
       <p:ext uri="{BB962C8B-B14F-4D97-AF65-F5344CB8AC3E}">
-        <p14:creationId xmlns:p14="http://schemas.microsoft.com/office/powerpoint/2010/main" val="2607280754"/>
+        <p14:creationId xmlns:p14="http://schemas.microsoft.com/office/powerpoint/2010/main" val="2856214145"/>
       </p:ext>
     </p:extLst>
   </p:cSld>
@@ -1221,95 +2066,6 @@
           <a:bodyPr/>
           <a:lstStyle/>
           <a:p>
-            <a:r>
-              <a:rPr lang="en-US" dirty="0" smtClean="0"/>
-              <a:t>-  SUDS – adds </a:t>
-            </a:r>
-            <a:r>
-              <a:rPr lang="en-US" dirty="0" err="1" smtClean="0"/>
-              <a:t>invokeScheduler</a:t>
-            </a:r>
-            <a:r>
-              <a:rPr lang="en-US" baseline="0" dirty="0" smtClean="0"/>
-              <a:t> call after each statement increases craziness of the schedules</a:t>
-            </a:r>
-            <a:endParaRPr lang="en-US" dirty="0" smtClean="0"/>
-          </a:p>
-          <a:p>
-            <a:endParaRPr lang="en-US" dirty="0" smtClean="0"/>
-          </a:p>
-          <a:p>
-            <a:endParaRPr lang="en-US" dirty="0" smtClean="0"/>
-          </a:p>
-          <a:p>
-            <a:r>
-              <a:rPr lang="en-US" dirty="0" err="1" smtClean="0"/>
-              <a:t>sections.c</a:t>
-            </a:r>
-            <a:r>
-              <a:rPr lang="en-US" dirty="0" smtClean="0"/>
-              <a:t> – student’s solution implementation</a:t>
-            </a:r>
-          </a:p>
-          <a:p>
-            <a:r>
-              <a:rPr lang="en-US" dirty="0" err="1" smtClean="0"/>
-              <a:t>main.c</a:t>
-            </a:r>
-            <a:r>
-              <a:rPr lang="en-US" dirty="0" smtClean="0"/>
-              <a:t> – driver program</a:t>
-            </a:r>
-          </a:p>
-          <a:p>
-            <a:pPr marL="0" marR="0" indent="0" algn="l" defTabSz="457200" rtl="0" eaLnBrk="1" fontAlgn="auto" latinLnBrk="0" hangingPunct="1">
-              <a:lnSpc>
-                <a:spcPct val="100000"/>
-              </a:lnSpc>
-              <a:spcBef>
-                <a:spcPts val="0"/>
-              </a:spcBef>
-              <a:spcAft>
-                <a:spcPts val="0"/>
-              </a:spcAft>
-              <a:buClrTx/>
-              <a:buSzTx/>
-              <a:buFontTx/>
-              <a:buNone/>
-              <a:tabLst/>
-              <a:defRPr/>
-            </a:pPr>
-            <a:r>
-              <a:rPr lang="en-US" dirty="0" smtClean="0"/>
-              <a:t>SUDS – a C source code instrumentation tool that allows the programmer to direct how and where instrumentation is added to the program</a:t>
-            </a:r>
-          </a:p>
-          <a:p>
-            <a:endParaRPr lang="en-US" dirty="0" smtClean="0"/>
-          </a:p>
-          <a:p>
-            <a:r>
-              <a:rPr lang="en-US" dirty="0" smtClean="0"/>
-              <a:t>Scheduler</a:t>
-            </a:r>
-            <a:r>
-              <a:rPr lang="en-US" baseline="0" dirty="0" smtClean="0"/>
-              <a:t> – along with the lock/semaphore routines, server as a library to control and debug multithreaded applications</a:t>
-            </a:r>
-            <a:endParaRPr lang="en-US" dirty="0" smtClean="0"/>
-          </a:p>
-          <a:p>
-            <a:r>
-              <a:rPr lang="en-US" dirty="0" smtClean="0"/>
-              <a:t>Wrapper – allows the user to the the program several times to enable several</a:t>
-            </a:r>
-            <a:r>
-              <a:rPr lang="en-US" baseline="0" dirty="0" smtClean="0"/>
-              <a:t> randomly produced schedules</a:t>
-            </a:r>
-            <a:endParaRPr lang="en-US" dirty="0" smtClean="0"/>
-          </a:p>
-          <a:p>
             <a:endParaRPr lang="en-US" dirty="0"/>
           </a:p>
         </p:txBody>
@@ -1331,7 +2087,7 @@
           <a:p>
             <a:fld id="{7CBFEC62-47D8-AA45-80EB-A84698F32C4E}" type="slidenum">
               <a:rPr lang="en-US" smtClean="0"/>
-              <a:t>7</a:t>
+              <a:t>6</a:t>
             </a:fld>
             <a:endParaRPr lang="en-US"/>
           </a:p>
@@ -1340,7 +2096,7 @@
     </p:spTree>
     <p:extLst>
       <p:ext uri="{BB962C8B-B14F-4D97-AF65-F5344CB8AC3E}">
-        <p14:creationId xmlns:p14="http://schemas.microsoft.com/office/powerpoint/2010/main" val="2925395708"/>
+        <p14:creationId xmlns:p14="http://schemas.microsoft.com/office/powerpoint/2010/main" val="2607280754"/>
       </p:ext>
     </p:extLst>
   </p:cSld>
@@ -1396,8 +2152,20 @@
           <a:p>
             <a:r>
               <a:rPr lang="en-US" dirty="0" smtClean="0"/>
-              <a:t>add backup slide showing partitions (e.g. library)</a:t>
-            </a:r>
+              <a:t>-  SUDS – adds </a:t>
+            </a:r>
+            <a:r>
+              <a:rPr lang="en-US" dirty="0" err="1" smtClean="0"/>
+              <a:t>invokeScheduler</a:t>
+            </a:r>
+            <a:r>
+              <a:rPr lang="en-US" baseline="0" dirty="0" smtClean="0"/>
+              <a:t> call after each statement increases craziness of the schedules</a:t>
+            </a:r>
+            <a:endParaRPr lang="en-US" dirty="0" smtClean="0"/>
+          </a:p>
+          <a:p>
+            <a:endParaRPr lang="en-US" dirty="0" smtClean="0"/>
           </a:p>
           <a:p>
             <a:endParaRPr lang="en-US" dirty="0" smtClean="0"/>
@@ -1423,47 +2191,52 @@
             </a:r>
           </a:p>
           <a:p>
+            <a:pPr marL="0" marR="0" indent="0" algn="l" defTabSz="457200" rtl="0" eaLnBrk="1" fontAlgn="auto" latinLnBrk="0" hangingPunct="1">
+              <a:lnSpc>
+                <a:spcPct val="100000"/>
+              </a:lnSpc>
+              <a:spcBef>
+                <a:spcPts val="0"/>
+              </a:spcBef>
+              <a:spcAft>
+                <a:spcPts val="0"/>
+              </a:spcAft>
+              <a:buClrTx/>
+              <a:buSzTx/>
+              <a:buFontTx/>
+              <a:buNone/>
+              <a:tabLst/>
+              <a:defRPr/>
+            </a:pPr>
+            <a:r>
+              <a:rPr lang="en-US" dirty="0" smtClean="0"/>
+              <a:t>SUDS – a C source code instrumentation tool that allows the programmer to direct how and where instrumentation is added to the program</a:t>
+            </a:r>
+          </a:p>
+          <a:p>
+            <a:endParaRPr lang="en-US" dirty="0" smtClean="0"/>
+          </a:p>
+          <a:p>
             <a:r>
               <a:rPr lang="en-US" dirty="0" smtClean="0"/>
               <a:t>Scheduler</a:t>
             </a:r>
-          </a:p>
-          <a:p>
-            <a:pPr lvl="1"/>
-            <a:r>
-              <a:rPr lang="en-US" dirty="0" err="1" smtClean="0"/>
-              <a:t>sched.cpp</a:t>
+            <a:r>
+              <a:rPr lang="en-US" baseline="0" dirty="0" smtClean="0"/>
+              <a:t> – along with the lock/semaphore routines, server as a library to control and debug multithreaded applications</a:t>
             </a:r>
             <a:endParaRPr lang="en-US" dirty="0" smtClean="0"/>
           </a:p>
           <a:p>
             <a:r>
               <a:rPr lang="en-US" dirty="0" smtClean="0"/>
-              <a:t>Error Detection</a:t>
-            </a:r>
-          </a:p>
-          <a:p>
-            <a:pPr lvl="1"/>
-            <a:r>
-              <a:rPr lang="en-US" dirty="0" smtClean="0"/>
-              <a:t>Deadlock detection</a:t>
-            </a:r>
-          </a:p>
-          <a:p>
-            <a:r>
-              <a:rPr lang="en-US" dirty="0" smtClean="0"/>
-              <a:t>Logging</a:t>
-            </a:r>
-          </a:p>
-          <a:p>
-            <a:pPr lvl="1"/>
+              <a:t>Wrapper – allows the user to the the program several times to enable several</a:t>
+            </a:r>
+            <a:r>
+              <a:rPr lang="en-US" baseline="0" dirty="0" smtClean="0"/>
+              <a:t> randomly produced schedules</a:t>
+            </a:r>
             <a:endParaRPr lang="en-US" dirty="0" smtClean="0"/>
-          </a:p>
-          <a:p>
-            <a:r>
-              <a:rPr lang="en-US" dirty="0" smtClean="0"/>
-              <a:t>Wrapper</a:t>
-            </a:r>
           </a:p>
           <a:p>
             <a:endParaRPr lang="en-US" dirty="0"/>
@@ -1487,7 +2260,7 @@
           <a:p>
             <a:fld id="{7CBFEC62-47D8-AA45-80EB-A84698F32C4E}" type="slidenum">
               <a:rPr lang="en-US" smtClean="0"/>
-              <a:t>8</a:t>
+              <a:t>7</a:t>
             </a:fld>
             <a:endParaRPr lang="en-US"/>
           </a:p>
@@ -1496,7 +2269,7 @@
     </p:spTree>
     <p:extLst>
       <p:ext uri="{BB962C8B-B14F-4D97-AF65-F5344CB8AC3E}">
-        <p14:creationId xmlns:p14="http://schemas.microsoft.com/office/powerpoint/2010/main" val="489505825"/>
+        <p14:creationId xmlns:p14="http://schemas.microsoft.com/office/powerpoint/2010/main" val="2925395708"/>
       </p:ext>
     </p:extLst>
   </p:cSld>
@@ -1552,50 +2325,76 @@
           <a:p>
             <a:r>
               <a:rPr lang="en-US" dirty="0" smtClean="0"/>
-              <a:t>-  random</a:t>
-            </a:r>
-            <a:r>
-              <a:rPr lang="en-US" baseline="0" dirty="0" smtClean="0"/>
-              <a:t> (exercise different schedules) and interactive mode (more controlled debugging experience &amp; instructor demo)</a:t>
-            </a:r>
-          </a:p>
-          <a:p>
-            <a:pPr marL="171450" indent="-171450">
-              <a:buFontTx/>
-              <a:buChar char="-"/>
-            </a:pPr>
-            <a:r>
-              <a:rPr lang="en-US" baseline="0" dirty="0" smtClean="0"/>
-              <a:t>less focus on functions</a:t>
-            </a:r>
-          </a:p>
-          <a:p>
-            <a:pPr marL="171450" indent="-171450">
-              <a:buFontTx/>
-              <a:buChar char="-"/>
-            </a:pPr>
-            <a:r>
-              <a:rPr lang="en-US" baseline="0" dirty="0" smtClean="0"/>
-              <a:t>mention </a:t>
-            </a:r>
-            <a:r>
-              <a:rPr lang="en-US" baseline="0" dirty="0" err="1" smtClean="0"/>
-              <a:t>pthread</a:t>
-            </a:r>
-            <a:r>
-              <a:rPr lang="en-US" baseline="0" dirty="0" smtClean="0"/>
-              <a:t> functions</a:t>
-            </a:r>
-          </a:p>
-          <a:p>
-            <a:pPr marL="171450" indent="-171450">
-              <a:buFontTx/>
-              <a:buChar char="-"/>
-            </a:pPr>
-            <a:r>
-              <a:rPr lang="en-US" baseline="0" dirty="0" smtClean="0"/>
-              <a:t>remove invoke scheduler &amp; initialize threads</a:t>
-            </a:r>
+              <a:t>add backup slide showing partitions (e.g. library)</a:t>
+            </a:r>
+          </a:p>
+          <a:p>
+            <a:endParaRPr lang="en-US" dirty="0" smtClean="0"/>
+          </a:p>
+          <a:p>
+            <a:r>
+              <a:rPr lang="en-US" dirty="0" err="1" smtClean="0"/>
+              <a:t>sections.c</a:t>
+            </a:r>
+            <a:r>
+              <a:rPr lang="en-US" dirty="0" smtClean="0"/>
+              <a:t> – student’s solution implementation</a:t>
+            </a:r>
+          </a:p>
+          <a:p>
+            <a:r>
+              <a:rPr lang="en-US" dirty="0" err="1" smtClean="0"/>
+              <a:t>main.c</a:t>
+            </a:r>
+            <a:r>
+              <a:rPr lang="en-US" dirty="0" smtClean="0"/>
+              <a:t> – driver program</a:t>
+            </a:r>
+          </a:p>
+          <a:p>
+            <a:r>
+              <a:rPr lang="en-US" dirty="0" smtClean="0"/>
+              <a:t>Scheduler</a:t>
+            </a:r>
+          </a:p>
+          <a:p>
+            <a:pPr lvl="1"/>
+            <a:r>
+              <a:rPr lang="en-US" dirty="0" err="1" smtClean="0"/>
+              <a:t>sched.cpp</a:t>
+            </a:r>
+            <a:endParaRPr lang="en-US" dirty="0" smtClean="0"/>
+          </a:p>
+          <a:p>
+            <a:r>
+              <a:rPr lang="en-US" dirty="0" smtClean="0"/>
+              <a:t>Error Detection</a:t>
+            </a:r>
+          </a:p>
+          <a:p>
+            <a:pPr lvl="1"/>
+            <a:r>
+              <a:rPr lang="en-US" dirty="0" smtClean="0"/>
+              <a:t>Deadlock detection</a:t>
+            </a:r>
+          </a:p>
+          <a:p>
+            <a:r>
+              <a:rPr lang="en-US" dirty="0" smtClean="0"/>
+              <a:t>Logging</a:t>
+            </a:r>
+          </a:p>
+          <a:p>
+            <a:pPr lvl="1"/>
+            <a:endParaRPr lang="en-US" dirty="0" smtClean="0"/>
+          </a:p>
+          <a:p>
+            <a:r>
+              <a:rPr lang="en-US" dirty="0" smtClean="0"/>
+              <a:t>Wrapper</a:t>
+            </a:r>
+          </a:p>
+          <a:p>
             <a:endParaRPr lang="en-US" dirty="0"/>
           </a:p>
         </p:txBody>
@@ -1617,7 +2416,7 @@
           <a:p>
             <a:fld id="{7CBFEC62-47D8-AA45-80EB-A84698F32C4E}" type="slidenum">
               <a:rPr lang="en-US" smtClean="0"/>
-              <a:t>9</a:t>
+              <a:t>8</a:t>
             </a:fld>
             <a:endParaRPr lang="en-US"/>
           </a:p>
@@ -1626,7 +2425,7 @@
     </p:spTree>
     <p:extLst>
       <p:ext uri="{BB962C8B-B14F-4D97-AF65-F5344CB8AC3E}">
-        <p14:creationId xmlns:p14="http://schemas.microsoft.com/office/powerpoint/2010/main" val="4164143179"/>
+        <p14:creationId xmlns:p14="http://schemas.microsoft.com/office/powerpoint/2010/main" val="489505825"/>
       </p:ext>
     </p:extLst>
   </p:cSld>
@@ -1680,6 +2479,52 @@
           <a:bodyPr/>
           <a:lstStyle/>
           <a:p>
+            <a:r>
+              <a:rPr lang="en-US" dirty="0" smtClean="0"/>
+              <a:t>-  random</a:t>
+            </a:r>
+            <a:r>
+              <a:rPr lang="en-US" baseline="0" dirty="0" smtClean="0"/>
+              <a:t> (exercise different schedules) and interactive mode (more controlled debugging experience &amp; instructor demo)</a:t>
+            </a:r>
+          </a:p>
+          <a:p>
+            <a:pPr marL="171450" indent="-171450">
+              <a:buFontTx/>
+              <a:buChar char="-"/>
+            </a:pPr>
+            <a:r>
+              <a:rPr lang="en-US" baseline="0" dirty="0" smtClean="0"/>
+              <a:t>less focus on functions</a:t>
+            </a:r>
+          </a:p>
+          <a:p>
+            <a:pPr marL="171450" indent="-171450">
+              <a:buFontTx/>
+              <a:buChar char="-"/>
+            </a:pPr>
+            <a:r>
+              <a:rPr lang="en-US" baseline="0" dirty="0" smtClean="0"/>
+              <a:t>mention </a:t>
+            </a:r>
+            <a:r>
+              <a:rPr lang="en-US" baseline="0" dirty="0" err="1" smtClean="0"/>
+              <a:t>pthread</a:t>
+            </a:r>
+            <a:r>
+              <a:rPr lang="en-US" baseline="0" dirty="0" smtClean="0"/>
+              <a:t> functions</a:t>
+            </a:r>
+          </a:p>
+          <a:p>
+            <a:pPr marL="171450" indent="-171450">
+              <a:buFontTx/>
+              <a:buChar char="-"/>
+            </a:pPr>
+            <a:r>
+              <a:rPr lang="en-US" baseline="0" dirty="0" smtClean="0"/>
+              <a:t>remove invoke scheduler &amp; initialize threads</a:t>
+            </a:r>
             <a:endParaRPr lang="en-US" dirty="0"/>
           </a:p>
         </p:txBody>
@@ -1701,7 +2546,7 @@
           <a:p>
             <a:fld id="{7CBFEC62-47D8-AA45-80EB-A84698F32C4E}" type="slidenum">
               <a:rPr lang="en-US" smtClean="0"/>
-              <a:t>11</a:t>
+              <a:t>9</a:t>
             </a:fld>
             <a:endParaRPr lang="en-US"/>
           </a:p>
@@ -1710,7 +2555,7 @@
     </p:spTree>
     <p:extLst>
       <p:ext uri="{BB962C8B-B14F-4D97-AF65-F5344CB8AC3E}">
-        <p14:creationId xmlns:p14="http://schemas.microsoft.com/office/powerpoint/2010/main" val="3648962323"/>
+        <p14:creationId xmlns:p14="http://schemas.microsoft.com/office/powerpoint/2010/main" val="4164143179"/>
       </p:ext>
     </p:extLst>
   </p:cSld>
@@ -1908,7 +2753,7 @@
           <a:p>
             <a:fld id="{F09FF0AF-D2C1-48E6-838D-34907CC7AAD3}" type="datetime2">
               <a:rPr lang="en-US" smtClean="0"/>
-              <a:t>Thursday, June 7, 12</a:t>
+              <a:t>Friday, June 8, 12</a:t>
             </a:fld>
             <a:endParaRPr lang="en-US"/>
           </a:p>
@@ -2110,7 +2955,7 @@
           <a:p>
             <a:fld id="{6E272829-C125-48EE-B9F1-150AD50C9F98}" type="datetime2">
               <a:rPr lang="en-US" smtClean="0"/>
-              <a:t>Thursday, June 7, 12</a:t>
+              <a:t>Friday, June 8, 12</a:t>
             </a:fld>
             <a:endParaRPr lang="en-US"/>
           </a:p>
@@ -2287,7 +3132,7 @@
           <a:p>
             <a:fld id="{05341E2C-B9D9-45C2-B520-10A28977426A}" type="datetime2">
               <a:rPr lang="en-US" smtClean="0"/>
-              <a:t>Thursday, June 7, 12</a:t>
+              <a:t>Friday, June 8, 12</a:t>
             </a:fld>
             <a:endParaRPr lang="en-US"/>
           </a:p>
@@ -2454,7 +3299,7 @@
           <a:p>
             <a:fld id="{12925254-87A5-4CF0-99E8-AC8E68BF7E06}" type="datetime2">
               <a:rPr lang="en-US" smtClean="0"/>
-              <a:t>Thursday, June 7, 12</a:t>
+              <a:t>Friday, June 8, 12</a:t>
             </a:fld>
             <a:endParaRPr lang="en-US"/>
           </a:p>
@@ -2704,7 +3549,7 @@
           <a:p>
             <a:fld id="{DC2946C1-A293-479B-BDA5-001C778CB73D}" type="datetime2">
               <a:rPr lang="en-US" smtClean="0"/>
-              <a:t>Thursday, June 7, 12</a:t>
+              <a:t>Friday, June 8, 12</a:t>
             </a:fld>
             <a:endParaRPr lang="en-US"/>
           </a:p>
@@ -3024,7 +3869,7 @@
           <a:p>
             <a:fld id="{D1BA556C-EF54-4AA5-9DB7-CE7372A45079}" type="datetime2">
               <a:rPr lang="en-US" smtClean="0"/>
-              <a:t>Thursday, June 7, 12</a:t>
+              <a:t>Friday, June 8, 12</a:t>
             </a:fld>
             <a:endParaRPr lang="en-US"/>
           </a:p>
@@ -3492,7 +4337,7 @@
           <a:p>
             <a:fld id="{B78E10FB-3602-4C38-94EA-83110B555185}" type="datetime2">
               <a:rPr lang="en-US" smtClean="0"/>
-              <a:t>Thursday, June 7, 12</a:t>
+              <a:t>Friday, June 8, 12</a:t>
             </a:fld>
             <a:endParaRPr lang="en-US"/>
           </a:p>
@@ -3642,7 +4487,7 @@
           <a:p>
             <a:fld id="{CE2B67B4-70E4-41D6-8604-8C58B39011FA}" type="datetime2">
               <a:rPr lang="en-US" smtClean="0"/>
-              <a:t>Thursday, June 7, 12</a:t>
+              <a:t>Friday, June 8, 12</a:t>
             </a:fld>
             <a:endParaRPr lang="en-US"/>
           </a:p>
@@ -3734,7 +4579,7 @@
           <a:p>
             <a:fld id="{96C14349-F0F1-4B64-9196-E808C561C052}" type="datetime2">
               <a:rPr lang="en-US" smtClean="0"/>
-              <a:t>Thursday, June 7, 12</a:t>
+              <a:t>Friday, June 8, 12</a:t>
             </a:fld>
             <a:endParaRPr lang="en-US"/>
           </a:p>
@@ -4010,7 +4855,7 @@
           <a:p>
             <a:fld id="{AEFF8DCA-800C-4A35-9DC7-25E631DA2DB6}" type="datetime2">
               <a:rPr lang="en-US" smtClean="0"/>
-              <a:t>Thursday, June 7, 12</a:t>
+              <a:t>Friday, June 8, 12</a:t>
             </a:fld>
             <a:endParaRPr lang="en-US"/>
           </a:p>
@@ -4317,7 +5162,7 @@
           <a:p>
             <a:fld id="{A2A2C62E-D659-49D4-A739-4E48E87EAA9F}" type="datetime2">
               <a:rPr lang="en-US" smtClean="0"/>
-              <a:t>Thursday, June 7, 12</a:t>
+              <a:t>Friday, June 8, 12</a:t>
             </a:fld>
             <a:endParaRPr lang="en-US"/>
           </a:p>
@@ -4617,7 +5462,7 @@
           <a:p>
             <a:fld id="{1C925619-5C23-46BF-A87A-5AD00CBA1C66}" type="datetime2">
               <a:rPr lang="en-US" smtClean="0"/>
-              <a:t>Thursday, June 7, 12</a:t>
+              <a:t>Friday, June 8, 12</a:t>
             </a:fld>
             <a:endParaRPr lang="en-US" dirty="0"/>
           </a:p>
@@ -4715,6 +5560,13 @@
     <p:sldLayoutId id="2147483970" r:id="rId10"/>
     <p:sldLayoutId id="2147483971" r:id="rId11"/>
   </p:sldLayoutIdLst>
+  <p:timing>
+    <p:tnLst>
+      <p:par>
+        <p:cTn xmlns:p14="http://schemas.microsoft.com/office/powerpoint/2010/main" id="1" dur="indefinite" restart="never" nodeType="tmRoot"/>
+      </p:par>
+    </p:tnLst>
+  </p:timing>
   <p:hf hdr="0" ftr="0" dt="0"/>
   <p:txStyles>
     <p:titleStyle>
@@ -6617,11 +7469,7 @@
             </a:pPr>
             <a:r>
               <a:rPr lang="en-US" dirty="0" smtClean="0"/>
-              <a:t>+  Deadlock </a:t>
-            </a:r>
-            <a:r>
-              <a:rPr lang="en-US" dirty="0" smtClean="0"/>
-              <a:t>detection:  If all active threads are blocked waiting for either a lock or semaphore, then a deadlock has occurred.</a:t>
+              <a:t>+  Deadlock detection:  If all active threads are blocked waiting for either a lock or semaphore, then a deadlock has occurred.</a:t>
             </a:r>
           </a:p>
           <a:p>
@@ -6630,11 +7478,7 @@
             </a:pPr>
             <a:r>
               <a:rPr lang="en-US" dirty="0" smtClean="0"/>
-              <a:t>+  Controlled </a:t>
-            </a:r>
-            <a:r>
-              <a:rPr lang="en-US" dirty="0" smtClean="0"/>
-              <a:t>environment:</a:t>
+              <a:t>+  Controlled environment:</a:t>
             </a:r>
           </a:p>
           <a:p>
@@ -6657,11 +7501,7 @@
             </a:pPr>
             <a:r>
               <a:rPr lang="en-US" dirty="0" smtClean="0"/>
-              <a:t>+  Increased </a:t>
-            </a:r>
-            <a:r>
-              <a:rPr lang="en-US" dirty="0" smtClean="0"/>
-              <a:t>schedule coverage:</a:t>
+              <a:t>+  Increased schedule coverage:</a:t>
             </a:r>
           </a:p>
           <a:p>
@@ -7225,6 +8065,1968 @@
 </file>
 
 <file path=ppt/slides/slide19.xml><?xml version="1.0" encoding="utf-8"?>
+<p:sld xmlns:a="http://schemas.openxmlformats.org/drawingml/2006/main" xmlns:r="http://schemas.openxmlformats.org/officeDocument/2006/relationships" xmlns:p="http://schemas.openxmlformats.org/presentationml/2006/main">
+  <p:cSld>
+    <p:spTree>
+      <p:nvGrpSpPr>
+        <p:cNvPr id="1" name=""/>
+        <p:cNvGrpSpPr/>
+        <p:nvPr/>
+      </p:nvGrpSpPr>
+      <p:grpSpPr>
+        <a:xfrm>
+          <a:off x="0" y="0"/>
+          <a:ext cx="0" cy="0"/>
+          <a:chOff x="0" y="0"/>
+          <a:chExt cx="0" cy="0"/>
+        </a:xfrm>
+      </p:grpSpPr>
+      <p:sp>
+        <p:nvSpPr>
+          <p:cNvPr id="2" name="Title 1"/>
+          <p:cNvSpPr>
+            <a:spLocks noGrp="1"/>
+          </p:cNvSpPr>
+          <p:nvPr>
+            <p:ph type="title"/>
+          </p:nvPr>
+        </p:nvSpPr>
+        <p:spPr/>
+        <p:txBody>
+          <a:bodyPr/>
+          <a:lstStyle/>
+          <a:p>
+            <a:r>
+              <a:rPr lang="en-US" dirty="0" smtClean="0"/>
+              <a:t>1.</a:t>
+            </a:r>
+            <a:r>
+              <a:rPr lang="en-US" dirty="0" smtClean="0"/>
+              <a:t>  Make </a:t>
+            </a:r>
+            <a:r>
+              <a:rPr lang="en-US" dirty="0" smtClean="0"/>
+              <a:t>Project</a:t>
+            </a:r>
+            <a:endParaRPr lang="en-US" dirty="0"/>
+          </a:p>
+        </p:txBody>
+      </p:sp>
+      <p:sp>
+        <p:nvSpPr>
+          <p:cNvPr id="4" name="Slide Number Placeholder 3"/>
+          <p:cNvSpPr>
+            <a:spLocks noGrp="1"/>
+          </p:cNvSpPr>
+          <p:nvPr>
+            <p:ph type="sldNum" sz="quarter" idx="12"/>
+          </p:nvPr>
+        </p:nvSpPr>
+        <p:spPr/>
+        <p:txBody>
+          <a:bodyPr/>
+          <a:lstStyle/>
+          <a:p>
+            <a:fld id="{0CFEC368-1D7A-4F81-ABF6-AE0E36BAF64C}" type="slidenum">
+              <a:rPr lang="en-US" smtClean="0"/>
+              <a:pPr/>
+              <a:t>19</a:t>
+            </a:fld>
+            <a:endParaRPr lang="en-US"/>
+          </a:p>
+        </p:txBody>
+      </p:sp>
+      <p:pic>
+        <p:nvPicPr>
+          <p:cNvPr id="5" name="Picture 4" descr="concurDemo_make.png"/>
+          <p:cNvPicPr>
+            <a:picLocks noChangeAspect="1"/>
+          </p:cNvPicPr>
+          <p:nvPr/>
+        </p:nvPicPr>
+        <p:blipFill>
+          <a:blip r:embed="rId2">
+            <a:extLst>
+              <a:ext uri="{28A0092B-C50C-407E-A947-70E740481C1C}">
+                <a14:useLocalDpi xmlns:a14="http://schemas.microsoft.com/office/drawing/2010/main" val="0"/>
+              </a:ext>
+            </a:extLst>
+          </a:blip>
+          <a:stretch>
+            <a:fillRect/>
+          </a:stretch>
+        </p:blipFill>
+        <p:spPr>
+          <a:xfrm>
+            <a:off x="2088987" y="1523999"/>
+            <a:ext cx="6717221" cy="4920257"/>
+          </a:xfrm>
+          <a:prstGeom prst="rect">
+            <a:avLst/>
+          </a:prstGeom>
+          <a:ln>
+            <a:solidFill>
+              <a:schemeClr val="tx1"/>
+            </a:solidFill>
+          </a:ln>
+        </p:spPr>
+      </p:pic>
+      <p:sp>
+        <p:nvSpPr>
+          <p:cNvPr id="6" name="TextBox 5"/>
+          <p:cNvSpPr txBox="1"/>
+          <p:nvPr/>
+        </p:nvSpPr>
+        <p:spPr>
+          <a:xfrm>
+            <a:off x="279400" y="1608664"/>
+            <a:ext cx="1286933" cy="338554"/>
+          </a:xfrm>
+          <a:prstGeom prst="rect">
+            <a:avLst/>
+          </a:prstGeom>
+          <a:noFill/>
+        </p:spPr>
+        <p:txBody>
+          <a:bodyPr wrap="square" rtlCol="0">
+            <a:spAutoFit/>
+          </a:bodyPr>
+          <a:lstStyle/>
+          <a:p>
+            <a:pPr algn="r"/>
+            <a:r>
+              <a:rPr lang="en-US" sz="1600" dirty="0">
+                <a:solidFill>
+                  <a:srgbClr val="008000"/>
+                </a:solidFill>
+              </a:rPr>
+              <a:t>m</a:t>
+            </a:r>
+            <a:r>
+              <a:rPr lang="en-US" sz="1600" dirty="0" smtClean="0">
+                <a:solidFill>
+                  <a:srgbClr val="008000"/>
+                </a:solidFill>
+              </a:rPr>
+              <a:t>ake</a:t>
+            </a:r>
+            <a:r>
+              <a:rPr lang="en-US" sz="1600" dirty="0" smtClean="0"/>
+              <a:t> </a:t>
+            </a:r>
+            <a:r>
+              <a:rPr lang="en-US" sz="1600" dirty="0" smtClean="0">
+                <a:solidFill>
+                  <a:srgbClr val="008000"/>
+                </a:solidFill>
+              </a:rPr>
+              <a:t>clean</a:t>
+            </a:r>
+            <a:endParaRPr lang="en-US" sz="1600" dirty="0">
+              <a:solidFill>
+                <a:srgbClr val="008000"/>
+              </a:solidFill>
+            </a:endParaRPr>
+          </a:p>
+        </p:txBody>
+      </p:sp>
+      <p:cxnSp>
+        <p:nvCxnSpPr>
+          <p:cNvPr id="8" name="Straight Arrow Connector 7"/>
+          <p:cNvCxnSpPr/>
+          <p:nvPr/>
+        </p:nvCxnSpPr>
+        <p:spPr>
+          <a:xfrm>
+            <a:off x="1566333" y="1786408"/>
+            <a:ext cx="522654" cy="0"/>
+          </a:xfrm>
+          <a:prstGeom prst="straightConnector1">
+            <a:avLst/>
+          </a:prstGeom>
+          <a:ln>
+            <a:solidFill>
+              <a:schemeClr val="tx1"/>
+            </a:solidFill>
+            <a:tailEnd type="arrow"/>
+          </a:ln>
+        </p:spPr>
+        <p:style>
+          <a:lnRef idx="2">
+            <a:schemeClr val="accent1"/>
+          </a:lnRef>
+          <a:fillRef idx="0">
+            <a:schemeClr val="accent1"/>
+          </a:fillRef>
+          <a:effectRef idx="1">
+            <a:schemeClr val="accent1"/>
+          </a:effectRef>
+          <a:fontRef idx="minor">
+            <a:schemeClr val="tx1"/>
+          </a:fontRef>
+        </p:style>
+      </p:cxnSp>
+      <p:sp>
+        <p:nvSpPr>
+          <p:cNvPr id="10" name="TextBox 9"/>
+          <p:cNvSpPr txBox="1"/>
+          <p:nvPr/>
+        </p:nvSpPr>
+        <p:spPr>
+          <a:xfrm>
+            <a:off x="110067" y="4834463"/>
+            <a:ext cx="1456267" cy="338554"/>
+          </a:xfrm>
+          <a:prstGeom prst="rect">
+            <a:avLst/>
+          </a:prstGeom>
+          <a:noFill/>
+        </p:spPr>
+        <p:txBody>
+          <a:bodyPr wrap="square" rtlCol="0">
+            <a:spAutoFit/>
+          </a:bodyPr>
+          <a:lstStyle/>
+          <a:p>
+            <a:pPr algn="r"/>
+            <a:r>
+              <a:rPr lang="en-US" sz="1600" dirty="0">
+                <a:solidFill>
+                  <a:srgbClr val="008000"/>
+                </a:solidFill>
+              </a:rPr>
+              <a:t>i</a:t>
+            </a:r>
+            <a:r>
+              <a:rPr lang="en-US" sz="1600" dirty="0" smtClean="0">
+                <a:solidFill>
+                  <a:srgbClr val="008000"/>
+                </a:solidFill>
+              </a:rPr>
+              <a:t>nvoke SUDS</a:t>
+            </a:r>
+            <a:endParaRPr lang="en-US" sz="1600" dirty="0">
+              <a:solidFill>
+                <a:srgbClr val="008000"/>
+              </a:solidFill>
+            </a:endParaRPr>
+          </a:p>
+        </p:txBody>
+      </p:sp>
+      <p:cxnSp>
+        <p:nvCxnSpPr>
+          <p:cNvPr id="11" name="Straight Arrow Connector 10"/>
+          <p:cNvCxnSpPr/>
+          <p:nvPr/>
+        </p:nvCxnSpPr>
+        <p:spPr>
+          <a:xfrm>
+            <a:off x="1566333" y="5029141"/>
+            <a:ext cx="522654" cy="0"/>
+          </a:xfrm>
+          <a:prstGeom prst="straightConnector1">
+            <a:avLst/>
+          </a:prstGeom>
+          <a:ln>
+            <a:solidFill>
+              <a:schemeClr val="tx1"/>
+            </a:solidFill>
+            <a:tailEnd type="arrow"/>
+          </a:ln>
+        </p:spPr>
+        <p:style>
+          <a:lnRef idx="2">
+            <a:schemeClr val="accent1"/>
+          </a:lnRef>
+          <a:fillRef idx="0">
+            <a:schemeClr val="accent1"/>
+          </a:fillRef>
+          <a:effectRef idx="1">
+            <a:schemeClr val="accent1"/>
+          </a:effectRef>
+          <a:fontRef idx="minor">
+            <a:schemeClr val="tx1"/>
+          </a:fontRef>
+        </p:style>
+      </p:cxnSp>
+      <p:sp>
+        <p:nvSpPr>
+          <p:cNvPr id="13" name="TextBox 12"/>
+          <p:cNvSpPr txBox="1"/>
+          <p:nvPr/>
+        </p:nvSpPr>
+        <p:spPr>
+          <a:xfrm>
+            <a:off x="279400" y="2793999"/>
+            <a:ext cx="1286933" cy="338554"/>
+          </a:xfrm>
+          <a:prstGeom prst="rect">
+            <a:avLst/>
+          </a:prstGeom>
+          <a:noFill/>
+        </p:spPr>
+        <p:txBody>
+          <a:bodyPr wrap="square" rtlCol="0">
+            <a:spAutoFit/>
+          </a:bodyPr>
+          <a:lstStyle/>
+          <a:p>
+            <a:pPr algn="r"/>
+            <a:r>
+              <a:rPr lang="en-US" sz="1600" dirty="0">
+                <a:solidFill>
+                  <a:srgbClr val="008000"/>
+                </a:solidFill>
+              </a:rPr>
+              <a:t>m</a:t>
+            </a:r>
+            <a:r>
+              <a:rPr lang="en-US" sz="1600" dirty="0" smtClean="0">
+                <a:solidFill>
+                  <a:srgbClr val="008000"/>
+                </a:solidFill>
+              </a:rPr>
+              <a:t>ake</a:t>
+            </a:r>
+            <a:endParaRPr lang="en-US" sz="1600" dirty="0">
+              <a:solidFill>
+                <a:srgbClr val="008000"/>
+              </a:solidFill>
+            </a:endParaRPr>
+          </a:p>
+        </p:txBody>
+      </p:sp>
+      <p:cxnSp>
+        <p:nvCxnSpPr>
+          <p:cNvPr id="14" name="Straight Arrow Connector 13"/>
+          <p:cNvCxnSpPr/>
+          <p:nvPr/>
+        </p:nvCxnSpPr>
+        <p:spPr>
+          <a:xfrm>
+            <a:off x="1566333" y="2988677"/>
+            <a:ext cx="522654" cy="0"/>
+          </a:xfrm>
+          <a:prstGeom prst="straightConnector1">
+            <a:avLst/>
+          </a:prstGeom>
+          <a:ln>
+            <a:solidFill>
+              <a:schemeClr val="tx1"/>
+            </a:solidFill>
+            <a:tailEnd type="arrow"/>
+          </a:ln>
+        </p:spPr>
+        <p:style>
+          <a:lnRef idx="2">
+            <a:schemeClr val="accent1"/>
+          </a:lnRef>
+          <a:fillRef idx="0">
+            <a:schemeClr val="accent1"/>
+          </a:fillRef>
+          <a:effectRef idx="1">
+            <a:schemeClr val="accent1"/>
+          </a:effectRef>
+          <a:fontRef idx="minor">
+            <a:schemeClr val="tx1"/>
+          </a:fontRef>
+        </p:style>
+      </p:cxnSp>
+      <p:sp>
+        <p:nvSpPr>
+          <p:cNvPr id="19" name="TextBox 18"/>
+          <p:cNvSpPr txBox="1"/>
+          <p:nvPr/>
+        </p:nvSpPr>
+        <p:spPr>
+          <a:xfrm>
+            <a:off x="279399" y="5799667"/>
+            <a:ext cx="1261534" cy="338554"/>
+          </a:xfrm>
+          <a:prstGeom prst="rect">
+            <a:avLst/>
+          </a:prstGeom>
+          <a:noFill/>
+        </p:spPr>
+        <p:txBody>
+          <a:bodyPr wrap="square" rtlCol="0">
+            <a:spAutoFit/>
+          </a:bodyPr>
+          <a:lstStyle/>
+          <a:p>
+            <a:pPr algn="r"/>
+            <a:r>
+              <a:rPr lang="en-US" sz="1600" dirty="0">
+                <a:solidFill>
+                  <a:srgbClr val="008000"/>
+                </a:solidFill>
+              </a:rPr>
+              <a:t>p</a:t>
+            </a:r>
+            <a:r>
+              <a:rPr lang="en-US" sz="1600" dirty="0" smtClean="0">
+                <a:solidFill>
+                  <a:srgbClr val="008000"/>
+                </a:solidFill>
+              </a:rPr>
+              <a:t>roject files</a:t>
+            </a:r>
+            <a:endParaRPr lang="en-US" sz="1600" dirty="0">
+              <a:solidFill>
+                <a:srgbClr val="008000"/>
+              </a:solidFill>
+            </a:endParaRPr>
+          </a:p>
+        </p:txBody>
+      </p:sp>
+      <p:sp>
+        <p:nvSpPr>
+          <p:cNvPr id="20" name="Left Brace 19"/>
+          <p:cNvSpPr/>
+          <p:nvPr/>
+        </p:nvSpPr>
+        <p:spPr>
+          <a:xfrm>
+            <a:off x="1515521" y="5698063"/>
+            <a:ext cx="584200" cy="592670"/>
+          </a:xfrm>
+          <a:prstGeom prst="leftBrace">
+            <a:avLst/>
+          </a:prstGeom>
+          <a:ln>
+            <a:solidFill>
+              <a:schemeClr val="tx1"/>
+            </a:solidFill>
+          </a:ln>
+        </p:spPr>
+        <p:style>
+          <a:lnRef idx="2">
+            <a:schemeClr val="accent1"/>
+          </a:lnRef>
+          <a:fillRef idx="0">
+            <a:schemeClr val="accent1"/>
+          </a:fillRef>
+          <a:effectRef idx="1">
+            <a:schemeClr val="accent1"/>
+          </a:effectRef>
+          <a:fontRef idx="minor">
+            <a:schemeClr val="tx1"/>
+          </a:fontRef>
+        </p:style>
+        <p:txBody>
+          <a:bodyPr rtlCol="0" anchor="ctr"/>
+          <a:lstStyle/>
+          <a:p>
+            <a:pPr algn="ctr"/>
+            <a:endParaRPr lang="en-US"/>
+          </a:p>
+        </p:txBody>
+      </p:sp>
+    </p:spTree>
+    <p:extLst>
+      <p:ext uri="{BB962C8B-B14F-4D97-AF65-F5344CB8AC3E}">
+        <p14:creationId xmlns:p14="http://schemas.microsoft.com/office/powerpoint/2010/main" val="3900532876"/>
+      </p:ext>
+    </p:extLst>
+  </p:cSld>
+  <p:clrMapOvr>
+    <a:masterClrMapping/>
+  </p:clrMapOvr>
+  <p:timing>
+    <p:tnLst>
+      <p:par>
+        <p:cTn xmlns:p14="http://schemas.microsoft.com/office/powerpoint/2010/main" id="1" dur="indefinite" restart="never" nodeType="tmRoot"/>
+      </p:par>
+    </p:tnLst>
+  </p:timing>
+</p:sld>
+</file>
+
+<file path=ppt/slides/slide2.xml><?xml version="1.0" encoding="utf-8"?>
+<p:sld xmlns:a="http://schemas.openxmlformats.org/drawingml/2006/main" xmlns:r="http://schemas.openxmlformats.org/officeDocument/2006/relationships" xmlns:p="http://schemas.openxmlformats.org/presentationml/2006/main">
+  <p:cSld>
+    <p:spTree>
+      <p:nvGrpSpPr>
+        <p:cNvPr id="1" name=""/>
+        <p:cNvGrpSpPr/>
+        <p:nvPr/>
+      </p:nvGrpSpPr>
+      <p:grpSpPr>
+        <a:xfrm>
+          <a:off x="0" y="0"/>
+          <a:ext cx="0" cy="0"/>
+          <a:chOff x="0" y="0"/>
+          <a:chExt cx="0" cy="0"/>
+        </a:xfrm>
+      </p:grpSpPr>
+      <p:sp>
+        <p:nvSpPr>
+          <p:cNvPr id="2" name="Title 1"/>
+          <p:cNvSpPr>
+            <a:spLocks noGrp="1"/>
+          </p:cNvSpPr>
+          <p:nvPr>
+            <p:ph type="title"/>
+          </p:nvPr>
+        </p:nvSpPr>
+        <p:spPr/>
+        <p:txBody>
+          <a:bodyPr/>
+          <a:lstStyle/>
+          <a:p>
+            <a:r>
+              <a:rPr lang="en-US" dirty="0" smtClean="0"/>
+              <a:t>Overview</a:t>
+            </a:r>
+            <a:endParaRPr lang="en-US" dirty="0"/>
+          </a:p>
+        </p:txBody>
+      </p:sp>
+      <p:sp>
+        <p:nvSpPr>
+          <p:cNvPr id="3" name="Content Placeholder 2"/>
+          <p:cNvSpPr>
+            <a:spLocks noGrp="1"/>
+          </p:cNvSpPr>
+          <p:nvPr>
+            <p:ph idx="1"/>
+          </p:nvPr>
+        </p:nvSpPr>
+        <p:spPr/>
+        <p:txBody>
+          <a:bodyPr/>
+          <a:lstStyle/>
+          <a:p>
+            <a:r>
+              <a:rPr lang="en-US" dirty="0" smtClean="0"/>
+              <a:t>Problem &amp; Proposed Solution		  3 </a:t>
+            </a:r>
+            <a:r>
+              <a:rPr lang="en-US" dirty="0" err="1" smtClean="0"/>
+              <a:t>mins</a:t>
+            </a:r>
+            <a:endParaRPr lang="en-US" dirty="0" smtClean="0"/>
+          </a:p>
+          <a:p>
+            <a:r>
+              <a:rPr lang="en-US" dirty="0" smtClean="0"/>
+              <a:t>Design &amp; Implementation			  8 </a:t>
+            </a:r>
+            <a:r>
+              <a:rPr lang="en-US" dirty="0" err="1" smtClean="0"/>
+              <a:t>mins</a:t>
+            </a:r>
+            <a:endParaRPr lang="en-US" dirty="0" smtClean="0"/>
+          </a:p>
+          <a:p>
+            <a:r>
+              <a:rPr lang="en-US" dirty="0"/>
+              <a:t>Demo					  7 </a:t>
+            </a:r>
+            <a:r>
+              <a:rPr lang="en-US" dirty="0" err="1"/>
+              <a:t>mins</a:t>
+            </a:r>
+            <a:endParaRPr lang="en-US" dirty="0"/>
+          </a:p>
+          <a:p>
+            <a:r>
+              <a:rPr lang="en-US" dirty="0" smtClean="0"/>
+              <a:t>Test &amp; Analysis				  3 </a:t>
+            </a:r>
+            <a:r>
+              <a:rPr lang="en-US" dirty="0" err="1" smtClean="0"/>
+              <a:t>mins</a:t>
+            </a:r>
+            <a:endParaRPr lang="en-US" dirty="0" smtClean="0"/>
+          </a:p>
+          <a:p>
+            <a:r>
+              <a:rPr lang="en-US" dirty="0" smtClean="0"/>
+              <a:t>Future Work				  2 </a:t>
+            </a:r>
+            <a:r>
+              <a:rPr lang="en-US" dirty="0" err="1" smtClean="0"/>
+              <a:t>mins</a:t>
+            </a:r>
+            <a:endParaRPr lang="en-US" dirty="0" smtClean="0"/>
+          </a:p>
+          <a:p>
+            <a:r>
+              <a:rPr lang="en-US" dirty="0" smtClean="0"/>
+              <a:t>Summary					  2 </a:t>
+            </a:r>
+            <a:r>
+              <a:rPr lang="en-US" dirty="0" err="1" smtClean="0"/>
+              <a:t>mins</a:t>
+            </a:r>
+            <a:endParaRPr lang="en-US" dirty="0" smtClean="0"/>
+          </a:p>
+          <a:p>
+            <a:r>
+              <a:rPr lang="en-US" dirty="0" smtClean="0"/>
+              <a:t>Q&amp;A						  5 </a:t>
+            </a:r>
+            <a:r>
+              <a:rPr lang="en-US" dirty="0" err="1" smtClean="0"/>
+              <a:t>mins</a:t>
+            </a:r>
+            <a:endParaRPr lang="en-US" dirty="0"/>
+          </a:p>
+        </p:txBody>
+      </p:sp>
+      <p:sp>
+        <p:nvSpPr>
+          <p:cNvPr id="4" name="Slide Number Placeholder 3"/>
+          <p:cNvSpPr>
+            <a:spLocks noGrp="1"/>
+          </p:cNvSpPr>
+          <p:nvPr>
+            <p:ph type="sldNum" sz="quarter" idx="12"/>
+          </p:nvPr>
+        </p:nvSpPr>
+        <p:spPr/>
+        <p:txBody>
+          <a:bodyPr/>
+          <a:lstStyle/>
+          <a:p>
+            <a:fld id="{0CFEC368-1D7A-4F81-ABF6-AE0E36BAF64C}" type="slidenum">
+              <a:rPr lang="en-US" smtClean="0"/>
+              <a:pPr/>
+              <a:t>2</a:t>
+            </a:fld>
+            <a:endParaRPr lang="en-US"/>
+          </a:p>
+        </p:txBody>
+      </p:sp>
+    </p:spTree>
+    <p:extLst>
+      <p:ext uri="{BB962C8B-B14F-4D97-AF65-F5344CB8AC3E}">
+        <p14:creationId xmlns:p14="http://schemas.microsoft.com/office/powerpoint/2010/main" val="2081550029"/>
+      </p:ext>
+    </p:extLst>
+  </p:cSld>
+  <p:clrMapOvr>
+    <a:masterClrMapping/>
+  </p:clrMapOvr>
+  <p:timing>
+    <p:tnLst>
+      <p:par>
+        <p:cTn xmlns:p14="http://schemas.microsoft.com/office/powerpoint/2010/main" id="1" dur="indefinite" restart="never" nodeType="tmRoot"/>
+      </p:par>
+    </p:tnLst>
+  </p:timing>
+</p:sld>
+</file>
+
+<file path=ppt/slides/slide20.xml><?xml version="1.0" encoding="utf-8"?>
+<p:sld xmlns:a="http://schemas.openxmlformats.org/drawingml/2006/main" xmlns:r="http://schemas.openxmlformats.org/officeDocument/2006/relationships" xmlns:p="http://schemas.openxmlformats.org/presentationml/2006/main">
+  <p:cSld>
+    <p:spTree>
+      <p:nvGrpSpPr>
+        <p:cNvPr id="1" name=""/>
+        <p:cNvGrpSpPr/>
+        <p:nvPr/>
+      </p:nvGrpSpPr>
+      <p:grpSpPr>
+        <a:xfrm>
+          <a:off x="0" y="0"/>
+          <a:ext cx="0" cy="0"/>
+          <a:chOff x="0" y="0"/>
+          <a:chExt cx="0" cy="0"/>
+        </a:xfrm>
+      </p:grpSpPr>
+      <p:sp>
+        <p:nvSpPr>
+          <p:cNvPr id="2" name="Title 1"/>
+          <p:cNvSpPr>
+            <a:spLocks noGrp="1"/>
+          </p:cNvSpPr>
+          <p:nvPr>
+            <p:ph type="title"/>
+          </p:nvPr>
+        </p:nvSpPr>
+        <p:spPr/>
+        <p:txBody>
+          <a:bodyPr/>
+          <a:lstStyle/>
+          <a:p>
+            <a:r>
+              <a:rPr lang="en-US" dirty="0" smtClean="0"/>
+              <a:t>2.</a:t>
+            </a:r>
+            <a:r>
+              <a:rPr lang="en-US" dirty="0" smtClean="0"/>
+              <a:t>  Run </a:t>
+            </a:r>
+            <a:r>
+              <a:rPr lang="en-US" dirty="0" smtClean="0"/>
+              <a:t>Wrapper</a:t>
+            </a:r>
+            <a:endParaRPr lang="en-US" dirty="0"/>
+          </a:p>
+        </p:txBody>
+      </p:sp>
+      <p:sp>
+        <p:nvSpPr>
+          <p:cNvPr id="4" name="Slide Number Placeholder 3"/>
+          <p:cNvSpPr>
+            <a:spLocks noGrp="1"/>
+          </p:cNvSpPr>
+          <p:nvPr>
+            <p:ph type="sldNum" sz="quarter" idx="12"/>
+          </p:nvPr>
+        </p:nvSpPr>
+        <p:spPr/>
+        <p:txBody>
+          <a:bodyPr/>
+          <a:lstStyle/>
+          <a:p>
+            <a:fld id="{0CFEC368-1D7A-4F81-ABF6-AE0E36BAF64C}" type="slidenum">
+              <a:rPr lang="en-US" smtClean="0"/>
+              <a:pPr/>
+              <a:t>20</a:t>
+            </a:fld>
+            <a:endParaRPr lang="en-US"/>
+          </a:p>
+        </p:txBody>
+      </p:sp>
+      <p:pic>
+        <p:nvPicPr>
+          <p:cNvPr id="5" name="Picture 4" descr="concurDemo_wrapper.png"/>
+          <p:cNvPicPr>
+            <a:picLocks noChangeAspect="1"/>
+          </p:cNvPicPr>
+          <p:nvPr/>
+        </p:nvPicPr>
+        <p:blipFill>
+          <a:blip r:embed="rId2">
+            <a:extLst>
+              <a:ext uri="{28A0092B-C50C-407E-A947-70E740481C1C}">
+                <a14:useLocalDpi xmlns:a14="http://schemas.microsoft.com/office/drawing/2010/main" val="0"/>
+              </a:ext>
+            </a:extLst>
+          </a:blip>
+          <a:stretch>
+            <a:fillRect/>
+          </a:stretch>
+        </p:blipFill>
+        <p:spPr>
+          <a:xfrm>
+            <a:off x="1568995" y="2431920"/>
+            <a:ext cx="7480300" cy="1778000"/>
+          </a:xfrm>
+          <a:prstGeom prst="rect">
+            <a:avLst/>
+          </a:prstGeom>
+          <a:ln>
+            <a:solidFill>
+              <a:schemeClr val="tx1"/>
+            </a:solidFill>
+          </a:ln>
+        </p:spPr>
+      </p:pic>
+      <p:sp>
+        <p:nvSpPr>
+          <p:cNvPr id="6" name="TextBox 5"/>
+          <p:cNvSpPr txBox="1"/>
+          <p:nvPr/>
+        </p:nvSpPr>
+        <p:spPr>
+          <a:xfrm>
+            <a:off x="-50802" y="2683250"/>
+            <a:ext cx="1532466" cy="307777"/>
+          </a:xfrm>
+          <a:prstGeom prst="rect">
+            <a:avLst/>
+          </a:prstGeom>
+          <a:noFill/>
+        </p:spPr>
+        <p:txBody>
+          <a:bodyPr wrap="square" rtlCol="0">
+            <a:spAutoFit/>
+          </a:bodyPr>
+          <a:lstStyle/>
+          <a:p>
+            <a:pPr algn="r"/>
+            <a:r>
+              <a:rPr lang="en-US" sz="1400" dirty="0">
+                <a:solidFill>
+                  <a:srgbClr val="008000"/>
+                </a:solidFill>
+              </a:rPr>
+              <a:t>r</a:t>
+            </a:r>
+            <a:r>
+              <a:rPr lang="en-US" sz="1400" dirty="0" smtClean="0">
+                <a:solidFill>
+                  <a:srgbClr val="008000"/>
+                </a:solidFill>
+              </a:rPr>
+              <a:t>un python script</a:t>
+            </a:r>
+            <a:endParaRPr lang="en-US" sz="1400" dirty="0">
+              <a:solidFill>
+                <a:srgbClr val="008000"/>
+              </a:solidFill>
+            </a:endParaRPr>
+          </a:p>
+        </p:txBody>
+      </p:sp>
+      <p:cxnSp>
+        <p:nvCxnSpPr>
+          <p:cNvPr id="7" name="Straight Arrow Connector 6"/>
+          <p:cNvCxnSpPr>
+            <a:stCxn id="8" idx="3"/>
+          </p:cNvCxnSpPr>
+          <p:nvPr/>
+        </p:nvCxnSpPr>
+        <p:spPr>
+          <a:xfrm>
+            <a:off x="1286934" y="3234156"/>
+            <a:ext cx="277128" cy="0"/>
+          </a:xfrm>
+          <a:prstGeom prst="straightConnector1">
+            <a:avLst/>
+          </a:prstGeom>
+          <a:ln>
+            <a:solidFill>
+              <a:schemeClr val="tx1"/>
+            </a:solidFill>
+            <a:tailEnd type="arrow"/>
+          </a:ln>
+        </p:spPr>
+        <p:style>
+          <a:lnRef idx="2">
+            <a:schemeClr val="accent1"/>
+          </a:lnRef>
+          <a:fillRef idx="0">
+            <a:schemeClr val="accent1"/>
+          </a:fillRef>
+          <a:effectRef idx="1">
+            <a:schemeClr val="accent1"/>
+          </a:effectRef>
+          <a:fontRef idx="minor">
+            <a:schemeClr val="tx1"/>
+          </a:fontRef>
+        </p:style>
+      </p:cxnSp>
+      <p:sp>
+        <p:nvSpPr>
+          <p:cNvPr id="8" name="TextBox 7"/>
+          <p:cNvSpPr txBox="1"/>
+          <p:nvPr/>
+        </p:nvSpPr>
+        <p:spPr>
+          <a:xfrm>
+            <a:off x="0" y="3080267"/>
+            <a:ext cx="1286934" cy="307777"/>
+          </a:xfrm>
+          <a:prstGeom prst="rect">
+            <a:avLst/>
+          </a:prstGeom>
+          <a:noFill/>
+        </p:spPr>
+        <p:txBody>
+          <a:bodyPr wrap="square" rtlCol="0">
+            <a:spAutoFit/>
+          </a:bodyPr>
+          <a:lstStyle/>
+          <a:p>
+            <a:pPr algn="r"/>
+            <a:r>
+              <a:rPr lang="en-US" sz="1400" dirty="0">
+                <a:solidFill>
+                  <a:srgbClr val="008000"/>
+                </a:solidFill>
+              </a:rPr>
+              <a:t>i</a:t>
+            </a:r>
+            <a:r>
+              <a:rPr lang="en-US" sz="1400" dirty="0" smtClean="0">
+                <a:solidFill>
+                  <a:srgbClr val="008000"/>
+                </a:solidFill>
+              </a:rPr>
+              <a:t>nvoke concur</a:t>
+            </a:r>
+            <a:endParaRPr lang="en-US" sz="1400" dirty="0">
+              <a:solidFill>
+                <a:srgbClr val="008000"/>
+              </a:solidFill>
+            </a:endParaRPr>
+          </a:p>
+        </p:txBody>
+      </p:sp>
+      <p:cxnSp>
+        <p:nvCxnSpPr>
+          <p:cNvPr id="12" name="Straight Arrow Connector 11"/>
+          <p:cNvCxnSpPr/>
+          <p:nvPr/>
+        </p:nvCxnSpPr>
+        <p:spPr>
+          <a:xfrm>
+            <a:off x="1286928" y="3039409"/>
+            <a:ext cx="277128" cy="0"/>
+          </a:xfrm>
+          <a:prstGeom prst="straightConnector1">
+            <a:avLst/>
+          </a:prstGeom>
+          <a:ln>
+            <a:solidFill>
+              <a:schemeClr val="tx1"/>
+            </a:solidFill>
+            <a:tailEnd type="arrow"/>
+          </a:ln>
+        </p:spPr>
+        <p:style>
+          <a:lnRef idx="2">
+            <a:schemeClr val="accent1"/>
+          </a:lnRef>
+          <a:fillRef idx="0">
+            <a:schemeClr val="accent1"/>
+          </a:fillRef>
+          <a:effectRef idx="1">
+            <a:schemeClr val="accent1"/>
+          </a:effectRef>
+          <a:fontRef idx="minor">
+            <a:schemeClr val="tx1"/>
+          </a:fontRef>
+        </p:style>
+      </p:cxnSp>
+      <p:cxnSp>
+        <p:nvCxnSpPr>
+          <p:cNvPr id="13" name="Straight Arrow Connector 12"/>
+          <p:cNvCxnSpPr/>
+          <p:nvPr/>
+        </p:nvCxnSpPr>
+        <p:spPr>
+          <a:xfrm>
+            <a:off x="1312329" y="3725236"/>
+            <a:ext cx="277128" cy="1"/>
+          </a:xfrm>
+          <a:prstGeom prst="straightConnector1">
+            <a:avLst/>
+          </a:prstGeom>
+          <a:ln>
+            <a:solidFill>
+              <a:schemeClr val="tx1"/>
+            </a:solidFill>
+            <a:tailEnd type="arrow"/>
+          </a:ln>
+        </p:spPr>
+        <p:style>
+          <a:lnRef idx="2">
+            <a:schemeClr val="accent1"/>
+          </a:lnRef>
+          <a:fillRef idx="0">
+            <a:schemeClr val="accent1"/>
+          </a:fillRef>
+          <a:effectRef idx="1">
+            <a:schemeClr val="accent1"/>
+          </a:effectRef>
+          <a:fontRef idx="minor">
+            <a:schemeClr val="tx1"/>
+          </a:fontRef>
+        </p:style>
+      </p:cxnSp>
+      <p:sp>
+        <p:nvSpPr>
+          <p:cNvPr id="14" name="TextBox 13"/>
+          <p:cNvSpPr txBox="1"/>
+          <p:nvPr/>
+        </p:nvSpPr>
+        <p:spPr>
+          <a:xfrm>
+            <a:off x="25395" y="3571347"/>
+            <a:ext cx="1286934" cy="523220"/>
+          </a:xfrm>
+          <a:prstGeom prst="rect">
+            <a:avLst/>
+          </a:prstGeom>
+          <a:noFill/>
+        </p:spPr>
+        <p:txBody>
+          <a:bodyPr wrap="square" rtlCol="0">
+            <a:spAutoFit/>
+          </a:bodyPr>
+          <a:lstStyle/>
+          <a:p>
+            <a:pPr algn="r"/>
+            <a:r>
+              <a:rPr lang="en-US" sz="1400" dirty="0">
+                <a:solidFill>
+                  <a:srgbClr val="008000"/>
+                </a:solidFill>
+              </a:rPr>
+              <a:t>f</a:t>
+            </a:r>
+            <a:r>
+              <a:rPr lang="en-US" sz="1400" dirty="0" smtClean="0">
+                <a:solidFill>
+                  <a:srgbClr val="008000"/>
+                </a:solidFill>
+              </a:rPr>
+              <a:t>ailure encountered</a:t>
+            </a:r>
+            <a:endParaRPr lang="en-US" sz="1400" dirty="0">
+              <a:solidFill>
+                <a:srgbClr val="008000"/>
+              </a:solidFill>
+            </a:endParaRPr>
+          </a:p>
+        </p:txBody>
+      </p:sp>
+    </p:spTree>
+    <p:extLst>
+      <p:ext uri="{BB962C8B-B14F-4D97-AF65-F5344CB8AC3E}">
+        <p14:creationId xmlns:p14="http://schemas.microsoft.com/office/powerpoint/2010/main" val="4018297967"/>
+      </p:ext>
+    </p:extLst>
+  </p:cSld>
+  <p:clrMapOvr>
+    <a:masterClrMapping/>
+  </p:clrMapOvr>
+  <p:timing>
+    <p:tnLst>
+      <p:par>
+        <p:cTn xmlns:p14="http://schemas.microsoft.com/office/powerpoint/2010/main" id="1" dur="indefinite" restart="never" nodeType="tmRoot"/>
+      </p:par>
+    </p:tnLst>
+  </p:timing>
+</p:sld>
+</file>
+
+<file path=ppt/slides/slide21.xml><?xml version="1.0" encoding="utf-8"?>
+<p:sld xmlns:a="http://schemas.openxmlformats.org/drawingml/2006/main" xmlns:r="http://schemas.openxmlformats.org/officeDocument/2006/relationships" xmlns:p="http://schemas.openxmlformats.org/presentationml/2006/main">
+  <p:cSld>
+    <p:spTree>
+      <p:nvGrpSpPr>
+        <p:cNvPr id="1" name=""/>
+        <p:cNvGrpSpPr/>
+        <p:nvPr/>
+      </p:nvGrpSpPr>
+      <p:grpSpPr>
+        <a:xfrm>
+          <a:off x="0" y="0"/>
+          <a:ext cx="0" cy="0"/>
+          <a:chOff x="0" y="0"/>
+          <a:chExt cx="0" cy="0"/>
+        </a:xfrm>
+      </p:grpSpPr>
+      <p:sp>
+        <p:nvSpPr>
+          <p:cNvPr id="2" name="Title 1"/>
+          <p:cNvSpPr>
+            <a:spLocks noGrp="1"/>
+          </p:cNvSpPr>
+          <p:nvPr>
+            <p:ph type="title"/>
+          </p:nvPr>
+        </p:nvSpPr>
+        <p:spPr/>
+        <p:txBody>
+          <a:bodyPr/>
+          <a:lstStyle/>
+          <a:p>
+            <a:r>
+              <a:rPr lang="en-US" dirty="0" smtClean="0"/>
+              <a:t>3.</a:t>
+            </a:r>
+            <a:r>
+              <a:rPr lang="en-US" dirty="0" smtClean="0"/>
+              <a:t>  Run </a:t>
+            </a:r>
+            <a:r>
+              <a:rPr lang="en-US" dirty="0" smtClean="0"/>
+              <a:t>Concur</a:t>
+            </a:r>
+            <a:endParaRPr lang="en-US" dirty="0"/>
+          </a:p>
+        </p:txBody>
+      </p:sp>
+      <p:sp>
+        <p:nvSpPr>
+          <p:cNvPr id="4" name="Slide Number Placeholder 3"/>
+          <p:cNvSpPr>
+            <a:spLocks noGrp="1"/>
+          </p:cNvSpPr>
+          <p:nvPr>
+            <p:ph type="sldNum" sz="quarter" idx="12"/>
+          </p:nvPr>
+        </p:nvSpPr>
+        <p:spPr/>
+        <p:txBody>
+          <a:bodyPr/>
+          <a:lstStyle/>
+          <a:p>
+            <a:fld id="{0CFEC368-1D7A-4F81-ABF6-AE0E36BAF64C}" type="slidenum">
+              <a:rPr lang="en-US" smtClean="0"/>
+              <a:pPr/>
+              <a:t>21</a:t>
+            </a:fld>
+            <a:endParaRPr lang="en-US"/>
+          </a:p>
+        </p:txBody>
+      </p:sp>
+      <p:pic>
+        <p:nvPicPr>
+          <p:cNvPr id="3" name="Picture 2" descr="concurDemo_concur.png"/>
+          <p:cNvPicPr>
+            <a:picLocks noChangeAspect="1"/>
+          </p:cNvPicPr>
+          <p:nvPr/>
+        </p:nvPicPr>
+        <p:blipFill>
+          <a:blip r:embed="rId2">
+            <a:extLst>
+              <a:ext uri="{28A0092B-C50C-407E-A947-70E740481C1C}">
+                <a14:useLocalDpi xmlns:a14="http://schemas.microsoft.com/office/drawing/2010/main" val="0"/>
+              </a:ext>
+            </a:extLst>
+          </a:blip>
+          <a:stretch>
+            <a:fillRect/>
+          </a:stretch>
+        </p:blipFill>
+        <p:spPr>
+          <a:xfrm>
+            <a:off x="660400" y="1981200"/>
+            <a:ext cx="8255000" cy="2882900"/>
+          </a:xfrm>
+          <a:prstGeom prst="rect">
+            <a:avLst/>
+          </a:prstGeom>
+          <a:ln>
+            <a:solidFill>
+              <a:schemeClr val="tx1"/>
+            </a:solidFill>
+          </a:ln>
+        </p:spPr>
+      </p:pic>
+      <p:cxnSp>
+        <p:nvCxnSpPr>
+          <p:cNvPr id="5" name="Straight Arrow Connector 4"/>
+          <p:cNvCxnSpPr/>
+          <p:nvPr/>
+        </p:nvCxnSpPr>
+        <p:spPr>
+          <a:xfrm rot="10800000" flipV="1">
+            <a:off x="6908800" y="3809887"/>
+            <a:ext cx="338667" cy="1"/>
+          </a:xfrm>
+          <a:prstGeom prst="bentConnector3">
+            <a:avLst>
+              <a:gd name="adj1" fmla="val 50000"/>
+            </a:avLst>
+          </a:prstGeom>
+          <a:ln>
+            <a:solidFill>
+              <a:srgbClr val="FF0000"/>
+            </a:solidFill>
+            <a:tailEnd type="arrow"/>
+          </a:ln>
+        </p:spPr>
+        <p:style>
+          <a:lnRef idx="2">
+            <a:schemeClr val="accent1"/>
+          </a:lnRef>
+          <a:fillRef idx="0">
+            <a:schemeClr val="accent1"/>
+          </a:fillRef>
+          <a:effectRef idx="1">
+            <a:schemeClr val="accent1"/>
+          </a:effectRef>
+          <a:fontRef idx="minor">
+            <a:schemeClr val="tx1"/>
+          </a:fontRef>
+        </p:style>
+      </p:cxnSp>
+      <p:sp>
+        <p:nvSpPr>
+          <p:cNvPr id="6" name="TextBox 5"/>
+          <p:cNvSpPr txBox="1"/>
+          <p:nvPr/>
+        </p:nvSpPr>
+        <p:spPr>
+          <a:xfrm>
+            <a:off x="7247466" y="3630598"/>
+            <a:ext cx="1286934" cy="307777"/>
+          </a:xfrm>
+          <a:prstGeom prst="rect">
+            <a:avLst/>
+          </a:prstGeom>
+          <a:noFill/>
+        </p:spPr>
+        <p:txBody>
+          <a:bodyPr wrap="square" rtlCol="0">
+            <a:spAutoFit/>
+          </a:bodyPr>
+          <a:lstStyle/>
+          <a:p>
+            <a:pPr algn="r"/>
+            <a:r>
+              <a:rPr lang="en-US" sz="1400" dirty="0">
+                <a:solidFill>
+                  <a:srgbClr val="008000"/>
+                </a:solidFill>
+              </a:rPr>
+              <a:t>i</a:t>
+            </a:r>
+            <a:r>
+              <a:rPr lang="en-US" sz="1400" dirty="0" smtClean="0">
+                <a:solidFill>
+                  <a:srgbClr val="008000"/>
+                </a:solidFill>
+              </a:rPr>
+              <a:t>nvoke concur</a:t>
+            </a:r>
+            <a:endParaRPr lang="en-US" sz="1400" dirty="0">
+              <a:solidFill>
+                <a:srgbClr val="008000"/>
+              </a:solidFill>
+            </a:endParaRPr>
+          </a:p>
+        </p:txBody>
+      </p:sp>
+      <p:cxnSp>
+        <p:nvCxnSpPr>
+          <p:cNvPr id="14" name="Straight Arrow Connector 13"/>
+          <p:cNvCxnSpPr>
+            <a:stCxn id="15" idx="0"/>
+          </p:cNvCxnSpPr>
+          <p:nvPr/>
+        </p:nvCxnSpPr>
+        <p:spPr>
+          <a:xfrm flipV="1">
+            <a:off x="6460066" y="4461934"/>
+            <a:ext cx="0" cy="785800"/>
+          </a:xfrm>
+          <a:prstGeom prst="straightConnector1">
+            <a:avLst/>
+          </a:prstGeom>
+          <a:ln>
+            <a:solidFill>
+              <a:srgbClr val="FF0000"/>
+            </a:solidFill>
+            <a:tailEnd type="arrow"/>
+          </a:ln>
+        </p:spPr>
+        <p:style>
+          <a:lnRef idx="2">
+            <a:schemeClr val="accent1"/>
+          </a:lnRef>
+          <a:fillRef idx="0">
+            <a:schemeClr val="accent1"/>
+          </a:fillRef>
+          <a:effectRef idx="1">
+            <a:schemeClr val="accent1"/>
+          </a:effectRef>
+          <a:fontRef idx="minor">
+            <a:schemeClr val="tx1"/>
+          </a:fontRef>
+        </p:style>
+      </p:cxnSp>
+      <p:sp>
+        <p:nvSpPr>
+          <p:cNvPr id="15" name="TextBox 14"/>
+          <p:cNvSpPr txBox="1"/>
+          <p:nvPr/>
+        </p:nvSpPr>
+        <p:spPr>
+          <a:xfrm>
+            <a:off x="5452532" y="5247734"/>
+            <a:ext cx="2015067" cy="307777"/>
+          </a:xfrm>
+          <a:prstGeom prst="rect">
+            <a:avLst/>
+          </a:prstGeom>
+          <a:noFill/>
+        </p:spPr>
+        <p:txBody>
+          <a:bodyPr wrap="square" rtlCol="0">
+            <a:spAutoFit/>
+          </a:bodyPr>
+          <a:lstStyle/>
+          <a:p>
+            <a:pPr algn="ctr"/>
+            <a:r>
+              <a:rPr lang="en-US" sz="1400" dirty="0">
+                <a:solidFill>
+                  <a:srgbClr val="008000"/>
+                </a:solidFill>
+              </a:rPr>
+              <a:t>f</a:t>
+            </a:r>
+            <a:r>
+              <a:rPr lang="en-US" sz="1400" dirty="0" smtClean="0">
+                <a:solidFill>
+                  <a:srgbClr val="008000"/>
+                </a:solidFill>
+              </a:rPr>
+              <a:t>ailure reproduce</a:t>
+            </a:r>
+            <a:endParaRPr lang="en-US" sz="1400" dirty="0">
+              <a:solidFill>
+                <a:srgbClr val="008000"/>
+              </a:solidFill>
+            </a:endParaRPr>
+          </a:p>
+        </p:txBody>
+      </p:sp>
+    </p:spTree>
+    <p:extLst>
+      <p:ext uri="{BB962C8B-B14F-4D97-AF65-F5344CB8AC3E}">
+        <p14:creationId xmlns:p14="http://schemas.microsoft.com/office/powerpoint/2010/main" val="4018297967"/>
+      </p:ext>
+    </p:extLst>
+  </p:cSld>
+  <p:clrMapOvr>
+    <a:masterClrMapping/>
+  </p:clrMapOvr>
+  <p:timing>
+    <p:tnLst>
+      <p:par>
+        <p:cTn xmlns:p14="http://schemas.microsoft.com/office/powerpoint/2010/main" id="1" dur="indefinite" restart="never" nodeType="tmRoot"/>
+      </p:par>
+    </p:tnLst>
+  </p:timing>
+</p:sld>
+</file>
+
+<file path=ppt/slides/slide22.xml><?xml version="1.0" encoding="utf-8"?>
+<p:sld xmlns:a="http://schemas.openxmlformats.org/drawingml/2006/main" xmlns:r="http://schemas.openxmlformats.org/officeDocument/2006/relationships" xmlns:p="http://schemas.openxmlformats.org/presentationml/2006/main">
+  <p:cSld>
+    <p:spTree>
+      <p:nvGrpSpPr>
+        <p:cNvPr id="1" name=""/>
+        <p:cNvGrpSpPr/>
+        <p:nvPr/>
+      </p:nvGrpSpPr>
+      <p:grpSpPr>
+        <a:xfrm>
+          <a:off x="0" y="0"/>
+          <a:ext cx="0" cy="0"/>
+          <a:chOff x="0" y="0"/>
+          <a:chExt cx="0" cy="0"/>
+        </a:xfrm>
+      </p:grpSpPr>
+      <p:sp>
+        <p:nvSpPr>
+          <p:cNvPr id="2" name="Title 1"/>
+          <p:cNvSpPr>
+            <a:spLocks noGrp="1"/>
+          </p:cNvSpPr>
+          <p:nvPr>
+            <p:ph type="title"/>
+          </p:nvPr>
+        </p:nvSpPr>
+        <p:spPr>
+          <a:xfrm>
+            <a:off x="457199" y="533400"/>
+            <a:ext cx="3934083" cy="1506606"/>
+          </a:xfrm>
+        </p:spPr>
+        <p:txBody>
+          <a:bodyPr/>
+          <a:lstStyle/>
+          <a:p>
+            <a:r>
+              <a:rPr lang="en-US" dirty="0" smtClean="0"/>
+              <a:t>4.</a:t>
+            </a:r>
+            <a:r>
+              <a:rPr lang="en-US" dirty="0" smtClean="0"/>
+              <a:t>  Examine </a:t>
+            </a:r>
+            <a:br>
+              <a:rPr lang="en-US" dirty="0" smtClean="0"/>
+            </a:br>
+            <a:r>
+              <a:rPr lang="en-US" dirty="0" smtClean="0"/>
+              <a:t>Log </a:t>
+            </a:r>
+            <a:r>
+              <a:rPr lang="en-US" dirty="0" smtClean="0"/>
+              <a:t>Trail</a:t>
+            </a:r>
+            <a:endParaRPr lang="en-US" dirty="0"/>
+          </a:p>
+        </p:txBody>
+      </p:sp>
+      <p:sp>
+        <p:nvSpPr>
+          <p:cNvPr id="4" name="Slide Number Placeholder 3"/>
+          <p:cNvSpPr>
+            <a:spLocks noGrp="1"/>
+          </p:cNvSpPr>
+          <p:nvPr>
+            <p:ph type="sldNum" sz="quarter" idx="12"/>
+          </p:nvPr>
+        </p:nvSpPr>
+        <p:spPr/>
+        <p:txBody>
+          <a:bodyPr/>
+          <a:lstStyle/>
+          <a:p>
+            <a:fld id="{0CFEC368-1D7A-4F81-ABF6-AE0E36BAF64C}" type="slidenum">
+              <a:rPr lang="en-US" smtClean="0"/>
+              <a:pPr/>
+              <a:t>22</a:t>
+            </a:fld>
+            <a:endParaRPr lang="en-US"/>
+          </a:p>
+        </p:txBody>
+      </p:sp>
+      <p:pic>
+        <p:nvPicPr>
+          <p:cNvPr id="3" name="Picture 2" descr="concurDemo_logTrail.png"/>
+          <p:cNvPicPr>
+            <a:picLocks noChangeAspect="1"/>
+          </p:cNvPicPr>
+          <p:nvPr/>
+        </p:nvPicPr>
+        <p:blipFill>
+          <a:blip r:embed="rId2">
+            <a:extLst>
+              <a:ext uri="{28A0092B-C50C-407E-A947-70E740481C1C}">
+                <a14:useLocalDpi xmlns:a14="http://schemas.microsoft.com/office/drawing/2010/main" val="0"/>
+              </a:ext>
+            </a:extLst>
+          </a:blip>
+          <a:stretch>
+            <a:fillRect/>
+          </a:stretch>
+        </p:blipFill>
+        <p:spPr>
+          <a:xfrm>
+            <a:off x="4472347" y="607948"/>
+            <a:ext cx="4532890" cy="5952831"/>
+          </a:xfrm>
+          <a:prstGeom prst="rect">
+            <a:avLst/>
+          </a:prstGeom>
+          <a:ln>
+            <a:solidFill>
+              <a:schemeClr val="tx1"/>
+            </a:solidFill>
+          </a:ln>
+        </p:spPr>
+      </p:pic>
+      <p:cxnSp>
+        <p:nvCxnSpPr>
+          <p:cNvPr id="5" name="Straight Arrow Connector 4"/>
+          <p:cNvCxnSpPr>
+            <a:stCxn id="6" idx="3"/>
+          </p:cNvCxnSpPr>
+          <p:nvPr/>
+        </p:nvCxnSpPr>
+        <p:spPr>
+          <a:xfrm>
+            <a:off x="3488268" y="3454913"/>
+            <a:ext cx="984079" cy="53248"/>
+          </a:xfrm>
+          <a:prstGeom prst="straightConnector1">
+            <a:avLst/>
+          </a:prstGeom>
+          <a:ln>
+            <a:solidFill>
+              <a:schemeClr val="tx1"/>
+            </a:solidFill>
+            <a:tailEnd type="arrow"/>
+          </a:ln>
+        </p:spPr>
+        <p:style>
+          <a:lnRef idx="2">
+            <a:schemeClr val="accent1"/>
+          </a:lnRef>
+          <a:fillRef idx="0">
+            <a:schemeClr val="accent1"/>
+          </a:fillRef>
+          <a:effectRef idx="1">
+            <a:schemeClr val="accent1"/>
+          </a:effectRef>
+          <a:fontRef idx="minor">
+            <a:schemeClr val="tx1"/>
+          </a:fontRef>
+        </p:style>
+      </p:cxnSp>
+      <p:sp>
+        <p:nvSpPr>
+          <p:cNvPr id="6" name="TextBox 5"/>
+          <p:cNvSpPr txBox="1"/>
+          <p:nvPr/>
+        </p:nvSpPr>
+        <p:spPr>
+          <a:xfrm>
+            <a:off x="262467" y="3193303"/>
+            <a:ext cx="3225801" cy="523220"/>
+          </a:xfrm>
+          <a:prstGeom prst="rect">
+            <a:avLst/>
+          </a:prstGeom>
+          <a:noFill/>
+        </p:spPr>
+        <p:txBody>
+          <a:bodyPr wrap="square" rtlCol="0">
+            <a:spAutoFit/>
+          </a:bodyPr>
+          <a:lstStyle/>
+          <a:p>
+            <a:pPr algn="r"/>
+            <a:r>
+              <a:rPr lang="en-US" sz="1400" dirty="0" smtClean="0">
+                <a:solidFill>
+                  <a:srgbClr val="008000"/>
+                </a:solidFill>
+              </a:rPr>
+              <a:t>last statement executed is line 63 of </a:t>
+            </a:r>
+            <a:r>
+              <a:rPr lang="en-US" sz="1400" dirty="0" err="1" smtClean="0">
+                <a:solidFill>
+                  <a:srgbClr val="008000"/>
+                </a:solidFill>
+              </a:rPr>
+              <a:t>sections.c</a:t>
+            </a:r>
+            <a:r>
+              <a:rPr lang="en-US" sz="1400" dirty="0" smtClean="0">
+                <a:solidFill>
+                  <a:srgbClr val="008000"/>
+                </a:solidFill>
+              </a:rPr>
+              <a:t> made by thread 4 </a:t>
+            </a:r>
+            <a:endParaRPr lang="en-US" sz="1400" dirty="0">
+              <a:solidFill>
+                <a:srgbClr val="008000"/>
+              </a:solidFill>
+            </a:endParaRPr>
+          </a:p>
+        </p:txBody>
+      </p:sp>
+      <p:sp>
+        <p:nvSpPr>
+          <p:cNvPr id="18" name="TextBox 17"/>
+          <p:cNvSpPr txBox="1"/>
+          <p:nvPr/>
+        </p:nvSpPr>
+        <p:spPr>
+          <a:xfrm>
+            <a:off x="651939" y="4131614"/>
+            <a:ext cx="3225801" cy="307777"/>
+          </a:xfrm>
+          <a:prstGeom prst="rect">
+            <a:avLst/>
+          </a:prstGeom>
+          <a:noFill/>
+        </p:spPr>
+        <p:txBody>
+          <a:bodyPr wrap="square" rtlCol="0">
+            <a:spAutoFit/>
+          </a:bodyPr>
+          <a:lstStyle/>
+          <a:p>
+            <a:pPr algn="r"/>
+            <a:r>
+              <a:rPr lang="en-US" sz="1400" dirty="0">
+                <a:solidFill>
+                  <a:srgbClr val="008000"/>
+                </a:solidFill>
+              </a:rPr>
+              <a:t>s</a:t>
+            </a:r>
+            <a:r>
+              <a:rPr lang="en-US" sz="1400" dirty="0" smtClean="0">
+                <a:solidFill>
+                  <a:srgbClr val="008000"/>
+                </a:solidFill>
+              </a:rPr>
+              <a:t>tatus shows all threads blocked</a:t>
+            </a:r>
+            <a:endParaRPr lang="en-US" sz="1400" dirty="0">
+              <a:solidFill>
+                <a:srgbClr val="008000"/>
+              </a:solidFill>
+            </a:endParaRPr>
+          </a:p>
+        </p:txBody>
+      </p:sp>
+      <p:sp>
+        <p:nvSpPr>
+          <p:cNvPr id="19" name="Left Brace 18"/>
+          <p:cNvSpPr/>
+          <p:nvPr/>
+        </p:nvSpPr>
+        <p:spPr>
+          <a:xfrm>
+            <a:off x="3888147" y="3962396"/>
+            <a:ext cx="584200" cy="685804"/>
+          </a:xfrm>
+          <a:prstGeom prst="leftBrace">
+            <a:avLst/>
+          </a:prstGeom>
+          <a:ln>
+            <a:solidFill>
+              <a:schemeClr val="tx1"/>
+            </a:solidFill>
+          </a:ln>
+        </p:spPr>
+        <p:style>
+          <a:lnRef idx="2">
+            <a:schemeClr val="accent1"/>
+          </a:lnRef>
+          <a:fillRef idx="0">
+            <a:schemeClr val="accent1"/>
+          </a:fillRef>
+          <a:effectRef idx="1">
+            <a:schemeClr val="accent1"/>
+          </a:effectRef>
+          <a:fontRef idx="minor">
+            <a:schemeClr val="tx1"/>
+          </a:fontRef>
+        </p:style>
+        <p:txBody>
+          <a:bodyPr rtlCol="0" anchor="ctr"/>
+          <a:lstStyle/>
+          <a:p>
+            <a:pPr algn="ctr"/>
+            <a:endParaRPr lang="en-US"/>
+          </a:p>
+        </p:txBody>
+      </p:sp>
+      <p:cxnSp>
+        <p:nvCxnSpPr>
+          <p:cNvPr id="20" name="Straight Arrow Connector 19"/>
+          <p:cNvCxnSpPr/>
+          <p:nvPr/>
+        </p:nvCxnSpPr>
+        <p:spPr>
+          <a:xfrm>
+            <a:off x="3488268" y="6151147"/>
+            <a:ext cx="984079" cy="7081"/>
+          </a:xfrm>
+          <a:prstGeom prst="straightConnector1">
+            <a:avLst/>
+          </a:prstGeom>
+          <a:ln>
+            <a:solidFill>
+              <a:schemeClr val="tx1"/>
+            </a:solidFill>
+            <a:tailEnd type="arrow"/>
+          </a:ln>
+        </p:spPr>
+        <p:style>
+          <a:lnRef idx="2">
+            <a:schemeClr val="accent1"/>
+          </a:lnRef>
+          <a:fillRef idx="0">
+            <a:schemeClr val="accent1"/>
+          </a:fillRef>
+          <a:effectRef idx="1">
+            <a:schemeClr val="accent1"/>
+          </a:effectRef>
+          <a:fontRef idx="minor">
+            <a:schemeClr val="tx1"/>
+          </a:fontRef>
+        </p:style>
+      </p:cxnSp>
+      <p:sp>
+        <p:nvSpPr>
+          <p:cNvPr id="21" name="TextBox 20"/>
+          <p:cNvSpPr txBox="1"/>
+          <p:nvPr/>
+        </p:nvSpPr>
+        <p:spPr>
+          <a:xfrm>
+            <a:off x="262467" y="5970375"/>
+            <a:ext cx="3225801" cy="307777"/>
+          </a:xfrm>
+          <a:prstGeom prst="rect">
+            <a:avLst/>
+          </a:prstGeom>
+          <a:noFill/>
+        </p:spPr>
+        <p:txBody>
+          <a:bodyPr wrap="square" rtlCol="0">
+            <a:spAutoFit/>
+          </a:bodyPr>
+          <a:lstStyle/>
+          <a:p>
+            <a:pPr algn="r"/>
+            <a:r>
+              <a:rPr lang="en-US" sz="1400" dirty="0">
+                <a:solidFill>
+                  <a:srgbClr val="008000"/>
+                </a:solidFill>
+              </a:rPr>
+              <a:t>f</a:t>
+            </a:r>
+            <a:r>
+              <a:rPr lang="en-US" sz="1400" dirty="0" smtClean="0">
+                <a:solidFill>
+                  <a:srgbClr val="008000"/>
+                </a:solidFill>
+              </a:rPr>
+              <a:t>ailure due to deadlock</a:t>
+            </a:r>
+            <a:endParaRPr lang="en-US" sz="1400" dirty="0">
+              <a:solidFill>
+                <a:srgbClr val="008000"/>
+              </a:solidFill>
+            </a:endParaRPr>
+          </a:p>
+        </p:txBody>
+      </p:sp>
+    </p:spTree>
+    <p:extLst>
+      <p:ext uri="{BB962C8B-B14F-4D97-AF65-F5344CB8AC3E}">
+        <p14:creationId xmlns:p14="http://schemas.microsoft.com/office/powerpoint/2010/main" val="4018297967"/>
+      </p:ext>
+    </p:extLst>
+  </p:cSld>
+  <p:clrMapOvr>
+    <a:masterClrMapping/>
+  </p:clrMapOvr>
+  <p:timing>
+    <p:tnLst>
+      <p:par>
+        <p:cTn xmlns:p14="http://schemas.microsoft.com/office/powerpoint/2010/main" id="1" dur="indefinite" restart="never" nodeType="tmRoot"/>
+      </p:par>
+    </p:tnLst>
+  </p:timing>
+</p:sld>
+</file>
+
+<file path=ppt/slides/slide23.xml><?xml version="1.0" encoding="utf-8"?>
+<p:sld xmlns:a="http://schemas.openxmlformats.org/drawingml/2006/main" xmlns:r="http://schemas.openxmlformats.org/officeDocument/2006/relationships" xmlns:p="http://schemas.openxmlformats.org/presentationml/2006/main">
+  <p:cSld>
+    <p:spTree>
+      <p:nvGrpSpPr>
+        <p:cNvPr id="1" name=""/>
+        <p:cNvGrpSpPr/>
+        <p:nvPr/>
+      </p:nvGrpSpPr>
+      <p:grpSpPr>
+        <a:xfrm>
+          <a:off x="0" y="0"/>
+          <a:ext cx="0" cy="0"/>
+          <a:chOff x="0" y="0"/>
+          <a:chExt cx="0" cy="0"/>
+        </a:xfrm>
+      </p:grpSpPr>
+      <p:sp>
+        <p:nvSpPr>
+          <p:cNvPr id="2" name="Title 1"/>
+          <p:cNvSpPr>
+            <a:spLocks noGrp="1"/>
+          </p:cNvSpPr>
+          <p:nvPr>
+            <p:ph type="title"/>
+          </p:nvPr>
+        </p:nvSpPr>
+        <p:spPr/>
+        <p:txBody>
+          <a:bodyPr>
+            <a:normAutofit fontScale="90000"/>
+          </a:bodyPr>
+          <a:lstStyle/>
+          <a:p>
+            <a:r>
+              <a:rPr lang="en-US" dirty="0" smtClean="0"/>
+              <a:t>5.</a:t>
+            </a:r>
+            <a:r>
+              <a:rPr lang="en-US" dirty="0" smtClean="0"/>
+              <a:t>  Examine </a:t>
+            </a:r>
+            <a:br>
+              <a:rPr lang="en-US" dirty="0" smtClean="0"/>
+            </a:br>
+            <a:r>
+              <a:rPr lang="en-US" dirty="0" err="1" smtClean="0"/>
+              <a:t>sections.c</a:t>
+            </a:r>
+            <a:r>
+              <a:rPr lang="en-US" dirty="0" smtClean="0"/>
+              <a:t> </a:t>
+            </a:r>
+            <a:r>
+              <a:rPr lang="en-US" dirty="0"/>
+              <a:t>f</a:t>
+            </a:r>
+            <a:r>
+              <a:rPr lang="en-US" dirty="0" smtClean="0"/>
+              <a:t>ile</a:t>
+            </a:r>
+            <a:endParaRPr lang="en-US" dirty="0"/>
+          </a:p>
+        </p:txBody>
+      </p:sp>
+      <p:sp>
+        <p:nvSpPr>
+          <p:cNvPr id="4" name="Slide Number Placeholder 3"/>
+          <p:cNvSpPr>
+            <a:spLocks noGrp="1"/>
+          </p:cNvSpPr>
+          <p:nvPr>
+            <p:ph type="sldNum" sz="quarter" idx="12"/>
+          </p:nvPr>
+        </p:nvSpPr>
+        <p:spPr/>
+        <p:txBody>
+          <a:bodyPr/>
+          <a:lstStyle/>
+          <a:p>
+            <a:fld id="{0CFEC368-1D7A-4F81-ABF6-AE0E36BAF64C}" type="slidenum">
+              <a:rPr lang="en-US" smtClean="0"/>
+              <a:pPr/>
+              <a:t>23</a:t>
+            </a:fld>
+            <a:endParaRPr lang="en-US"/>
+          </a:p>
+        </p:txBody>
+      </p:sp>
+      <p:pic>
+        <p:nvPicPr>
+          <p:cNvPr id="3" name="Picture 2" descr="concurDemo_sections.png"/>
+          <p:cNvPicPr>
+            <a:picLocks noChangeAspect="1"/>
+          </p:cNvPicPr>
+          <p:nvPr/>
+        </p:nvPicPr>
+        <p:blipFill>
+          <a:blip r:embed="rId2">
+            <a:extLst>
+              <a:ext uri="{28A0092B-C50C-407E-A947-70E740481C1C}">
+                <a14:useLocalDpi xmlns:a14="http://schemas.microsoft.com/office/drawing/2010/main" val="0"/>
+              </a:ext>
+            </a:extLst>
+          </a:blip>
+          <a:stretch>
+            <a:fillRect/>
+          </a:stretch>
+        </p:blipFill>
+        <p:spPr>
+          <a:xfrm>
+            <a:off x="4418305" y="533400"/>
+            <a:ext cx="4448304" cy="6249913"/>
+          </a:xfrm>
+          <a:prstGeom prst="rect">
+            <a:avLst/>
+          </a:prstGeom>
+          <a:ln>
+            <a:solidFill>
+              <a:schemeClr val="tx1"/>
+            </a:solidFill>
+          </a:ln>
+        </p:spPr>
+      </p:pic>
+      <p:cxnSp>
+        <p:nvCxnSpPr>
+          <p:cNvPr id="5" name="Straight Arrow Connector 4"/>
+          <p:cNvCxnSpPr/>
+          <p:nvPr/>
+        </p:nvCxnSpPr>
+        <p:spPr>
+          <a:xfrm>
+            <a:off x="3434226" y="6031227"/>
+            <a:ext cx="984079" cy="0"/>
+          </a:xfrm>
+          <a:prstGeom prst="straightConnector1">
+            <a:avLst/>
+          </a:prstGeom>
+          <a:ln>
+            <a:solidFill>
+              <a:schemeClr val="tx1"/>
+            </a:solidFill>
+            <a:tailEnd type="arrow"/>
+          </a:ln>
+        </p:spPr>
+        <p:style>
+          <a:lnRef idx="2">
+            <a:schemeClr val="accent1"/>
+          </a:lnRef>
+          <a:fillRef idx="0">
+            <a:schemeClr val="accent1"/>
+          </a:fillRef>
+          <a:effectRef idx="1">
+            <a:schemeClr val="accent1"/>
+          </a:effectRef>
+          <a:fontRef idx="minor">
+            <a:schemeClr val="tx1"/>
+          </a:fontRef>
+        </p:style>
+      </p:cxnSp>
+      <p:sp>
+        <p:nvSpPr>
+          <p:cNvPr id="6" name="TextBox 5"/>
+          <p:cNvSpPr txBox="1"/>
+          <p:nvPr/>
+        </p:nvSpPr>
+        <p:spPr>
+          <a:xfrm>
+            <a:off x="208425" y="5843374"/>
+            <a:ext cx="3225801" cy="307777"/>
+          </a:xfrm>
+          <a:prstGeom prst="rect">
+            <a:avLst/>
+          </a:prstGeom>
+          <a:noFill/>
+        </p:spPr>
+        <p:txBody>
+          <a:bodyPr wrap="square" rtlCol="0">
+            <a:spAutoFit/>
+          </a:bodyPr>
+          <a:lstStyle/>
+          <a:p>
+            <a:pPr algn="r"/>
+            <a:r>
+              <a:rPr lang="en-US" sz="1400" dirty="0">
+                <a:solidFill>
+                  <a:srgbClr val="008000"/>
+                </a:solidFill>
+              </a:rPr>
+              <a:t>d</a:t>
+            </a:r>
+            <a:r>
+              <a:rPr lang="en-US" sz="1400" dirty="0" smtClean="0">
+                <a:solidFill>
+                  <a:srgbClr val="008000"/>
+                </a:solidFill>
+              </a:rPr>
+              <a:t>eadlock encountered at line 63</a:t>
+            </a:r>
+            <a:endParaRPr lang="en-US" sz="1400" dirty="0">
+              <a:solidFill>
+                <a:srgbClr val="008000"/>
+              </a:solidFill>
+            </a:endParaRPr>
+          </a:p>
+        </p:txBody>
+      </p:sp>
+    </p:spTree>
+    <p:extLst>
+      <p:ext uri="{BB962C8B-B14F-4D97-AF65-F5344CB8AC3E}">
+        <p14:creationId xmlns:p14="http://schemas.microsoft.com/office/powerpoint/2010/main" val="4018297967"/>
+      </p:ext>
+    </p:extLst>
+  </p:cSld>
+  <p:clrMapOvr>
+    <a:masterClrMapping/>
+  </p:clrMapOvr>
+  <p:timing>
+    <p:tnLst>
+      <p:par>
+        <p:cTn xmlns:p14="http://schemas.microsoft.com/office/powerpoint/2010/main" id="1" dur="indefinite" restart="never" nodeType="tmRoot"/>
+      </p:par>
+    </p:tnLst>
+  </p:timing>
+</p:sld>
+</file>
+
+<file path=ppt/slides/slide24.xml><?xml version="1.0" encoding="utf-8"?>
 <p:sld xmlns:a="http://schemas.openxmlformats.org/drawingml/2006/main" xmlns:r="http://schemas.openxmlformats.org/officeDocument/2006/relationships" xmlns:p="http://schemas.openxmlformats.org/presentationml/2006/main">
   <p:cSld>
     <p:spTree>
@@ -7714,7 +10516,7 @@
             <a:fld id="{0CFEC368-1D7A-4F81-ABF6-AE0E36BAF64C}" type="slidenum">
               <a:rPr lang="en-US" smtClean="0"/>
               <a:pPr/>
-              <a:t>19</a:t>
+              <a:t>24</a:t>
             </a:fld>
             <a:endParaRPr lang="en-US"/>
           </a:p>
@@ -7740,184 +10542,7 @@
 </p:sld>
 </file>
 
-<file path=ppt/slides/slide2.xml><?xml version="1.0" encoding="utf-8"?>
-<p:sld xmlns:a="http://schemas.openxmlformats.org/drawingml/2006/main" xmlns:r="http://schemas.openxmlformats.org/officeDocument/2006/relationships" xmlns:p="http://schemas.openxmlformats.org/presentationml/2006/main">
-  <p:cSld>
-    <p:spTree>
-      <p:nvGrpSpPr>
-        <p:cNvPr id="1" name=""/>
-        <p:cNvGrpSpPr/>
-        <p:nvPr/>
-      </p:nvGrpSpPr>
-      <p:grpSpPr>
-        <a:xfrm>
-          <a:off x="0" y="0"/>
-          <a:ext cx="0" cy="0"/>
-          <a:chOff x="0" y="0"/>
-          <a:chExt cx="0" cy="0"/>
-        </a:xfrm>
-      </p:grpSpPr>
-      <p:sp>
-        <p:nvSpPr>
-          <p:cNvPr id="2" name="Title 1"/>
-          <p:cNvSpPr>
-            <a:spLocks noGrp="1"/>
-          </p:cNvSpPr>
-          <p:nvPr>
-            <p:ph type="title"/>
-          </p:nvPr>
-        </p:nvSpPr>
-        <p:spPr/>
-        <p:txBody>
-          <a:bodyPr/>
-          <a:lstStyle/>
-          <a:p>
-            <a:r>
-              <a:rPr lang="en-US" dirty="0" smtClean="0"/>
-              <a:t>Overview</a:t>
-            </a:r>
-            <a:endParaRPr lang="en-US" dirty="0"/>
-          </a:p>
-        </p:txBody>
-      </p:sp>
-      <p:sp>
-        <p:nvSpPr>
-          <p:cNvPr id="3" name="Content Placeholder 2"/>
-          <p:cNvSpPr>
-            <a:spLocks noGrp="1"/>
-          </p:cNvSpPr>
-          <p:nvPr>
-            <p:ph idx="1"/>
-          </p:nvPr>
-        </p:nvSpPr>
-        <p:spPr/>
-        <p:txBody>
-          <a:bodyPr/>
-          <a:lstStyle/>
-          <a:p>
-            <a:r>
-              <a:rPr lang="en-US" dirty="0" smtClean="0"/>
-              <a:t>Problem &amp; Proposed Solution		  3 </a:t>
-            </a:r>
-            <a:r>
-              <a:rPr lang="en-US" dirty="0" err="1" smtClean="0"/>
-              <a:t>mins</a:t>
-            </a:r>
-            <a:endParaRPr lang="en-US" dirty="0" smtClean="0"/>
-          </a:p>
-          <a:p>
-            <a:r>
-              <a:rPr lang="en-US" dirty="0" smtClean="0"/>
-              <a:t>Design &amp; Implementation			  8 </a:t>
-            </a:r>
-            <a:r>
-              <a:rPr lang="en-US" dirty="0" err="1" smtClean="0"/>
-              <a:t>mins</a:t>
-            </a:r>
-            <a:endParaRPr lang="en-US" dirty="0" smtClean="0"/>
-          </a:p>
-          <a:p>
-            <a:r>
-              <a:rPr lang="en-US" dirty="0"/>
-              <a:t>Demo					  7 </a:t>
-            </a:r>
-            <a:r>
-              <a:rPr lang="en-US" dirty="0" err="1"/>
-              <a:t>mins</a:t>
-            </a:r>
-            <a:endParaRPr lang="en-US" dirty="0"/>
-          </a:p>
-          <a:p>
-            <a:r>
-              <a:rPr lang="en-US" dirty="0" smtClean="0"/>
-              <a:t>Test &amp; Analysis				  3 </a:t>
-            </a:r>
-            <a:r>
-              <a:rPr lang="en-US" dirty="0" err="1" smtClean="0"/>
-              <a:t>mins</a:t>
-            </a:r>
-            <a:endParaRPr lang="en-US" dirty="0" smtClean="0"/>
-          </a:p>
-          <a:p>
-            <a:r>
-              <a:rPr lang="en-US" dirty="0" smtClean="0"/>
-              <a:t>Future Work				  2 </a:t>
-            </a:r>
-            <a:r>
-              <a:rPr lang="en-US" dirty="0" err="1" smtClean="0"/>
-              <a:t>mins</a:t>
-            </a:r>
-            <a:endParaRPr lang="en-US" dirty="0" smtClean="0"/>
-          </a:p>
-          <a:p>
-            <a:r>
-              <a:rPr lang="en-US" dirty="0" smtClean="0"/>
-              <a:t>Summary					  2 </a:t>
-            </a:r>
-            <a:r>
-              <a:rPr lang="en-US" dirty="0" err="1" smtClean="0"/>
-              <a:t>mins</a:t>
-            </a:r>
-            <a:endParaRPr lang="en-US" dirty="0" smtClean="0"/>
-          </a:p>
-          <a:p>
-            <a:r>
-              <a:rPr lang="en-US" dirty="0" smtClean="0"/>
-              <a:t>Q&amp;A						  5 </a:t>
-            </a:r>
-            <a:r>
-              <a:rPr lang="en-US" dirty="0" err="1" smtClean="0"/>
-              <a:t>mins</a:t>
-            </a:r>
-            <a:endParaRPr lang="en-US" dirty="0"/>
-          </a:p>
-        </p:txBody>
-      </p:sp>
-      <p:sp>
-        <p:nvSpPr>
-          <p:cNvPr id="4" name="Slide Number Placeholder 3"/>
-          <p:cNvSpPr>
-            <a:spLocks noGrp="1"/>
-          </p:cNvSpPr>
-          <p:nvPr>
-            <p:ph type="sldNum" sz="quarter" idx="12"/>
-          </p:nvPr>
-        </p:nvSpPr>
-        <p:spPr/>
-        <p:txBody>
-          <a:bodyPr/>
-          <a:lstStyle/>
-          <a:p>
-            <a:fld id="{0CFEC368-1D7A-4F81-ABF6-AE0E36BAF64C}" type="slidenum">
-              <a:rPr lang="en-US" smtClean="0"/>
-              <a:pPr/>
-              <a:t>2</a:t>
-            </a:fld>
-            <a:endParaRPr lang="en-US"/>
-          </a:p>
-        </p:txBody>
-      </p:sp>
-    </p:spTree>
-    <p:extLst>
-      <p:ext uri="{BB962C8B-B14F-4D97-AF65-F5344CB8AC3E}">
-        <p14:creationId xmlns:p14="http://schemas.microsoft.com/office/powerpoint/2010/main" val="2081550029"/>
-      </p:ext>
-    </p:extLst>
-  </p:cSld>
-  <p:clrMapOvr>
-    <a:masterClrMapping/>
-  </p:clrMapOvr>
-  <p:timing>
-    <p:tnLst>
-      <p:par>
-        <p:cTn xmlns:p14="http://schemas.microsoft.com/office/powerpoint/2010/main" id="1" dur="indefinite" restart="never" nodeType="tmRoot"/>
-      </p:par>
-    </p:tnLst>
-  </p:timing>
-</p:sld>
-</file>
-
-<file path=ppt/slides/slide20.xml><?xml version="1.0" encoding="utf-8"?>
+<file path=ppt/slides/slide25.xml><?xml version="1.0" encoding="utf-8"?>
 <p:sld xmlns:a="http://schemas.openxmlformats.org/drawingml/2006/main" xmlns:r="http://schemas.openxmlformats.org/officeDocument/2006/relationships" xmlns:p="http://schemas.openxmlformats.org/presentationml/2006/main">
   <p:cSld>
     <p:spTree>
@@ -8270,7 +10895,7 @@
             <a:fld id="{0CFEC368-1D7A-4F81-ABF6-AE0E36BAF64C}" type="slidenum">
               <a:rPr lang="en-US" smtClean="0"/>
               <a:pPr/>
-              <a:t>20</a:t>
+              <a:t>25</a:t>
             </a:fld>
             <a:endParaRPr lang="en-US"/>
           </a:p>
@@ -8296,7 +10921,7 @@
 </p:sld>
 </file>
 
-<file path=ppt/slides/slide21.xml><?xml version="1.0" encoding="utf-8"?>
+<file path=ppt/slides/slide26.xml><?xml version="1.0" encoding="utf-8"?>
 <p:sld xmlns:a="http://schemas.openxmlformats.org/drawingml/2006/main" xmlns:r="http://schemas.openxmlformats.org/officeDocument/2006/relationships" xmlns:p="http://schemas.openxmlformats.org/presentationml/2006/main">
   <p:cSld>
     <p:spTree>
@@ -9400,7 +12025,7 @@
             <a:fld id="{0CFEC368-1D7A-4F81-ABF6-AE0E36BAF64C}" type="slidenum">
               <a:rPr lang="en-US" smtClean="0"/>
               <a:pPr/>
-              <a:t>21</a:t>
+              <a:t>26</a:t>
             </a:fld>
             <a:endParaRPr lang="en-US"/>
           </a:p>
@@ -9426,7 +12051,7 @@
 </p:sld>
 </file>
 
-<file path=ppt/slides/slide22.xml><?xml version="1.0" encoding="utf-8"?>
+<file path=ppt/slides/slide27.xml><?xml version="1.0" encoding="utf-8"?>
 <p:sld xmlns:a="http://schemas.openxmlformats.org/drawingml/2006/main" xmlns:r="http://schemas.openxmlformats.org/officeDocument/2006/relationships" xmlns:p="http://schemas.openxmlformats.org/presentationml/2006/main">
   <p:cSld>
     <p:spTree>
@@ -9585,7 +12210,7 @@
             <a:fld id="{0CFEC368-1D7A-4F81-ABF6-AE0E36BAF64C}" type="slidenum">
               <a:rPr lang="en-US" smtClean="0"/>
               <a:pPr/>
-              <a:t>22</a:t>
+              <a:t>27</a:t>
             </a:fld>
             <a:endParaRPr lang="en-US"/>
           </a:p>
@@ -10352,7 +12977,7 @@
           <p:spPr>
             <a:xfrm>
               <a:off x="3359365" y="1592531"/>
-              <a:ext cx="815471" cy="343092"/>
+              <a:ext cx="1167033" cy="343092"/>
             </a:xfrm>
             <a:prstGeom prst="rect">
               <a:avLst/>
@@ -10381,12 +13006,12 @@
             <a:lstStyle/>
             <a:p>
               <a:r>
-                <a:rPr lang="en-US" sz="1200" dirty="0" smtClean="0">
+                <a:rPr lang="en-US" sz="1200" dirty="0" err="1" smtClean="0">
                   <a:solidFill>
                     <a:srgbClr val="292934"/>
                   </a:solidFill>
                 </a:rPr>
-                <a:t>hw1.cpp</a:t>
+                <a:t>sections.c</a:t>
               </a:r>
               <a:endParaRPr lang="en-US" sz="1200" dirty="0">
                 <a:solidFill>
@@ -14685,7 +17310,6 @@
                 <a:rPr lang="en-US" sz="1200" dirty="0" smtClean="0"/>
                 <a:t>Solution</a:t>
               </a:r>
-              <a:endParaRPr lang="en-US" sz="1200" dirty="0" smtClean="0"/>
             </a:p>
             <a:p>
               <a:pPr algn="ctr"/>
@@ -15211,7 +17835,6 @@
                 <a:rPr lang="en-US" sz="1200" dirty="0" smtClean="0"/>
                 <a:t>Thread, Lock, &amp; Semaphore Management</a:t>
               </a:r>
-              <a:endParaRPr lang="en-US" sz="1200" dirty="0" smtClean="0"/>
             </a:p>
           </p:txBody>
         </p:sp>
@@ -15474,7 +18097,6 @@
               <a:rPr lang="en-US" sz="1200" dirty="0" smtClean="0"/>
               <a:t>New Component</a:t>
             </a:r>
-            <a:endParaRPr lang="en-US" sz="1200" dirty="0" smtClean="0"/>
           </a:p>
         </p:txBody>
       </p:sp>

</xml_diff>